<commit_message>
complete process chart of logistic regression
</commit_message>
<xml_diff>
--- a/ppt/tf.reduce_mean.pptx
+++ b/ppt/tf.reduce_mean.pptx
@@ -14530,7 +14530,7 @@
         </p:nvSpPr>
         <p:spPr>
           <a:xfrm>
-            <a:off x="2411760" y="1340768"/>
+            <a:off x="2411760" y="1329720"/>
             <a:ext cx="1856629" cy="504056"/>
           </a:xfrm>
           <a:prstGeom prst="roundRect">
@@ -14574,7 +14574,7 @@
         </p:nvSpPr>
         <p:spPr>
           <a:xfrm>
-            <a:off x="2721305" y="1423519"/>
+            <a:off x="2721305" y="1412471"/>
             <a:ext cx="1197572" cy="338554"/>
           </a:xfrm>
           <a:prstGeom prst="rect">
@@ -14604,7 +14604,7 @@
         </p:nvSpPr>
         <p:spPr>
           <a:xfrm>
-            <a:off x="2411760" y="2272753"/>
+            <a:off x="2411760" y="2170265"/>
             <a:ext cx="1856629" cy="504056"/>
           </a:xfrm>
           <a:prstGeom prst="roundRect">
@@ -14648,7 +14648,7 @@
         </p:nvSpPr>
         <p:spPr>
           <a:xfrm>
-            <a:off x="2545405" y="2355504"/>
+            <a:off x="2545405" y="2253016"/>
             <a:ext cx="1466042" cy="338554"/>
           </a:xfrm>
           <a:prstGeom prst="rect">
@@ -14682,7 +14682,7 @@
         </p:nvSpPr>
         <p:spPr>
           <a:xfrm>
-            <a:off x="2411760" y="3207297"/>
+            <a:off x="2411760" y="3028609"/>
             <a:ext cx="1856629" cy="504056"/>
           </a:xfrm>
           <a:prstGeom prst="roundRect">
@@ -14726,7 +14726,7 @@
         </p:nvSpPr>
         <p:spPr>
           <a:xfrm>
-            <a:off x="2411760" y="3225877"/>
+            <a:off x="2411760" y="3047189"/>
             <a:ext cx="1868653" cy="523220"/>
           </a:xfrm>
           <a:prstGeom prst="rect">
@@ -14764,7 +14764,1203 @@
         </p:nvSpPr>
         <p:spPr>
           <a:xfrm>
-            <a:off x="2411760" y="4141841"/>
+            <a:off x="2411760" y="3917433"/>
+            <a:ext cx="1856629" cy="504056"/>
+          </a:xfrm>
+          <a:prstGeom prst="roundRect">
+            <a:avLst>
+              <a:gd name="adj" fmla="val 12088"/>
+            </a:avLst>
+          </a:prstGeom>
+        </p:spPr>
+        <p:style>
+          <a:lnRef idx="1">
+            <a:schemeClr val="accent6"/>
+          </a:lnRef>
+          <a:fillRef idx="2">
+            <a:schemeClr val="accent6"/>
+          </a:fillRef>
+          <a:effectRef idx="1">
+            <a:schemeClr val="accent6"/>
+          </a:effectRef>
+          <a:fontRef idx="minor">
+            <a:schemeClr val="dk1"/>
+          </a:fontRef>
+        </p:style>
+        <p:txBody>
+          <a:bodyPr rtlCol="0" anchor="ctr"/>
+          <a:lstStyle/>
+          <a:p>
+            <a:pPr algn="ctr"/>
+            <a:endParaRPr lang="zh-CN" altLang="en-US" sz="1600">
+              <a:solidFill>
+                <a:schemeClr val="tx1"/>
+              </a:solidFill>
+            </a:endParaRPr>
+          </a:p>
+        </p:txBody>
+      </p:sp>
+      <p:sp>
+        <p:nvSpPr>
+          <p:cNvPr id="11" name="文本框 10"/>
+          <p:cNvSpPr txBox="1"/>
+          <p:nvPr/>
+        </p:nvSpPr>
+        <p:spPr>
+          <a:xfrm>
+            <a:off x="2490518" y="3885786"/>
+            <a:ext cx="1796133" cy="584775"/>
+          </a:xfrm>
+          <a:prstGeom prst="rect">
+            <a:avLst/>
+          </a:prstGeom>
+          <a:noFill/>
+        </p:spPr>
+        <p:txBody>
+          <a:bodyPr wrap="none" rtlCol="0">
+            <a:spAutoFit/>
+          </a:bodyPr>
+          <a:lstStyle/>
+          <a:p>
+            <a:r>
+              <a:rPr lang="en-US" altLang="zh-CN" sz="1600" dirty="0" smtClean="0"/>
+              <a:t>Logistic Regression</a:t>
+            </a:r>
+          </a:p>
+          <a:p>
+            <a:r>
+              <a:rPr lang="en-US" altLang="zh-CN" sz="1600" dirty="0"/>
+              <a:t>tf.matmul(x, W) + b</a:t>
+            </a:r>
+            <a:endParaRPr lang="zh-CN" altLang="en-US" sz="1600" dirty="0"/>
+          </a:p>
+        </p:txBody>
+      </p:sp>
+      <p:sp>
+        <p:nvSpPr>
+          <p:cNvPr id="12" name="圆角矩形 11"/>
+          <p:cNvSpPr/>
+          <p:nvPr/>
+        </p:nvSpPr>
+        <p:spPr>
+          <a:xfrm>
+            <a:off x="2411760" y="4756811"/>
+            <a:ext cx="1856629" cy="504056"/>
+          </a:xfrm>
+          <a:prstGeom prst="roundRect">
+            <a:avLst>
+              <a:gd name="adj" fmla="val 12088"/>
+            </a:avLst>
+          </a:prstGeom>
+        </p:spPr>
+        <p:style>
+          <a:lnRef idx="1">
+            <a:schemeClr val="accent6"/>
+          </a:lnRef>
+          <a:fillRef idx="2">
+            <a:schemeClr val="accent6"/>
+          </a:fillRef>
+          <a:effectRef idx="1">
+            <a:schemeClr val="accent6"/>
+          </a:effectRef>
+          <a:fontRef idx="minor">
+            <a:schemeClr val="dk1"/>
+          </a:fontRef>
+        </p:style>
+        <p:txBody>
+          <a:bodyPr rtlCol="0" anchor="ctr"/>
+          <a:lstStyle/>
+          <a:p>
+            <a:pPr algn="ctr"/>
+            <a:endParaRPr lang="zh-CN" altLang="en-US" sz="1600">
+              <a:solidFill>
+                <a:schemeClr val="tx1"/>
+              </a:solidFill>
+            </a:endParaRPr>
+          </a:p>
+        </p:txBody>
+      </p:sp>
+      <p:sp>
+        <p:nvSpPr>
+          <p:cNvPr id="13" name="文本框 12"/>
+          <p:cNvSpPr txBox="1"/>
+          <p:nvPr/>
+        </p:nvSpPr>
+        <p:spPr>
+          <a:xfrm>
+            <a:off x="2901466" y="4839562"/>
+            <a:ext cx="878446" cy="338554"/>
+          </a:xfrm>
+          <a:prstGeom prst="rect">
+            <a:avLst/>
+          </a:prstGeom>
+          <a:noFill/>
+        </p:spPr>
+        <p:txBody>
+          <a:bodyPr wrap="none" rtlCol="0">
+            <a:spAutoFit/>
+          </a:bodyPr>
+          <a:lstStyle/>
+          <a:p>
+            <a:r>
+              <a:rPr lang="en-US" altLang="zh-CN" sz="1600" dirty="0" smtClean="0"/>
+              <a:t>SoftMax</a:t>
+            </a:r>
+            <a:endParaRPr lang="zh-CN" altLang="en-US" sz="1600" dirty="0"/>
+          </a:p>
+        </p:txBody>
+      </p:sp>
+      <p:sp>
+        <p:nvSpPr>
+          <p:cNvPr id="14" name="文本框 13"/>
+          <p:cNvSpPr txBox="1"/>
+          <p:nvPr/>
+        </p:nvSpPr>
+        <p:spPr>
+          <a:xfrm>
+            <a:off x="4378569" y="3998350"/>
+            <a:ext cx="292068" cy="338554"/>
+          </a:xfrm>
+          <a:prstGeom prst="rect">
+            <a:avLst/>
+          </a:prstGeom>
+          <a:noFill/>
+        </p:spPr>
+        <p:txBody>
+          <a:bodyPr wrap="none" rtlCol="0">
+            <a:spAutoFit/>
+          </a:bodyPr>
+          <a:lstStyle/>
+          <a:p>
+            <a:r>
+              <a:rPr lang="en-US" altLang="zh-CN" sz="1600" b="1" dirty="0" smtClean="0"/>
+              <a:t>Y</a:t>
+            </a:r>
+            <a:endParaRPr lang="zh-CN" altLang="en-US" sz="1600" b="1" dirty="0"/>
+          </a:p>
+        </p:txBody>
+      </p:sp>
+      <p:sp>
+        <p:nvSpPr>
+          <p:cNvPr id="15" name="文本框 14"/>
+          <p:cNvSpPr txBox="1"/>
+          <p:nvPr/>
+        </p:nvSpPr>
+        <p:spPr>
+          <a:xfrm>
+            <a:off x="4378568" y="4825413"/>
+            <a:ext cx="1849615" cy="338554"/>
+          </a:xfrm>
+          <a:prstGeom prst="rect">
+            <a:avLst/>
+          </a:prstGeom>
+          <a:noFill/>
+        </p:spPr>
+        <p:txBody>
+          <a:bodyPr wrap="square" rtlCol="0">
+            <a:spAutoFit/>
+          </a:bodyPr>
+          <a:lstStyle/>
+          <a:p>
+            <a:r>
+              <a:rPr lang="en-US" altLang="zh-CN" sz="1600" b="1" dirty="0" smtClean="0"/>
+              <a:t>probability of Y</a:t>
+            </a:r>
+            <a:endParaRPr lang="zh-CN" altLang="en-US" sz="1600" b="1" dirty="0"/>
+          </a:p>
+        </p:txBody>
+      </p:sp>
+      <p:sp>
+        <p:nvSpPr>
+          <p:cNvPr id="17" name="圆角矩形 16"/>
+          <p:cNvSpPr/>
+          <p:nvPr/>
+        </p:nvSpPr>
+        <p:spPr>
+          <a:xfrm>
+            <a:off x="2423784" y="5586958"/>
+            <a:ext cx="1856629" cy="504056"/>
+          </a:xfrm>
+          <a:prstGeom prst="roundRect">
+            <a:avLst>
+              <a:gd name="adj" fmla="val 12088"/>
+            </a:avLst>
+          </a:prstGeom>
+        </p:spPr>
+        <p:style>
+          <a:lnRef idx="1">
+            <a:schemeClr val="accent6"/>
+          </a:lnRef>
+          <a:fillRef idx="2">
+            <a:schemeClr val="accent6"/>
+          </a:fillRef>
+          <a:effectRef idx="1">
+            <a:schemeClr val="accent6"/>
+          </a:effectRef>
+          <a:fontRef idx="minor">
+            <a:schemeClr val="dk1"/>
+          </a:fontRef>
+        </p:style>
+        <p:txBody>
+          <a:bodyPr rtlCol="0" anchor="ctr"/>
+          <a:lstStyle/>
+          <a:p>
+            <a:pPr algn="ctr"/>
+            <a:endParaRPr lang="zh-CN" altLang="en-US" sz="1600">
+              <a:solidFill>
+                <a:schemeClr val="tx1"/>
+              </a:solidFill>
+            </a:endParaRPr>
+          </a:p>
+        </p:txBody>
+      </p:sp>
+      <p:sp>
+        <p:nvSpPr>
+          <p:cNvPr id="18" name="文本框 17"/>
+          <p:cNvSpPr txBox="1"/>
+          <p:nvPr/>
+        </p:nvSpPr>
+        <p:spPr>
+          <a:xfrm>
+            <a:off x="2670939" y="5669709"/>
+            <a:ext cx="1332416" cy="338554"/>
+          </a:xfrm>
+          <a:prstGeom prst="rect">
+            <a:avLst/>
+          </a:prstGeom>
+          <a:noFill/>
+        </p:spPr>
+        <p:txBody>
+          <a:bodyPr wrap="none" rtlCol="0">
+            <a:spAutoFit/>
+          </a:bodyPr>
+          <a:lstStyle/>
+          <a:p>
+            <a:r>
+              <a:rPr lang="en-US" altLang="zh-CN" sz="1600" dirty="0" smtClean="0"/>
+              <a:t>Cross Entropy</a:t>
+            </a:r>
+            <a:endParaRPr lang="zh-CN" altLang="en-US" sz="1600" dirty="0"/>
+          </a:p>
+        </p:txBody>
+      </p:sp>
+      <p:sp>
+        <p:nvSpPr>
+          <p:cNvPr id="19" name="文本框 18"/>
+          <p:cNvSpPr txBox="1"/>
+          <p:nvPr/>
+        </p:nvSpPr>
+        <p:spPr>
+          <a:xfrm>
+            <a:off x="4398288" y="5676061"/>
+            <a:ext cx="789934" cy="338554"/>
+          </a:xfrm>
+          <a:prstGeom prst="rect">
+            <a:avLst/>
+          </a:prstGeom>
+          <a:noFill/>
+        </p:spPr>
+        <p:txBody>
+          <a:bodyPr wrap="square" rtlCol="0">
+            <a:spAutoFit/>
+          </a:bodyPr>
+          <a:lstStyle/>
+          <a:p>
+            <a:r>
+              <a:rPr lang="en-US" altLang="zh-CN" sz="1600" b="1" dirty="0" smtClean="0"/>
+              <a:t>Loss</a:t>
+            </a:r>
+            <a:endParaRPr lang="zh-CN" altLang="en-US" sz="1600" b="1" dirty="0"/>
+          </a:p>
+        </p:txBody>
+      </p:sp>
+      <p:sp>
+        <p:nvSpPr>
+          <p:cNvPr id="20" name="圆角矩形 19"/>
+          <p:cNvSpPr/>
+          <p:nvPr/>
+        </p:nvSpPr>
+        <p:spPr>
+          <a:xfrm>
+            <a:off x="2423784" y="6427349"/>
+            <a:ext cx="1856629" cy="504056"/>
+          </a:xfrm>
+          <a:prstGeom prst="roundRect">
+            <a:avLst>
+              <a:gd name="adj" fmla="val 12088"/>
+            </a:avLst>
+          </a:prstGeom>
+        </p:spPr>
+        <p:style>
+          <a:lnRef idx="1">
+            <a:schemeClr val="accent6"/>
+          </a:lnRef>
+          <a:fillRef idx="2">
+            <a:schemeClr val="accent6"/>
+          </a:fillRef>
+          <a:effectRef idx="1">
+            <a:schemeClr val="accent6"/>
+          </a:effectRef>
+          <a:fontRef idx="minor">
+            <a:schemeClr val="dk1"/>
+          </a:fontRef>
+        </p:style>
+        <p:txBody>
+          <a:bodyPr rtlCol="0" anchor="ctr"/>
+          <a:lstStyle/>
+          <a:p>
+            <a:pPr algn="ctr"/>
+            <a:endParaRPr lang="zh-CN" altLang="en-US" sz="1600">
+              <a:solidFill>
+                <a:schemeClr val="tx1"/>
+              </a:solidFill>
+            </a:endParaRPr>
+          </a:p>
+        </p:txBody>
+      </p:sp>
+      <p:sp>
+        <p:nvSpPr>
+          <p:cNvPr id="21" name="文本框 20"/>
+          <p:cNvSpPr txBox="1"/>
+          <p:nvPr/>
+        </p:nvSpPr>
+        <p:spPr>
+          <a:xfrm>
+            <a:off x="2608507" y="6510100"/>
+            <a:ext cx="1531445" cy="338554"/>
+          </a:xfrm>
+          <a:prstGeom prst="rect">
+            <a:avLst/>
+          </a:prstGeom>
+          <a:noFill/>
+        </p:spPr>
+        <p:txBody>
+          <a:bodyPr wrap="none" rtlCol="0">
+            <a:spAutoFit/>
+          </a:bodyPr>
+          <a:lstStyle/>
+          <a:p>
+            <a:r>
+              <a:rPr lang="en-US" altLang="zh-CN" sz="1600" dirty="0" smtClean="0"/>
+              <a:t>Gradient of Loss</a:t>
+            </a:r>
+            <a:endParaRPr lang="zh-CN" altLang="en-US" sz="1600" dirty="0"/>
+          </a:p>
+        </p:txBody>
+      </p:sp>
+      <p:sp>
+        <p:nvSpPr>
+          <p:cNvPr id="22" name="圆角矩形 21"/>
+          <p:cNvSpPr/>
+          <p:nvPr/>
+        </p:nvSpPr>
+        <p:spPr>
+          <a:xfrm>
+            <a:off x="2423784" y="7269652"/>
+            <a:ext cx="1856629" cy="504056"/>
+          </a:xfrm>
+          <a:prstGeom prst="roundRect">
+            <a:avLst>
+              <a:gd name="adj" fmla="val 12088"/>
+            </a:avLst>
+          </a:prstGeom>
+        </p:spPr>
+        <p:style>
+          <a:lnRef idx="1">
+            <a:schemeClr val="accent6"/>
+          </a:lnRef>
+          <a:fillRef idx="2">
+            <a:schemeClr val="accent6"/>
+          </a:fillRef>
+          <a:effectRef idx="1">
+            <a:schemeClr val="accent6"/>
+          </a:effectRef>
+          <a:fontRef idx="minor">
+            <a:schemeClr val="dk1"/>
+          </a:fontRef>
+        </p:style>
+        <p:txBody>
+          <a:bodyPr rtlCol="0" anchor="ctr"/>
+          <a:lstStyle/>
+          <a:p>
+            <a:pPr algn="ctr"/>
+            <a:endParaRPr lang="zh-CN" altLang="en-US" sz="1600">
+              <a:solidFill>
+                <a:schemeClr val="tx1"/>
+              </a:solidFill>
+            </a:endParaRPr>
+          </a:p>
+        </p:txBody>
+      </p:sp>
+      <p:sp>
+        <p:nvSpPr>
+          <p:cNvPr id="23" name="文本框 22"/>
+          <p:cNvSpPr txBox="1"/>
+          <p:nvPr/>
+        </p:nvSpPr>
+        <p:spPr>
+          <a:xfrm>
+            <a:off x="2469020" y="7247496"/>
+            <a:ext cx="1846146" cy="584775"/>
+          </a:xfrm>
+          <a:prstGeom prst="rect">
+            <a:avLst/>
+          </a:prstGeom>
+          <a:noFill/>
+        </p:spPr>
+        <p:txBody>
+          <a:bodyPr wrap="none" rtlCol="0">
+            <a:spAutoFit/>
+          </a:bodyPr>
+          <a:lstStyle/>
+          <a:p>
+            <a:pPr algn="ctr"/>
+            <a:r>
+              <a:rPr lang="en-US" altLang="zh-CN" sz="1600" dirty="0" smtClean="0"/>
+              <a:t>Stochastic Gradient </a:t>
+            </a:r>
+          </a:p>
+          <a:p>
+            <a:pPr algn="ctr"/>
+            <a:r>
+              <a:rPr lang="en-US" altLang="zh-CN" sz="1600" dirty="0" smtClean="0"/>
+              <a:t>Descent (SDG)</a:t>
+            </a:r>
+            <a:endParaRPr lang="zh-CN" altLang="en-US" sz="1400" dirty="0"/>
+          </a:p>
+        </p:txBody>
+      </p:sp>
+      <p:sp>
+        <p:nvSpPr>
+          <p:cNvPr id="24" name="下箭头 23"/>
+          <p:cNvSpPr/>
+          <p:nvPr/>
+        </p:nvSpPr>
+        <p:spPr>
+          <a:xfrm>
+            <a:off x="3134410" y="1062066"/>
+            <a:ext cx="288032" cy="216024"/>
+          </a:xfrm>
+          <a:prstGeom prst="downArrow">
+            <a:avLst/>
+          </a:prstGeom>
+          <a:solidFill>
+            <a:schemeClr val="bg1">
+              <a:lumMod val="95000"/>
+            </a:schemeClr>
+          </a:solidFill>
+          <a:ln w="6350">
+            <a:solidFill>
+              <a:schemeClr val="bg1">
+                <a:lumMod val="65000"/>
+              </a:schemeClr>
+            </a:solidFill>
+          </a:ln>
+        </p:spPr>
+        <p:style>
+          <a:lnRef idx="2">
+            <a:schemeClr val="accent1">
+              <a:shade val="50000"/>
+            </a:schemeClr>
+          </a:lnRef>
+          <a:fillRef idx="1">
+            <a:schemeClr val="accent1"/>
+          </a:fillRef>
+          <a:effectRef idx="0">
+            <a:schemeClr val="accent1"/>
+          </a:effectRef>
+          <a:fontRef idx="minor">
+            <a:schemeClr val="lt1"/>
+          </a:fontRef>
+        </p:style>
+        <p:txBody>
+          <a:bodyPr rtlCol="0" anchor="ctr"/>
+          <a:lstStyle/>
+          <a:p>
+            <a:pPr algn="ctr"/>
+            <a:endParaRPr lang="zh-CN" altLang="en-US"/>
+          </a:p>
+        </p:txBody>
+      </p:sp>
+      <p:sp>
+        <p:nvSpPr>
+          <p:cNvPr id="25" name="下箭头 24"/>
+          <p:cNvSpPr/>
+          <p:nvPr/>
+        </p:nvSpPr>
+        <p:spPr>
+          <a:xfrm>
+            <a:off x="3134410" y="1903871"/>
+            <a:ext cx="288032" cy="216024"/>
+          </a:xfrm>
+          <a:prstGeom prst="downArrow">
+            <a:avLst/>
+          </a:prstGeom>
+          <a:solidFill>
+            <a:schemeClr val="bg1">
+              <a:lumMod val="95000"/>
+            </a:schemeClr>
+          </a:solidFill>
+          <a:ln w="6350">
+            <a:solidFill>
+              <a:schemeClr val="bg1">
+                <a:lumMod val="65000"/>
+              </a:schemeClr>
+            </a:solidFill>
+          </a:ln>
+        </p:spPr>
+        <p:style>
+          <a:lnRef idx="2">
+            <a:schemeClr val="accent1">
+              <a:shade val="50000"/>
+            </a:schemeClr>
+          </a:lnRef>
+          <a:fillRef idx="1">
+            <a:schemeClr val="accent1"/>
+          </a:fillRef>
+          <a:effectRef idx="0">
+            <a:schemeClr val="accent1"/>
+          </a:effectRef>
+          <a:fontRef idx="minor">
+            <a:schemeClr val="lt1"/>
+          </a:fontRef>
+        </p:style>
+        <p:txBody>
+          <a:bodyPr rtlCol="0" anchor="ctr"/>
+          <a:lstStyle/>
+          <a:p>
+            <a:pPr algn="ctr"/>
+            <a:endParaRPr lang="zh-CN" altLang="en-US"/>
+          </a:p>
+        </p:txBody>
+      </p:sp>
+      <p:sp>
+        <p:nvSpPr>
+          <p:cNvPr id="26" name="下箭头 25"/>
+          <p:cNvSpPr/>
+          <p:nvPr/>
+        </p:nvSpPr>
+        <p:spPr>
+          <a:xfrm>
+            <a:off x="3134410" y="2753208"/>
+            <a:ext cx="288032" cy="216024"/>
+          </a:xfrm>
+          <a:prstGeom prst="downArrow">
+            <a:avLst/>
+          </a:prstGeom>
+          <a:solidFill>
+            <a:schemeClr val="bg1">
+              <a:lumMod val="95000"/>
+            </a:schemeClr>
+          </a:solidFill>
+          <a:ln w="6350">
+            <a:solidFill>
+              <a:schemeClr val="bg1">
+                <a:lumMod val="65000"/>
+              </a:schemeClr>
+            </a:solidFill>
+          </a:ln>
+        </p:spPr>
+        <p:style>
+          <a:lnRef idx="2">
+            <a:schemeClr val="accent1">
+              <a:shade val="50000"/>
+            </a:schemeClr>
+          </a:lnRef>
+          <a:fillRef idx="1">
+            <a:schemeClr val="accent1"/>
+          </a:fillRef>
+          <a:effectRef idx="0">
+            <a:schemeClr val="accent1"/>
+          </a:effectRef>
+          <a:fontRef idx="minor">
+            <a:schemeClr val="lt1"/>
+          </a:fontRef>
+        </p:style>
+        <p:txBody>
+          <a:bodyPr rtlCol="0" anchor="ctr"/>
+          <a:lstStyle/>
+          <a:p>
+            <a:pPr algn="ctr"/>
+            <a:endParaRPr lang="zh-CN" altLang="en-US"/>
+          </a:p>
+        </p:txBody>
+      </p:sp>
+      <p:sp>
+        <p:nvSpPr>
+          <p:cNvPr id="27" name="下箭头 26"/>
+          <p:cNvSpPr/>
+          <p:nvPr/>
+        </p:nvSpPr>
+        <p:spPr>
+          <a:xfrm>
+            <a:off x="3134410" y="3608992"/>
+            <a:ext cx="288032" cy="216024"/>
+          </a:xfrm>
+          <a:prstGeom prst="downArrow">
+            <a:avLst/>
+          </a:prstGeom>
+          <a:solidFill>
+            <a:schemeClr val="bg1">
+              <a:lumMod val="95000"/>
+            </a:schemeClr>
+          </a:solidFill>
+          <a:ln w="6350">
+            <a:solidFill>
+              <a:schemeClr val="bg1">
+                <a:lumMod val="65000"/>
+              </a:schemeClr>
+            </a:solidFill>
+          </a:ln>
+        </p:spPr>
+        <p:style>
+          <a:lnRef idx="2">
+            <a:schemeClr val="accent1">
+              <a:shade val="50000"/>
+            </a:schemeClr>
+          </a:lnRef>
+          <a:fillRef idx="1">
+            <a:schemeClr val="accent1"/>
+          </a:fillRef>
+          <a:effectRef idx="0">
+            <a:schemeClr val="accent1"/>
+          </a:effectRef>
+          <a:fontRef idx="minor">
+            <a:schemeClr val="lt1"/>
+          </a:fontRef>
+        </p:style>
+        <p:txBody>
+          <a:bodyPr rtlCol="0" anchor="ctr"/>
+          <a:lstStyle/>
+          <a:p>
+            <a:pPr algn="ctr"/>
+            <a:endParaRPr lang="zh-CN" altLang="en-US"/>
+          </a:p>
+        </p:txBody>
+      </p:sp>
+      <p:sp>
+        <p:nvSpPr>
+          <p:cNvPr id="28" name="下箭头 27"/>
+          <p:cNvSpPr/>
+          <p:nvPr/>
+        </p:nvSpPr>
+        <p:spPr>
+          <a:xfrm>
+            <a:off x="3134410" y="4495257"/>
+            <a:ext cx="288032" cy="216024"/>
+          </a:xfrm>
+          <a:prstGeom prst="downArrow">
+            <a:avLst/>
+          </a:prstGeom>
+          <a:solidFill>
+            <a:schemeClr val="bg1">
+              <a:lumMod val="95000"/>
+            </a:schemeClr>
+          </a:solidFill>
+          <a:ln w="6350">
+            <a:solidFill>
+              <a:schemeClr val="bg1">
+                <a:lumMod val="65000"/>
+              </a:schemeClr>
+            </a:solidFill>
+          </a:ln>
+        </p:spPr>
+        <p:style>
+          <a:lnRef idx="2">
+            <a:schemeClr val="accent1">
+              <a:shade val="50000"/>
+            </a:schemeClr>
+          </a:lnRef>
+          <a:fillRef idx="1">
+            <a:schemeClr val="accent1"/>
+          </a:fillRef>
+          <a:effectRef idx="0">
+            <a:schemeClr val="accent1"/>
+          </a:effectRef>
+          <a:fontRef idx="minor">
+            <a:schemeClr val="lt1"/>
+          </a:fontRef>
+        </p:style>
+        <p:txBody>
+          <a:bodyPr rtlCol="0" anchor="ctr"/>
+          <a:lstStyle/>
+          <a:p>
+            <a:pPr algn="ctr"/>
+            <a:endParaRPr lang="zh-CN" altLang="en-US"/>
+          </a:p>
+        </p:txBody>
+      </p:sp>
+      <p:sp>
+        <p:nvSpPr>
+          <p:cNvPr id="29" name="下箭头 28"/>
+          <p:cNvSpPr/>
+          <p:nvPr/>
+        </p:nvSpPr>
+        <p:spPr>
+          <a:xfrm>
+            <a:off x="3134410" y="5322320"/>
+            <a:ext cx="288032" cy="216024"/>
+          </a:xfrm>
+          <a:prstGeom prst="downArrow">
+            <a:avLst/>
+          </a:prstGeom>
+          <a:solidFill>
+            <a:schemeClr val="bg1">
+              <a:lumMod val="95000"/>
+            </a:schemeClr>
+          </a:solidFill>
+          <a:ln w="6350">
+            <a:solidFill>
+              <a:schemeClr val="bg1">
+                <a:lumMod val="65000"/>
+              </a:schemeClr>
+            </a:solidFill>
+          </a:ln>
+        </p:spPr>
+        <p:style>
+          <a:lnRef idx="2">
+            <a:schemeClr val="accent1">
+              <a:shade val="50000"/>
+            </a:schemeClr>
+          </a:lnRef>
+          <a:fillRef idx="1">
+            <a:schemeClr val="accent1"/>
+          </a:fillRef>
+          <a:effectRef idx="0">
+            <a:schemeClr val="accent1"/>
+          </a:effectRef>
+          <a:fontRef idx="minor">
+            <a:schemeClr val="lt1"/>
+          </a:fontRef>
+        </p:style>
+        <p:txBody>
+          <a:bodyPr rtlCol="0" anchor="ctr"/>
+          <a:lstStyle/>
+          <a:p>
+            <a:pPr algn="ctr"/>
+            <a:endParaRPr lang="zh-CN" altLang="en-US"/>
+          </a:p>
+        </p:txBody>
+      </p:sp>
+      <p:sp>
+        <p:nvSpPr>
+          <p:cNvPr id="30" name="下箭头 29"/>
+          <p:cNvSpPr/>
+          <p:nvPr/>
+        </p:nvSpPr>
+        <p:spPr>
+          <a:xfrm>
+            <a:off x="3134410" y="6149969"/>
+            <a:ext cx="288032" cy="216024"/>
+          </a:xfrm>
+          <a:prstGeom prst="downArrow">
+            <a:avLst/>
+          </a:prstGeom>
+          <a:solidFill>
+            <a:schemeClr val="bg1">
+              <a:lumMod val="95000"/>
+            </a:schemeClr>
+          </a:solidFill>
+          <a:ln w="6350">
+            <a:solidFill>
+              <a:schemeClr val="bg1">
+                <a:lumMod val="65000"/>
+              </a:schemeClr>
+            </a:solidFill>
+          </a:ln>
+        </p:spPr>
+        <p:style>
+          <a:lnRef idx="2">
+            <a:schemeClr val="accent1">
+              <a:shade val="50000"/>
+            </a:schemeClr>
+          </a:lnRef>
+          <a:fillRef idx="1">
+            <a:schemeClr val="accent1"/>
+          </a:fillRef>
+          <a:effectRef idx="0">
+            <a:schemeClr val="accent1"/>
+          </a:effectRef>
+          <a:fontRef idx="minor">
+            <a:schemeClr val="lt1"/>
+          </a:fontRef>
+        </p:style>
+        <p:txBody>
+          <a:bodyPr rtlCol="0" anchor="ctr"/>
+          <a:lstStyle/>
+          <a:p>
+            <a:pPr algn="ctr"/>
+            <a:endParaRPr lang="zh-CN" altLang="en-US"/>
+          </a:p>
+        </p:txBody>
+      </p:sp>
+      <p:sp>
+        <p:nvSpPr>
+          <p:cNvPr id="31" name="下箭头 30"/>
+          <p:cNvSpPr/>
+          <p:nvPr/>
+        </p:nvSpPr>
+        <p:spPr>
+          <a:xfrm>
+            <a:off x="3134410" y="6995203"/>
+            <a:ext cx="288032" cy="216024"/>
+          </a:xfrm>
+          <a:prstGeom prst="downArrow">
+            <a:avLst/>
+          </a:prstGeom>
+          <a:solidFill>
+            <a:schemeClr val="bg1">
+              <a:lumMod val="95000"/>
+            </a:schemeClr>
+          </a:solidFill>
+          <a:ln w="6350">
+            <a:solidFill>
+              <a:schemeClr val="bg1">
+                <a:lumMod val="65000"/>
+              </a:schemeClr>
+            </a:solidFill>
+          </a:ln>
+        </p:spPr>
+        <p:style>
+          <a:lnRef idx="2">
+            <a:schemeClr val="accent1">
+              <a:shade val="50000"/>
+            </a:schemeClr>
+          </a:lnRef>
+          <a:fillRef idx="1">
+            <a:schemeClr val="accent1"/>
+          </a:fillRef>
+          <a:effectRef idx="0">
+            <a:schemeClr val="accent1"/>
+          </a:effectRef>
+          <a:fontRef idx="minor">
+            <a:schemeClr val="lt1"/>
+          </a:fontRef>
+        </p:style>
+        <p:txBody>
+          <a:bodyPr rtlCol="0" anchor="ctr"/>
+          <a:lstStyle/>
+          <a:p>
+            <a:pPr algn="ctr"/>
+            <a:endParaRPr lang="zh-CN" altLang="en-US"/>
+          </a:p>
+        </p:txBody>
+      </p:sp>
+      <p:cxnSp>
+        <p:nvCxnSpPr>
+          <p:cNvPr id="33" name="肘形连接符 32"/>
+          <p:cNvCxnSpPr>
+            <a:stCxn id="23" idx="3"/>
+            <a:endCxn id="14" idx="3"/>
+          </p:cNvCxnSpPr>
+          <p:nvPr/>
+        </p:nvCxnSpPr>
+        <p:spPr>
+          <a:xfrm flipV="1">
+            <a:off x="4315166" y="4167627"/>
+            <a:ext cx="355471" cy="3372257"/>
+          </a:xfrm>
+          <a:prstGeom prst="bentConnector3">
+            <a:avLst>
+              <a:gd name="adj1" fmla="val 568072"/>
+            </a:avLst>
+          </a:prstGeom>
+          <a:ln w="38100">
+            <a:solidFill>
+              <a:schemeClr val="bg1">
+                <a:lumMod val="65000"/>
+              </a:schemeClr>
+            </a:solidFill>
+            <a:tailEnd type="triangle"/>
+          </a:ln>
+        </p:spPr>
+        <p:style>
+          <a:lnRef idx="1">
+            <a:schemeClr val="accent1"/>
+          </a:lnRef>
+          <a:fillRef idx="0">
+            <a:schemeClr val="accent1"/>
+          </a:fillRef>
+          <a:effectRef idx="0">
+            <a:schemeClr val="accent1"/>
+          </a:effectRef>
+          <a:fontRef idx="minor">
+            <a:schemeClr val="tx1"/>
+          </a:fontRef>
+        </p:style>
+      </p:cxnSp>
+      <p:sp>
+        <p:nvSpPr>
+          <p:cNvPr id="35" name="文本框 34"/>
+          <p:cNvSpPr txBox="1"/>
+          <p:nvPr/>
+        </p:nvSpPr>
+        <p:spPr>
+          <a:xfrm>
+            <a:off x="6303875" y="5337707"/>
+            <a:ext cx="1020724" cy="338554"/>
+          </a:xfrm>
+          <a:prstGeom prst="rect">
+            <a:avLst/>
+          </a:prstGeom>
+          <a:noFill/>
+        </p:spPr>
+        <p:txBody>
+          <a:bodyPr wrap="square" rtlCol="0">
+            <a:spAutoFit/>
+          </a:bodyPr>
+          <a:lstStyle/>
+          <a:p>
+            <a:r>
+              <a:rPr lang="en-US" altLang="zh-CN" sz="1600" b="1" dirty="0"/>
+              <a:t>optimizer</a:t>
+            </a:r>
+            <a:endParaRPr lang="zh-CN" altLang="en-US" sz="1600" b="1" dirty="0"/>
+          </a:p>
+        </p:txBody>
+      </p:sp>
+      <p:sp>
+        <p:nvSpPr>
+          <p:cNvPr id="36" name="文本框 35"/>
+          <p:cNvSpPr txBox="1"/>
+          <p:nvPr/>
+        </p:nvSpPr>
+        <p:spPr>
+          <a:xfrm>
+            <a:off x="5876688" y="3502131"/>
+            <a:ext cx="1685973" cy="338554"/>
+          </a:xfrm>
+          <a:prstGeom prst="rect">
+            <a:avLst/>
+          </a:prstGeom>
+          <a:noFill/>
+        </p:spPr>
+        <p:txBody>
+          <a:bodyPr wrap="square" rtlCol="0">
+            <a:spAutoFit/>
+          </a:bodyPr>
+          <a:lstStyle/>
+          <a:p>
+            <a:r>
+              <a:rPr lang="en-US" altLang="zh-CN" sz="1600" b="1" dirty="0" smtClean="0">
+                <a:solidFill>
+                  <a:schemeClr val="accent6">
+                    <a:lumMod val="75000"/>
+                  </a:schemeClr>
+                </a:solidFill>
+              </a:rPr>
+              <a:t>Training Epochs</a:t>
+            </a:r>
+            <a:endParaRPr lang="zh-CN" altLang="en-US" sz="1600" b="1" dirty="0">
+              <a:solidFill>
+                <a:schemeClr val="accent6">
+                  <a:lumMod val="75000"/>
+                </a:schemeClr>
+              </a:solidFill>
+            </a:endParaRPr>
+          </a:p>
+        </p:txBody>
+      </p:sp>
+      <p:sp>
+        <p:nvSpPr>
+          <p:cNvPr id="37" name="矩形 36"/>
+          <p:cNvSpPr/>
+          <p:nvPr/>
+        </p:nvSpPr>
+        <p:spPr>
+          <a:xfrm>
+            <a:off x="2123728" y="3854370"/>
+            <a:ext cx="5260920" cy="4074288"/>
+          </a:xfrm>
+          <a:prstGeom prst="rect">
+            <a:avLst/>
+          </a:prstGeom>
+          <a:noFill/>
+          <a:ln w="12700">
+            <a:solidFill>
+              <a:schemeClr val="accent6">
+                <a:lumMod val="75000"/>
+              </a:schemeClr>
+            </a:solidFill>
+            <a:prstDash val="dash"/>
+          </a:ln>
+        </p:spPr>
+        <p:style>
+          <a:lnRef idx="2">
+            <a:schemeClr val="accent1">
+              <a:shade val="50000"/>
+            </a:schemeClr>
+          </a:lnRef>
+          <a:fillRef idx="1">
+            <a:schemeClr val="accent1"/>
+          </a:fillRef>
+          <a:effectRef idx="0">
+            <a:schemeClr val="accent1"/>
+          </a:effectRef>
+          <a:fontRef idx="minor">
+            <a:schemeClr val="lt1"/>
+          </a:fontRef>
+        </p:style>
+        <p:txBody>
+          <a:bodyPr rtlCol="0" anchor="ctr"/>
+          <a:lstStyle/>
+          <a:p>
+            <a:pPr algn="ctr"/>
+            <a:endParaRPr lang="zh-CN" altLang="en-US"/>
+          </a:p>
+        </p:txBody>
+      </p:sp>
+      <p:sp>
+        <p:nvSpPr>
+          <p:cNvPr id="39" name="右大括号 38"/>
+          <p:cNvSpPr/>
+          <p:nvPr/>
+        </p:nvSpPr>
+        <p:spPr>
+          <a:xfrm>
+            <a:off x="4503932" y="632816"/>
+            <a:ext cx="166706" cy="2709460"/>
+          </a:xfrm>
+          <a:prstGeom prst="rightBrace">
+            <a:avLst>
+              <a:gd name="adj1" fmla="val 60407"/>
+              <a:gd name="adj2" fmla="val 50000"/>
+            </a:avLst>
+          </a:prstGeom>
+          <a:ln>
+            <a:solidFill>
+              <a:schemeClr val="accent5">
+                <a:lumMod val="75000"/>
+              </a:schemeClr>
+            </a:solidFill>
+          </a:ln>
+        </p:spPr>
+        <p:style>
+          <a:lnRef idx="1">
+            <a:schemeClr val="accent1"/>
+          </a:lnRef>
+          <a:fillRef idx="0">
+            <a:schemeClr val="accent1"/>
+          </a:fillRef>
+          <a:effectRef idx="0">
+            <a:schemeClr val="accent1"/>
+          </a:effectRef>
+          <a:fontRef idx="minor">
+            <a:schemeClr val="tx1"/>
+          </a:fontRef>
+        </p:style>
+        <p:txBody>
+          <a:bodyPr rtlCol="0" anchor="ctr"/>
+          <a:lstStyle/>
+          <a:p>
+            <a:pPr algn="ctr"/>
+            <a:endParaRPr lang="zh-CN" altLang="en-US"/>
+          </a:p>
+        </p:txBody>
+      </p:sp>
+      <p:sp>
+        <p:nvSpPr>
+          <p:cNvPr id="40" name="文本框 39"/>
+          <p:cNvSpPr txBox="1"/>
+          <p:nvPr/>
+        </p:nvSpPr>
+        <p:spPr>
+          <a:xfrm>
+            <a:off x="4769665" y="1818269"/>
+            <a:ext cx="2682655" cy="338554"/>
+          </a:xfrm>
+          <a:prstGeom prst="rect">
+            <a:avLst/>
+          </a:prstGeom>
+          <a:noFill/>
+        </p:spPr>
+        <p:txBody>
+          <a:bodyPr wrap="square" rtlCol="0">
+            <a:spAutoFit/>
+          </a:bodyPr>
+          <a:lstStyle/>
+          <a:p>
+            <a:r>
+              <a:rPr lang="en-US" altLang="zh-CN" sz="1600" b="1" dirty="0" smtClean="0">
+                <a:solidFill>
+                  <a:schemeClr val="accent5">
+                    <a:lumMod val="75000"/>
+                  </a:schemeClr>
+                </a:solidFill>
+              </a:rPr>
+              <a:t>Data Reprocessing</a:t>
+            </a:r>
+            <a:endParaRPr lang="zh-CN" altLang="en-US" sz="1600" b="1" dirty="0">
+              <a:solidFill>
+                <a:schemeClr val="accent5">
+                  <a:lumMod val="75000"/>
+                </a:schemeClr>
+              </a:solidFill>
+            </a:endParaRPr>
+          </a:p>
+        </p:txBody>
+      </p:sp>
+      <p:sp>
+        <p:nvSpPr>
+          <p:cNvPr id="41" name="下箭头 40"/>
+          <p:cNvSpPr/>
+          <p:nvPr/>
+        </p:nvSpPr>
+        <p:spPr>
+          <a:xfrm>
+            <a:off x="3134410" y="8003943"/>
+            <a:ext cx="288032" cy="216024"/>
+          </a:xfrm>
+          <a:prstGeom prst="downArrow">
+            <a:avLst/>
+          </a:prstGeom>
+          <a:solidFill>
+            <a:schemeClr val="bg1">
+              <a:lumMod val="95000"/>
+            </a:schemeClr>
+          </a:solidFill>
+          <a:ln w="6350">
+            <a:solidFill>
+              <a:schemeClr val="bg1">
+                <a:lumMod val="65000"/>
+              </a:schemeClr>
+            </a:solidFill>
+          </a:ln>
+        </p:spPr>
+        <p:style>
+          <a:lnRef idx="2">
+            <a:schemeClr val="accent1">
+              <a:shade val="50000"/>
+            </a:schemeClr>
+          </a:lnRef>
+          <a:fillRef idx="1">
+            <a:schemeClr val="accent1"/>
+          </a:fillRef>
+          <a:effectRef idx="0">
+            <a:schemeClr val="accent1"/>
+          </a:effectRef>
+          <a:fontRef idx="minor">
+            <a:schemeClr val="lt1"/>
+          </a:fontRef>
+        </p:style>
+        <p:txBody>
+          <a:bodyPr rtlCol="0" anchor="ctr"/>
+          <a:lstStyle/>
+          <a:p>
+            <a:pPr algn="ctr"/>
+            <a:endParaRPr lang="zh-CN" altLang="en-US"/>
+          </a:p>
+        </p:txBody>
+      </p:sp>
+      <p:sp>
+        <p:nvSpPr>
+          <p:cNvPr id="42" name="圆角矩形 41"/>
+          <p:cNvSpPr/>
+          <p:nvPr/>
+        </p:nvSpPr>
+        <p:spPr>
+          <a:xfrm>
+            <a:off x="2423784" y="8250536"/>
             <a:ext cx="1856629" cy="504056"/>
           </a:xfrm>
           <a:prstGeom prst="roundRect">
@@ -14802,14 +15998,14 @@
       </p:sp>
       <p:sp>
         <p:nvSpPr>
-          <p:cNvPr id="11" name="文本框 10"/>
+          <p:cNvPr id="43" name="文本框 42"/>
           <p:cNvSpPr txBox="1"/>
           <p:nvPr/>
         </p:nvSpPr>
         <p:spPr>
           <a:xfrm>
-            <a:off x="2490518" y="4110194"/>
-            <a:ext cx="1796133" cy="584775"/>
+            <a:off x="2363435" y="8213004"/>
+            <a:ext cx="1849865" cy="584775"/>
           </a:xfrm>
           <a:prstGeom prst="rect">
             <a:avLst/>
@@ -14822,19 +16018,17 @@
           </a:bodyPr>
           <a:lstStyle/>
           <a:p>
+            <a:pPr algn="ctr"/>
             <a:r>
               <a:rPr lang="en-US" altLang="zh-CN" sz="1600" dirty="0" smtClean="0"/>
-              <a:t>Logistic Regression</a:t>
-            </a:r>
-          </a:p>
-          <a:p>
-            <a:r>
-              <a:rPr lang="en-US" altLang="zh-CN" sz="1600" dirty="0" err="1"/>
-              <a:t>tf.matmul</a:t>
-            </a:r>
-            <a:r>
-              <a:rPr lang="en-US" altLang="zh-CN" sz="1600" dirty="0"/>
-              <a:t>(x, W) + b</a:t>
+              <a:t>Accuracy of Training</a:t>
+            </a:r>
+          </a:p>
+          <a:p>
+            <a:pPr algn="ctr"/>
+            <a:r>
+              <a:rPr lang="en-US" altLang="zh-CN" sz="1600" dirty="0" smtClean="0"/>
+              <a:t>&amp; Test Data</a:t>
             </a:r>
             <a:endParaRPr lang="zh-CN" altLang="en-US" sz="1600" dirty="0"/>
           </a:p>
@@ -14842,118 +16036,14 @@
       </p:sp>
       <p:sp>
         <p:nvSpPr>
-          <p:cNvPr id="12" name="圆角矩形 11"/>
-          <p:cNvSpPr/>
-          <p:nvPr/>
-        </p:nvSpPr>
-        <p:spPr>
-          <a:xfrm>
-            <a:off x="2411760" y="5042179"/>
-            <a:ext cx="1856629" cy="504056"/>
-          </a:xfrm>
-          <a:prstGeom prst="roundRect">
-            <a:avLst>
-              <a:gd name="adj" fmla="val 12088"/>
-            </a:avLst>
-          </a:prstGeom>
-        </p:spPr>
-        <p:style>
-          <a:lnRef idx="1">
-            <a:schemeClr val="accent5"/>
-          </a:lnRef>
-          <a:fillRef idx="2">
-            <a:schemeClr val="accent5"/>
-          </a:fillRef>
-          <a:effectRef idx="1">
-            <a:schemeClr val="accent5"/>
-          </a:effectRef>
-          <a:fontRef idx="minor">
-            <a:schemeClr val="dk1"/>
-          </a:fontRef>
-        </p:style>
-        <p:txBody>
-          <a:bodyPr rtlCol="0" anchor="ctr"/>
-          <a:lstStyle/>
-          <a:p>
-            <a:pPr algn="ctr"/>
-            <a:endParaRPr lang="zh-CN" altLang="en-US" sz="1600">
-              <a:solidFill>
-                <a:schemeClr val="tx1"/>
-              </a:solidFill>
-            </a:endParaRPr>
-          </a:p>
-        </p:txBody>
-      </p:sp>
-      <p:sp>
-        <p:nvSpPr>
-          <p:cNvPr id="13" name="文本框 12"/>
+          <p:cNvPr id="45" name="文本框 44"/>
           <p:cNvSpPr txBox="1"/>
           <p:nvPr/>
         </p:nvSpPr>
         <p:spPr>
           <a:xfrm>
-            <a:off x="2839203" y="5124930"/>
-            <a:ext cx="878446" cy="338554"/>
-          </a:xfrm>
-          <a:prstGeom prst="rect">
-            <a:avLst/>
-          </a:prstGeom>
-          <a:noFill/>
-        </p:spPr>
-        <p:txBody>
-          <a:bodyPr wrap="none" rtlCol="0">
-            <a:spAutoFit/>
-          </a:bodyPr>
-          <a:lstStyle/>
-          <a:p>
-            <a:r>
-              <a:rPr lang="en-US" altLang="zh-CN" sz="1600" dirty="0" err="1" smtClean="0"/>
-              <a:t>SoftMax</a:t>
-            </a:r>
-            <a:endParaRPr lang="zh-CN" altLang="en-US" sz="1600" dirty="0"/>
-          </a:p>
-        </p:txBody>
-      </p:sp>
-      <p:sp>
-        <p:nvSpPr>
-          <p:cNvPr id="14" name="文本框 13"/>
-          <p:cNvSpPr txBox="1"/>
-          <p:nvPr/>
-        </p:nvSpPr>
-        <p:spPr>
-          <a:xfrm>
-            <a:off x="4378569" y="4222758"/>
-            <a:ext cx="284052" cy="338554"/>
-          </a:xfrm>
-          <a:prstGeom prst="rect">
-            <a:avLst/>
-          </a:prstGeom>
-          <a:noFill/>
-        </p:spPr>
-        <p:txBody>
-          <a:bodyPr wrap="none" rtlCol="0">
-            <a:spAutoFit/>
-          </a:bodyPr>
-          <a:lstStyle/>
-          <a:p>
-            <a:r>
-              <a:rPr lang="en-US" altLang="zh-CN" sz="1600" dirty="0" smtClean="0"/>
-              <a:t>Y</a:t>
-            </a:r>
-            <a:endParaRPr lang="zh-CN" altLang="en-US" sz="1600" dirty="0"/>
-          </a:p>
-        </p:txBody>
-      </p:sp>
-      <p:sp>
-        <p:nvSpPr>
-          <p:cNvPr id="15" name="文本框 14"/>
-          <p:cNvSpPr txBox="1"/>
-          <p:nvPr/>
-        </p:nvSpPr>
-        <p:spPr>
-          <a:xfrm>
-            <a:off x="4378568" y="5110781"/>
-            <a:ext cx="1849615" cy="338554"/>
+            <a:off x="4378568" y="8327628"/>
+            <a:ext cx="1685973" cy="338554"/>
           </a:xfrm>
           <a:prstGeom prst="rect">
             <a:avLst/>
@@ -14967,114 +16057,22 @@
           <a:lstStyle/>
           <a:p>
             <a:r>
-              <a:rPr lang="en-US" altLang="zh-CN" sz="1600" dirty="0" smtClean="0"/>
-              <a:t>probability of Y</a:t>
-            </a:r>
-            <a:endParaRPr lang="zh-CN" altLang="en-US" sz="1600" dirty="0"/>
-          </a:p>
-        </p:txBody>
-      </p:sp>
-      <p:sp>
-        <p:nvSpPr>
-          <p:cNvPr id="17" name="圆角矩形 16"/>
-          <p:cNvSpPr/>
-          <p:nvPr/>
-        </p:nvSpPr>
-        <p:spPr>
-          <a:xfrm>
-            <a:off x="2423784" y="5994246"/>
-            <a:ext cx="1856629" cy="504056"/>
-          </a:xfrm>
-          <a:prstGeom prst="roundRect">
-            <a:avLst>
-              <a:gd name="adj" fmla="val 12088"/>
-            </a:avLst>
-          </a:prstGeom>
-        </p:spPr>
-        <p:style>
-          <a:lnRef idx="1">
-            <a:schemeClr val="accent5"/>
-          </a:lnRef>
-          <a:fillRef idx="2">
-            <a:schemeClr val="accent5"/>
-          </a:fillRef>
-          <a:effectRef idx="1">
-            <a:schemeClr val="accent5"/>
-          </a:effectRef>
-          <a:fontRef idx="minor">
-            <a:schemeClr val="dk1"/>
-          </a:fontRef>
-        </p:style>
-        <p:txBody>
-          <a:bodyPr rtlCol="0" anchor="ctr"/>
-          <a:lstStyle/>
-          <a:p>
-            <a:pPr algn="ctr"/>
-            <a:endParaRPr lang="zh-CN" altLang="en-US" sz="1600">
+              <a:rPr lang="en-US" altLang="zh-CN" sz="1600" b="1" dirty="0" smtClean="0">
+                <a:solidFill>
+                  <a:schemeClr val="accent5">
+                    <a:lumMod val="75000"/>
+                  </a:schemeClr>
+                </a:solidFill>
+              </a:rPr>
+              <a:t>Evaluate</a:t>
+            </a:r>
+            <a:endParaRPr lang="zh-CN" altLang="en-US" sz="1600" b="1" dirty="0">
               <a:solidFill>
-                <a:schemeClr val="tx1"/>
+                <a:schemeClr val="accent5">
+                  <a:lumMod val="75000"/>
+                </a:schemeClr>
               </a:solidFill>
             </a:endParaRPr>
-          </a:p>
-        </p:txBody>
-      </p:sp>
-      <p:sp>
-        <p:nvSpPr>
-          <p:cNvPr id="18" name="文本框 17"/>
-          <p:cNvSpPr txBox="1"/>
-          <p:nvPr/>
-        </p:nvSpPr>
-        <p:spPr>
-          <a:xfrm>
-            <a:off x="2670939" y="6076997"/>
-            <a:ext cx="1332416" cy="338554"/>
-          </a:xfrm>
-          <a:prstGeom prst="rect">
-            <a:avLst/>
-          </a:prstGeom>
-          <a:noFill/>
-        </p:spPr>
-        <p:txBody>
-          <a:bodyPr wrap="none" rtlCol="0">
-            <a:spAutoFit/>
-          </a:bodyPr>
-          <a:lstStyle/>
-          <a:p>
-            <a:r>
-              <a:rPr lang="en-US" altLang="zh-CN" sz="1600" dirty="0" smtClean="0"/>
-              <a:t>Cross Entropy</a:t>
-            </a:r>
-            <a:endParaRPr lang="zh-CN" altLang="en-US" sz="1600" dirty="0"/>
-          </a:p>
-        </p:txBody>
-      </p:sp>
-      <p:sp>
-        <p:nvSpPr>
-          <p:cNvPr id="19" name="文本框 18"/>
-          <p:cNvSpPr txBox="1"/>
-          <p:nvPr/>
-        </p:nvSpPr>
-        <p:spPr>
-          <a:xfrm>
-            <a:off x="4398288" y="6083349"/>
-            <a:ext cx="789934" cy="338554"/>
-          </a:xfrm>
-          <a:prstGeom prst="rect">
-            <a:avLst/>
-          </a:prstGeom>
-          <a:noFill/>
-        </p:spPr>
-        <p:txBody>
-          <a:bodyPr wrap="square" rtlCol="0">
-            <a:spAutoFit/>
-          </a:bodyPr>
-          <a:lstStyle/>
-          <a:p>
-            <a:r>
-              <a:rPr lang="en-US" altLang="zh-CN" sz="1600" dirty="0" smtClean="0"/>
-              <a:t>Loss</a:t>
-            </a:r>
-            <a:endParaRPr lang="zh-CN" altLang="en-US" sz="1600" dirty="0"/>
           </a:p>
         </p:txBody>
       </p:sp>

</xml_diff>

<commit_message>
complete code  of logistic regression
</commit_message>
<xml_diff>
--- a/ppt/tf.reduce_mean.pptx
+++ b/ppt/tf.reduce_mean.pptx
@@ -327,7 +327,7 @@
           <a:p>
             <a:fld id="{154D151C-2C25-4305-8E14-82B64FCC1564}" type="datetimeFigureOut">
               <a:rPr lang="zh-CN" altLang="en-US" smtClean="0"/>
-              <a:t>2020-08-04</a:t>
+              <a:t>2020-08-06</a:t>
             </a:fld>
             <a:endParaRPr lang="zh-CN" altLang="en-US"/>
           </a:p>
@@ -497,7 +497,7 @@
           <a:p>
             <a:fld id="{154D151C-2C25-4305-8E14-82B64FCC1564}" type="datetimeFigureOut">
               <a:rPr lang="zh-CN" altLang="en-US" smtClean="0"/>
-              <a:t>2020-08-04</a:t>
+              <a:t>2020-08-06</a:t>
             </a:fld>
             <a:endParaRPr lang="zh-CN" altLang="en-US"/>
           </a:p>
@@ -677,7 +677,7 @@
           <a:p>
             <a:fld id="{154D151C-2C25-4305-8E14-82B64FCC1564}" type="datetimeFigureOut">
               <a:rPr lang="zh-CN" altLang="en-US" smtClean="0"/>
-              <a:t>2020-08-04</a:t>
+              <a:t>2020-08-06</a:t>
             </a:fld>
             <a:endParaRPr lang="zh-CN" altLang="en-US"/>
           </a:p>
@@ -1107,7 +1107,7 @@
           <a:p>
             <a:fld id="{154D151C-2C25-4305-8E14-82B64FCC1564}" type="datetimeFigureOut">
               <a:rPr lang="zh-CN" altLang="en-US" smtClean="0"/>
-              <a:t>2020-08-04</a:t>
+              <a:t>2020-08-06</a:t>
             </a:fld>
             <a:endParaRPr lang="zh-CN" altLang="en-US"/>
           </a:p>
@@ -1353,7 +1353,7 @@
           <a:p>
             <a:fld id="{154D151C-2C25-4305-8E14-82B64FCC1564}" type="datetimeFigureOut">
               <a:rPr lang="zh-CN" altLang="en-US" smtClean="0"/>
-              <a:t>2020-08-04</a:t>
+              <a:t>2020-08-06</a:t>
             </a:fld>
             <a:endParaRPr lang="zh-CN" altLang="en-US"/>
           </a:p>
@@ -1641,7 +1641,7 @@
           <a:p>
             <a:fld id="{154D151C-2C25-4305-8E14-82B64FCC1564}" type="datetimeFigureOut">
               <a:rPr lang="zh-CN" altLang="en-US" smtClean="0"/>
-              <a:t>2020-08-04</a:t>
+              <a:t>2020-08-06</a:t>
             </a:fld>
             <a:endParaRPr lang="zh-CN" altLang="en-US"/>
           </a:p>
@@ -2063,7 +2063,7 @@
           <a:p>
             <a:fld id="{154D151C-2C25-4305-8E14-82B64FCC1564}" type="datetimeFigureOut">
               <a:rPr lang="zh-CN" altLang="en-US" smtClean="0"/>
-              <a:t>2020-08-04</a:t>
+              <a:t>2020-08-06</a:t>
             </a:fld>
             <a:endParaRPr lang="zh-CN" altLang="en-US"/>
           </a:p>
@@ -2181,7 +2181,7 @@
           <a:p>
             <a:fld id="{154D151C-2C25-4305-8E14-82B64FCC1564}" type="datetimeFigureOut">
               <a:rPr lang="zh-CN" altLang="en-US" smtClean="0"/>
-              <a:t>2020-08-04</a:t>
+              <a:t>2020-08-06</a:t>
             </a:fld>
             <a:endParaRPr lang="zh-CN" altLang="en-US"/>
           </a:p>
@@ -2276,7 +2276,7 @@
           <a:p>
             <a:fld id="{154D151C-2C25-4305-8E14-82B64FCC1564}" type="datetimeFigureOut">
               <a:rPr lang="zh-CN" altLang="en-US" smtClean="0"/>
-              <a:t>2020-08-04</a:t>
+              <a:t>2020-08-06</a:t>
             </a:fld>
             <a:endParaRPr lang="zh-CN" altLang="en-US"/>
           </a:p>
@@ -2553,7 +2553,7 @@
           <a:p>
             <a:fld id="{154D151C-2C25-4305-8E14-82B64FCC1564}" type="datetimeFigureOut">
               <a:rPr lang="zh-CN" altLang="en-US" smtClean="0"/>
-              <a:t>2020-08-04</a:t>
+              <a:t>2020-08-06</a:t>
             </a:fld>
             <a:endParaRPr lang="zh-CN" altLang="en-US"/>
           </a:p>
@@ -2806,7 +2806,7 @@
           <a:p>
             <a:fld id="{154D151C-2C25-4305-8E14-82B64FCC1564}" type="datetimeFigureOut">
               <a:rPr lang="zh-CN" altLang="en-US" smtClean="0"/>
-              <a:t>2020-08-04</a:t>
+              <a:t>2020-08-06</a:t>
             </a:fld>
             <a:endParaRPr lang="zh-CN" altLang="en-US"/>
           </a:p>
@@ -3019,7 +3019,7 @@
           <a:p>
             <a:fld id="{154D151C-2C25-4305-8E14-82B64FCC1564}" type="datetimeFigureOut">
               <a:rPr lang="zh-CN" altLang="en-US" smtClean="0"/>
-              <a:t>2020-08-04</a:t>
+              <a:t>2020-08-06</a:t>
             </a:fld>
             <a:endParaRPr lang="zh-CN" altLang="en-US"/>
           </a:p>
@@ -15818,7 +15818,7 @@
         </p:nvSpPr>
         <p:spPr>
           <a:xfrm>
-            <a:off x="4503932" y="632816"/>
+            <a:off x="6016100" y="632816"/>
             <a:ext cx="166706" cy="2709460"/>
           </a:xfrm>
           <a:prstGeom prst="rightBrace">
@@ -15866,7 +15866,7 @@
         </p:nvSpPr>
         <p:spPr>
           <a:xfrm>
-            <a:off x="4769665" y="1818269"/>
+            <a:off x="6281833" y="1818269"/>
             <a:ext cx="2682655" cy="338554"/>
           </a:xfrm>
           <a:prstGeom prst="rect">
@@ -16073,6 +16073,74 @@
                 </a:schemeClr>
               </a:solidFill>
             </a:endParaRPr>
+          </a:p>
+        </p:txBody>
+      </p:sp>
+      <p:sp>
+        <p:nvSpPr>
+          <p:cNvPr id="44" name="文本框 43"/>
+          <p:cNvSpPr txBox="1"/>
+          <p:nvPr/>
+        </p:nvSpPr>
+        <p:spPr>
+          <a:xfrm>
+            <a:off x="4378568" y="1407725"/>
+            <a:ext cx="1849615" cy="338554"/>
+          </a:xfrm>
+          <a:prstGeom prst="rect">
+            <a:avLst/>
+          </a:prstGeom>
+          <a:noFill/>
+        </p:spPr>
+        <p:txBody>
+          <a:bodyPr wrap="square" rtlCol="0">
+            <a:spAutoFit/>
+          </a:bodyPr>
+          <a:lstStyle/>
+          <a:p>
+            <a:r>
+              <a:rPr lang="en-US" altLang="zh-CN" sz="1600" b="1" dirty="0" smtClean="0"/>
+              <a:t>(?,28,28)</a:t>
+            </a:r>
+            <a:r>
+              <a:rPr lang="zh-CN" altLang="en-US" sz="1600" b="1" dirty="0" smtClean="0"/>
+              <a:t>→</a:t>
+            </a:r>
+            <a:r>
+              <a:rPr lang="en-US" altLang="zh-CN" sz="1600" b="1" dirty="0" smtClean="0"/>
+              <a:t>(?,784)</a:t>
+            </a:r>
+            <a:endParaRPr lang="zh-CN" altLang="en-US" sz="1600" b="1" dirty="0"/>
+          </a:p>
+        </p:txBody>
+      </p:sp>
+      <p:sp>
+        <p:nvSpPr>
+          <p:cNvPr id="47" name="文本框 46"/>
+          <p:cNvSpPr txBox="1"/>
+          <p:nvPr/>
+        </p:nvSpPr>
+        <p:spPr>
+          <a:xfrm>
+            <a:off x="4378568" y="2259936"/>
+            <a:ext cx="1849615" cy="338554"/>
+          </a:xfrm>
+          <a:prstGeom prst="rect">
+            <a:avLst/>
+          </a:prstGeom>
+          <a:noFill/>
+        </p:spPr>
+        <p:txBody>
+          <a:bodyPr wrap="square" rtlCol="0">
+            <a:spAutoFit/>
+          </a:bodyPr>
+          <a:lstStyle/>
+          <a:p>
+            <a:r>
+              <a:rPr lang="en-US" altLang="zh-CN" sz="1600" b="1" dirty="0" smtClean="0"/>
+              <a:t>Gray Scale 1/255</a:t>
+            </a:r>
+            <a:endParaRPr lang="zh-CN" altLang="en-US" sz="1600" b="1" dirty="0"/>
           </a:p>
         </p:txBody>
       </p:sp>

</xml_diff>

<commit_message>
add 2.7 map function
</commit_message>
<xml_diff>
--- a/ppt/tf.reduce_mean.pptx
+++ b/ppt/tf.reduce_mean.pptx
@@ -141,7 +141,7 @@
   </p:defaultTextStyle>
   <p:extLst>
     <p:ext uri="{EFAFB233-063F-42B5-8137-9DF3F51BA10A}">
-      <p15:sldGuideLst xmlns="" xmlns:p15="http://schemas.microsoft.com/office/powerpoint/2012/main">
+      <p15:sldGuideLst xmlns:p15="http://schemas.microsoft.com/office/powerpoint/2012/main" xmlns="">
         <p15:guide id="1" orient="horz" pos="2160">
           <p15:clr>
             <a:srgbClr val="A4A3A4"/>
@@ -339,7 +339,7 @@
           <a:p>
             <a:fld id="{154D151C-2C25-4305-8E14-82B64FCC1564}" type="datetimeFigureOut">
               <a:rPr lang="zh-CN" altLang="en-US" smtClean="0"/>
-              <a:t>2020/9/12</a:t>
+              <a:t>2020/9/28</a:t>
             </a:fld>
             <a:endParaRPr lang="zh-CN" altLang="en-US"/>
           </a:p>
@@ -509,7 +509,7 @@
           <a:p>
             <a:fld id="{154D151C-2C25-4305-8E14-82B64FCC1564}" type="datetimeFigureOut">
               <a:rPr lang="zh-CN" altLang="en-US" smtClean="0"/>
-              <a:t>2020/9/12</a:t>
+              <a:t>2020/9/28</a:t>
             </a:fld>
             <a:endParaRPr lang="zh-CN" altLang="en-US"/>
           </a:p>
@@ -689,7 +689,7 @@
           <a:p>
             <a:fld id="{154D151C-2C25-4305-8E14-82B64FCC1564}" type="datetimeFigureOut">
               <a:rPr lang="zh-CN" altLang="en-US" smtClean="0"/>
-              <a:t>2020/9/12</a:t>
+              <a:t>2020/9/28</a:t>
             </a:fld>
             <a:endParaRPr lang="zh-CN" altLang="en-US"/>
           </a:p>
@@ -1119,7 +1119,7 @@
           <a:p>
             <a:fld id="{154D151C-2C25-4305-8E14-82B64FCC1564}" type="datetimeFigureOut">
               <a:rPr lang="zh-CN" altLang="en-US" smtClean="0"/>
-              <a:t>2020/9/12</a:t>
+              <a:t>2020/9/28</a:t>
             </a:fld>
             <a:endParaRPr lang="zh-CN" altLang="en-US"/>
           </a:p>
@@ -1365,7 +1365,7 @@
           <a:p>
             <a:fld id="{154D151C-2C25-4305-8E14-82B64FCC1564}" type="datetimeFigureOut">
               <a:rPr lang="zh-CN" altLang="en-US" smtClean="0"/>
-              <a:t>2020/9/12</a:t>
+              <a:t>2020/9/28</a:t>
             </a:fld>
             <a:endParaRPr lang="zh-CN" altLang="en-US"/>
           </a:p>
@@ -1653,7 +1653,7 @@
           <a:p>
             <a:fld id="{154D151C-2C25-4305-8E14-82B64FCC1564}" type="datetimeFigureOut">
               <a:rPr lang="zh-CN" altLang="en-US" smtClean="0"/>
-              <a:t>2020/9/12</a:t>
+              <a:t>2020/9/28</a:t>
             </a:fld>
             <a:endParaRPr lang="zh-CN" altLang="en-US"/>
           </a:p>
@@ -2075,7 +2075,7 @@
           <a:p>
             <a:fld id="{154D151C-2C25-4305-8E14-82B64FCC1564}" type="datetimeFigureOut">
               <a:rPr lang="zh-CN" altLang="en-US" smtClean="0"/>
-              <a:t>2020/9/12</a:t>
+              <a:t>2020/9/28</a:t>
             </a:fld>
             <a:endParaRPr lang="zh-CN" altLang="en-US"/>
           </a:p>
@@ -2193,7 +2193,7 @@
           <a:p>
             <a:fld id="{154D151C-2C25-4305-8E14-82B64FCC1564}" type="datetimeFigureOut">
               <a:rPr lang="zh-CN" altLang="en-US" smtClean="0"/>
-              <a:t>2020/9/12</a:t>
+              <a:t>2020/9/28</a:t>
             </a:fld>
             <a:endParaRPr lang="zh-CN" altLang="en-US"/>
           </a:p>
@@ -2288,7 +2288,7 @@
           <a:p>
             <a:fld id="{154D151C-2C25-4305-8E14-82B64FCC1564}" type="datetimeFigureOut">
               <a:rPr lang="zh-CN" altLang="en-US" smtClean="0"/>
-              <a:t>2020/9/12</a:t>
+              <a:t>2020/9/28</a:t>
             </a:fld>
             <a:endParaRPr lang="zh-CN" altLang="en-US"/>
           </a:p>
@@ -2565,7 +2565,7 @@
           <a:p>
             <a:fld id="{154D151C-2C25-4305-8E14-82B64FCC1564}" type="datetimeFigureOut">
               <a:rPr lang="zh-CN" altLang="en-US" smtClean="0"/>
-              <a:t>2020/9/12</a:t>
+              <a:t>2020/9/28</a:t>
             </a:fld>
             <a:endParaRPr lang="zh-CN" altLang="en-US"/>
           </a:p>
@@ -2818,7 +2818,7 @@
           <a:p>
             <a:fld id="{154D151C-2C25-4305-8E14-82B64FCC1564}" type="datetimeFigureOut">
               <a:rPr lang="zh-CN" altLang="en-US" smtClean="0"/>
-              <a:t>2020/9/12</a:t>
+              <a:t>2020/9/28</a:t>
             </a:fld>
             <a:endParaRPr lang="zh-CN" altLang="en-US"/>
           </a:p>
@@ -3031,7 +3031,7 @@
           <a:p>
             <a:fld id="{154D151C-2C25-4305-8E14-82B64FCC1564}" type="datetimeFigureOut">
               <a:rPr lang="zh-CN" altLang="en-US" smtClean="0"/>
-              <a:t>2020/9/12</a:t>
+              <a:t>2020/9/28</a:t>
             </a:fld>
             <a:endParaRPr lang="zh-CN" altLang="en-US"/>
           </a:p>
@@ -16245,35 +16245,35 @@
                 <a:gridCol w="763270">
                   <a:extLst>
                     <a:ext uri="{9D8B030D-6E8A-4147-A177-3AD203B41FA5}">
-                      <a16:colId xmlns="" xmlns:a16="http://schemas.microsoft.com/office/drawing/2014/main" val="3326979791"/>
+                      <a16:colId xmlns:a16="http://schemas.microsoft.com/office/drawing/2014/main" xmlns="" val="3326979791"/>
                     </a:ext>
                   </a:extLst>
                 </a:gridCol>
                 <a:gridCol w="542325">
                   <a:extLst>
                     <a:ext uri="{9D8B030D-6E8A-4147-A177-3AD203B41FA5}">
-                      <a16:colId xmlns="" xmlns:a16="http://schemas.microsoft.com/office/drawing/2014/main" val="637607070"/>
+                      <a16:colId xmlns:a16="http://schemas.microsoft.com/office/drawing/2014/main" xmlns="" val="637607070"/>
                     </a:ext>
                   </a:extLst>
                 </a:gridCol>
                 <a:gridCol w="542325">
                   <a:extLst>
                     <a:ext uri="{9D8B030D-6E8A-4147-A177-3AD203B41FA5}">
-                      <a16:colId xmlns="" xmlns:a16="http://schemas.microsoft.com/office/drawing/2014/main" val="1695508235"/>
+                      <a16:colId xmlns:a16="http://schemas.microsoft.com/office/drawing/2014/main" xmlns="" val="1695508235"/>
                     </a:ext>
                   </a:extLst>
                 </a:gridCol>
                 <a:gridCol w="542325">
                   <a:extLst>
                     <a:ext uri="{9D8B030D-6E8A-4147-A177-3AD203B41FA5}">
-                      <a16:colId xmlns="" xmlns:a16="http://schemas.microsoft.com/office/drawing/2014/main" val="1870987448"/>
+                      <a16:colId xmlns:a16="http://schemas.microsoft.com/office/drawing/2014/main" xmlns="" val="1870987448"/>
                     </a:ext>
                   </a:extLst>
                 </a:gridCol>
                 <a:gridCol w="542325">
                   <a:extLst>
                     <a:ext uri="{9D8B030D-6E8A-4147-A177-3AD203B41FA5}">
-                      <a16:colId xmlns="" xmlns:a16="http://schemas.microsoft.com/office/drawing/2014/main" val="324699617"/>
+                      <a16:colId xmlns:a16="http://schemas.microsoft.com/office/drawing/2014/main" xmlns="" val="324699617"/>
                     </a:ext>
                   </a:extLst>
                 </a:gridCol>
@@ -16641,7 +16641,7 @@
                 </a:tc>
                 <a:extLst>
                   <a:ext uri="{0D108BD9-81ED-4DB2-BD59-A6C34878D82A}">
-                    <a16:rowId xmlns="" xmlns:a16="http://schemas.microsoft.com/office/drawing/2014/main" val="798814532"/>
+                    <a16:rowId xmlns:a16="http://schemas.microsoft.com/office/drawing/2014/main" xmlns="" val="798814532"/>
                   </a:ext>
                 </a:extLst>
               </a:tr>
@@ -16988,7 +16988,7 @@
                 </a:tc>
                 <a:extLst>
                   <a:ext uri="{0D108BD9-81ED-4DB2-BD59-A6C34878D82A}">
-                    <a16:rowId xmlns="" xmlns:a16="http://schemas.microsoft.com/office/drawing/2014/main" val="1491202224"/>
+                    <a16:rowId xmlns:a16="http://schemas.microsoft.com/office/drawing/2014/main" xmlns="" val="1491202224"/>
                   </a:ext>
                 </a:extLst>
               </a:tr>
@@ -17313,7 +17313,7 @@
                 </a:tc>
                 <a:extLst>
                   <a:ext uri="{0D108BD9-81ED-4DB2-BD59-A6C34878D82A}">
-                    <a16:rowId xmlns="" xmlns:a16="http://schemas.microsoft.com/office/drawing/2014/main" val="2457331936"/>
+                    <a16:rowId xmlns:a16="http://schemas.microsoft.com/office/drawing/2014/main" xmlns="" val="2457331936"/>
                   </a:ext>
                 </a:extLst>
               </a:tr>
@@ -17443,35 +17443,35 @@
                 <a:gridCol w="763270">
                   <a:extLst>
                     <a:ext uri="{9D8B030D-6E8A-4147-A177-3AD203B41FA5}">
-                      <a16:colId xmlns="" xmlns:a16="http://schemas.microsoft.com/office/drawing/2014/main" val="3326979791"/>
+                      <a16:colId xmlns:a16="http://schemas.microsoft.com/office/drawing/2014/main" xmlns="" val="3326979791"/>
                     </a:ext>
                   </a:extLst>
                 </a:gridCol>
                 <a:gridCol w="542325">
                   <a:extLst>
                     <a:ext uri="{9D8B030D-6E8A-4147-A177-3AD203B41FA5}">
-                      <a16:colId xmlns="" xmlns:a16="http://schemas.microsoft.com/office/drawing/2014/main" val="637607070"/>
+                      <a16:colId xmlns:a16="http://schemas.microsoft.com/office/drawing/2014/main" xmlns="" val="637607070"/>
                     </a:ext>
                   </a:extLst>
                 </a:gridCol>
                 <a:gridCol w="542325">
                   <a:extLst>
                     <a:ext uri="{9D8B030D-6E8A-4147-A177-3AD203B41FA5}">
-                      <a16:colId xmlns="" xmlns:a16="http://schemas.microsoft.com/office/drawing/2014/main" val="1695508235"/>
+                      <a16:colId xmlns:a16="http://schemas.microsoft.com/office/drawing/2014/main" xmlns="" val="1695508235"/>
                     </a:ext>
                   </a:extLst>
                 </a:gridCol>
                 <a:gridCol w="542325">
                   <a:extLst>
                     <a:ext uri="{9D8B030D-6E8A-4147-A177-3AD203B41FA5}">
-                      <a16:colId xmlns="" xmlns:a16="http://schemas.microsoft.com/office/drawing/2014/main" val="1870987448"/>
+                      <a16:colId xmlns:a16="http://schemas.microsoft.com/office/drawing/2014/main" xmlns="" val="1870987448"/>
                     </a:ext>
                   </a:extLst>
                 </a:gridCol>
                 <a:gridCol w="542325">
                   <a:extLst>
                     <a:ext uri="{9D8B030D-6E8A-4147-A177-3AD203B41FA5}">
-                      <a16:colId xmlns="" xmlns:a16="http://schemas.microsoft.com/office/drawing/2014/main" val="324699617"/>
+                      <a16:colId xmlns:a16="http://schemas.microsoft.com/office/drawing/2014/main" xmlns="" val="324699617"/>
                     </a:ext>
                   </a:extLst>
                 </a:gridCol>
@@ -17839,7 +17839,7 @@
                 </a:tc>
                 <a:extLst>
                   <a:ext uri="{0D108BD9-81ED-4DB2-BD59-A6C34878D82A}">
-                    <a16:rowId xmlns="" xmlns:a16="http://schemas.microsoft.com/office/drawing/2014/main" val="798814532"/>
+                    <a16:rowId xmlns:a16="http://schemas.microsoft.com/office/drawing/2014/main" xmlns="" val="798814532"/>
                   </a:ext>
                 </a:extLst>
               </a:tr>
@@ -18186,7 +18186,7 @@
                 </a:tc>
                 <a:extLst>
                   <a:ext uri="{0D108BD9-81ED-4DB2-BD59-A6C34878D82A}">
-                    <a16:rowId xmlns="" xmlns:a16="http://schemas.microsoft.com/office/drawing/2014/main" val="1491202224"/>
+                    <a16:rowId xmlns:a16="http://schemas.microsoft.com/office/drawing/2014/main" xmlns="" val="1491202224"/>
                   </a:ext>
                 </a:extLst>
               </a:tr>
@@ -18541,7 +18541,7 @@
                 </a:tc>
                 <a:extLst>
                   <a:ext uri="{0D108BD9-81ED-4DB2-BD59-A6C34878D82A}">
-                    <a16:rowId xmlns="" xmlns:a16="http://schemas.microsoft.com/office/drawing/2014/main" val="2457331936"/>
+                    <a16:rowId xmlns:a16="http://schemas.microsoft.com/office/drawing/2014/main" xmlns="" val="2457331936"/>
                   </a:ext>
                 </a:extLst>
               </a:tr>
@@ -18679,35 +18679,35 @@
                 <a:gridCol w="763270">
                   <a:extLst>
                     <a:ext uri="{9D8B030D-6E8A-4147-A177-3AD203B41FA5}">
-                      <a16:colId xmlns="" xmlns:a16="http://schemas.microsoft.com/office/drawing/2014/main" val="3326979791"/>
+                      <a16:colId xmlns:a16="http://schemas.microsoft.com/office/drawing/2014/main" xmlns="" val="3326979791"/>
                     </a:ext>
                   </a:extLst>
                 </a:gridCol>
                 <a:gridCol w="542325">
                   <a:extLst>
                     <a:ext uri="{9D8B030D-6E8A-4147-A177-3AD203B41FA5}">
-                      <a16:colId xmlns="" xmlns:a16="http://schemas.microsoft.com/office/drawing/2014/main" val="637607070"/>
+                      <a16:colId xmlns:a16="http://schemas.microsoft.com/office/drawing/2014/main" xmlns="" val="637607070"/>
                     </a:ext>
                   </a:extLst>
                 </a:gridCol>
                 <a:gridCol w="542325">
                   <a:extLst>
                     <a:ext uri="{9D8B030D-6E8A-4147-A177-3AD203B41FA5}">
-                      <a16:colId xmlns="" xmlns:a16="http://schemas.microsoft.com/office/drawing/2014/main" val="1695508235"/>
+                      <a16:colId xmlns:a16="http://schemas.microsoft.com/office/drawing/2014/main" xmlns="" val="1695508235"/>
                     </a:ext>
                   </a:extLst>
                 </a:gridCol>
                 <a:gridCol w="542325">
                   <a:extLst>
                     <a:ext uri="{9D8B030D-6E8A-4147-A177-3AD203B41FA5}">
-                      <a16:colId xmlns="" xmlns:a16="http://schemas.microsoft.com/office/drawing/2014/main" val="1870987448"/>
+                      <a16:colId xmlns:a16="http://schemas.microsoft.com/office/drawing/2014/main" xmlns="" val="1870987448"/>
                     </a:ext>
                   </a:extLst>
                 </a:gridCol>
                 <a:gridCol w="542325">
                   <a:extLst>
                     <a:ext uri="{9D8B030D-6E8A-4147-A177-3AD203B41FA5}">
-                      <a16:colId xmlns="" xmlns:a16="http://schemas.microsoft.com/office/drawing/2014/main" val="324699617"/>
+                      <a16:colId xmlns:a16="http://schemas.microsoft.com/office/drawing/2014/main" xmlns="" val="324699617"/>
                     </a:ext>
                   </a:extLst>
                 </a:gridCol>
@@ -19075,7 +19075,7 @@
                 </a:tc>
                 <a:extLst>
                   <a:ext uri="{0D108BD9-81ED-4DB2-BD59-A6C34878D82A}">
-                    <a16:rowId xmlns="" xmlns:a16="http://schemas.microsoft.com/office/drawing/2014/main" val="798814532"/>
+                    <a16:rowId xmlns:a16="http://schemas.microsoft.com/office/drawing/2014/main" xmlns="" val="798814532"/>
                   </a:ext>
                 </a:extLst>
               </a:tr>
@@ -19422,7 +19422,7 @@
                 </a:tc>
                 <a:extLst>
                   <a:ext uri="{0D108BD9-81ED-4DB2-BD59-A6C34878D82A}">
-                    <a16:rowId xmlns="" xmlns:a16="http://schemas.microsoft.com/office/drawing/2014/main" val="1491202224"/>
+                    <a16:rowId xmlns:a16="http://schemas.microsoft.com/office/drawing/2014/main" xmlns="" val="1491202224"/>
                   </a:ext>
                 </a:extLst>
               </a:tr>
@@ -19785,7 +19785,7 @@
                 </a:tc>
                 <a:extLst>
                   <a:ext uri="{0D108BD9-81ED-4DB2-BD59-A6C34878D82A}">
-                    <a16:rowId xmlns="" xmlns:a16="http://schemas.microsoft.com/office/drawing/2014/main" val="2457331936"/>
+                    <a16:rowId xmlns:a16="http://schemas.microsoft.com/office/drawing/2014/main" xmlns="" val="2457331936"/>
                   </a:ext>
                 </a:extLst>
               </a:tr>
@@ -20571,7 +20571,7 @@
                 <a:gridCol w="1152128">
                   <a:extLst>
                     <a:ext uri="{9D8B030D-6E8A-4147-A177-3AD203B41FA5}">
-                      <a16:colId xmlns="" xmlns:a16="http://schemas.microsoft.com/office/drawing/2014/main" val="1214683687"/>
+                      <a16:colId xmlns:a16="http://schemas.microsoft.com/office/drawing/2014/main" xmlns="" val="1214683687"/>
                     </a:ext>
                   </a:extLst>
                 </a:gridCol>
@@ -20644,7 +20644,7 @@
                 </a:tc>
                 <a:extLst>
                   <a:ext uri="{0D108BD9-81ED-4DB2-BD59-A6C34878D82A}">
-                    <a16:rowId xmlns="" xmlns:a16="http://schemas.microsoft.com/office/drawing/2014/main" val="1006269131"/>
+                    <a16:rowId xmlns:a16="http://schemas.microsoft.com/office/drawing/2014/main" xmlns="" val="1006269131"/>
                   </a:ext>
                 </a:extLst>
               </a:tr>
@@ -20750,7 +20750,7 @@
                 </a:tc>
                 <a:extLst>
                   <a:ext uri="{0D108BD9-81ED-4DB2-BD59-A6C34878D82A}">
-                    <a16:rowId xmlns="" xmlns:a16="http://schemas.microsoft.com/office/drawing/2014/main" val="194545254"/>
+                    <a16:rowId xmlns:a16="http://schemas.microsoft.com/office/drawing/2014/main" xmlns="" val="194545254"/>
                   </a:ext>
                 </a:extLst>
               </a:tr>
@@ -20856,7 +20856,7 @@
                 </a:tc>
                 <a:extLst>
                   <a:ext uri="{0D108BD9-81ED-4DB2-BD59-A6C34878D82A}">
-                    <a16:rowId xmlns="" xmlns:a16="http://schemas.microsoft.com/office/drawing/2014/main" val="44223002"/>
+                    <a16:rowId xmlns:a16="http://schemas.microsoft.com/office/drawing/2014/main" xmlns="" val="44223002"/>
                   </a:ext>
                 </a:extLst>
               </a:tr>
@@ -20962,7 +20962,7 @@
                 </a:tc>
                 <a:extLst>
                   <a:ext uri="{0D108BD9-81ED-4DB2-BD59-A6C34878D82A}">
-                    <a16:rowId xmlns="" xmlns:a16="http://schemas.microsoft.com/office/drawing/2014/main" val="4268083801"/>
+                    <a16:rowId xmlns:a16="http://schemas.microsoft.com/office/drawing/2014/main" xmlns="" val="4268083801"/>
                   </a:ext>
                 </a:extLst>
               </a:tr>
@@ -21068,7 +21068,7 @@
                 </a:tc>
                 <a:extLst>
                   <a:ext uri="{0D108BD9-81ED-4DB2-BD59-A6C34878D82A}">
-                    <a16:rowId xmlns="" xmlns:a16="http://schemas.microsoft.com/office/drawing/2014/main" val="2987823741"/>
+                    <a16:rowId xmlns:a16="http://schemas.microsoft.com/office/drawing/2014/main" xmlns="" val="2987823741"/>
                   </a:ext>
                 </a:extLst>
               </a:tr>
@@ -21174,7 +21174,7 @@
                 </a:tc>
                 <a:extLst>
                   <a:ext uri="{0D108BD9-81ED-4DB2-BD59-A6C34878D82A}">
-                    <a16:rowId xmlns="" xmlns:a16="http://schemas.microsoft.com/office/drawing/2014/main" val="193482310"/>
+                    <a16:rowId xmlns:a16="http://schemas.microsoft.com/office/drawing/2014/main" xmlns="" val="193482310"/>
                   </a:ext>
                 </a:extLst>
               </a:tr>
@@ -21280,7 +21280,7 @@
                 </a:tc>
                 <a:extLst>
                   <a:ext uri="{0D108BD9-81ED-4DB2-BD59-A6C34878D82A}">
-                    <a16:rowId xmlns="" xmlns:a16="http://schemas.microsoft.com/office/drawing/2014/main" val="589513760"/>
+                    <a16:rowId xmlns:a16="http://schemas.microsoft.com/office/drawing/2014/main" xmlns="" val="589513760"/>
                   </a:ext>
                 </a:extLst>
               </a:tr>
@@ -21386,7 +21386,7 @@
                 </a:tc>
                 <a:extLst>
                   <a:ext uri="{0D108BD9-81ED-4DB2-BD59-A6C34878D82A}">
-                    <a16:rowId xmlns="" xmlns:a16="http://schemas.microsoft.com/office/drawing/2014/main" val="3314464373"/>
+                    <a16:rowId xmlns:a16="http://schemas.microsoft.com/office/drawing/2014/main" xmlns="" val="3314464373"/>
                   </a:ext>
                 </a:extLst>
               </a:tr>
@@ -21492,7 +21492,7 @@
                 </a:tc>
                 <a:extLst>
                   <a:ext uri="{0D108BD9-81ED-4DB2-BD59-A6C34878D82A}">
-                    <a16:rowId xmlns="" xmlns:a16="http://schemas.microsoft.com/office/drawing/2014/main" val="1811545710"/>
+                    <a16:rowId xmlns:a16="http://schemas.microsoft.com/office/drawing/2014/main" xmlns="" val="1811545710"/>
                   </a:ext>
                 </a:extLst>
               </a:tr>
@@ -21598,7 +21598,7 @@
                 </a:tc>
                 <a:extLst>
                   <a:ext uri="{0D108BD9-81ED-4DB2-BD59-A6C34878D82A}">
-                    <a16:rowId xmlns="" xmlns:a16="http://schemas.microsoft.com/office/drawing/2014/main" val="2525566091"/>
+                    <a16:rowId xmlns:a16="http://schemas.microsoft.com/office/drawing/2014/main" xmlns="" val="2525566091"/>
                   </a:ext>
                 </a:extLst>
               </a:tr>
@@ -21704,7 +21704,7 @@
                 </a:tc>
                 <a:extLst>
                   <a:ext uri="{0D108BD9-81ED-4DB2-BD59-A6C34878D82A}">
-                    <a16:rowId xmlns="" xmlns:a16="http://schemas.microsoft.com/office/drawing/2014/main" val="3360797041"/>
+                    <a16:rowId xmlns:a16="http://schemas.microsoft.com/office/drawing/2014/main" xmlns="" val="3360797041"/>
                   </a:ext>
                 </a:extLst>
               </a:tr>
@@ -21776,7 +21776,7 @@
                 </a:tc>
                 <a:extLst>
                   <a:ext uri="{0D108BD9-81ED-4DB2-BD59-A6C34878D82A}">
-                    <a16:rowId xmlns="" xmlns:a16="http://schemas.microsoft.com/office/drawing/2014/main" val="2873669025"/>
+                    <a16:rowId xmlns:a16="http://schemas.microsoft.com/office/drawing/2014/main" xmlns="" val="2873669025"/>
                   </a:ext>
                 </a:extLst>
               </a:tr>
@@ -21848,7 +21848,7 @@
                 </a:tc>
                 <a:extLst>
                   <a:ext uri="{0D108BD9-81ED-4DB2-BD59-A6C34878D82A}">
-                    <a16:rowId xmlns="" xmlns:a16="http://schemas.microsoft.com/office/drawing/2014/main" val="3732079516"/>
+                    <a16:rowId xmlns:a16="http://schemas.microsoft.com/office/drawing/2014/main" xmlns="" val="3732079516"/>
                   </a:ext>
                 </a:extLst>
               </a:tr>
@@ -21920,7 +21920,7 @@
                 </a:tc>
                 <a:extLst>
                   <a:ext uri="{0D108BD9-81ED-4DB2-BD59-A6C34878D82A}">
-                    <a16:rowId xmlns="" xmlns:a16="http://schemas.microsoft.com/office/drawing/2014/main" val="2966636214"/>
+                    <a16:rowId xmlns:a16="http://schemas.microsoft.com/office/drawing/2014/main" xmlns="" val="2966636214"/>
                   </a:ext>
                 </a:extLst>
               </a:tr>
@@ -21992,7 +21992,7 @@
                 </a:tc>
                 <a:extLst>
                   <a:ext uri="{0D108BD9-81ED-4DB2-BD59-A6C34878D82A}">
-                    <a16:rowId xmlns="" xmlns:a16="http://schemas.microsoft.com/office/drawing/2014/main" val="3891840487"/>
+                    <a16:rowId xmlns:a16="http://schemas.microsoft.com/office/drawing/2014/main" xmlns="" val="3891840487"/>
                   </a:ext>
                 </a:extLst>
               </a:tr>
@@ -22028,7 +22028,7 @@
                 <a:gridCol w="1152128">
                   <a:extLst>
                     <a:ext uri="{9D8B030D-6E8A-4147-A177-3AD203B41FA5}">
-                      <a16:colId xmlns="" xmlns:a16="http://schemas.microsoft.com/office/drawing/2014/main" val="1214683687"/>
+                      <a16:colId xmlns:a16="http://schemas.microsoft.com/office/drawing/2014/main" xmlns="" val="1214683687"/>
                     </a:ext>
                   </a:extLst>
                 </a:gridCol>
@@ -22101,7 +22101,7 @@
                 </a:tc>
                 <a:extLst>
                   <a:ext uri="{0D108BD9-81ED-4DB2-BD59-A6C34878D82A}">
-                    <a16:rowId xmlns="" xmlns:a16="http://schemas.microsoft.com/office/drawing/2014/main" val="1006269131"/>
+                    <a16:rowId xmlns:a16="http://schemas.microsoft.com/office/drawing/2014/main" xmlns="" val="1006269131"/>
                   </a:ext>
                 </a:extLst>
               </a:tr>
@@ -22207,7 +22207,7 @@
                 </a:tc>
                 <a:extLst>
                   <a:ext uri="{0D108BD9-81ED-4DB2-BD59-A6C34878D82A}">
-                    <a16:rowId xmlns="" xmlns:a16="http://schemas.microsoft.com/office/drawing/2014/main" val="194545254"/>
+                    <a16:rowId xmlns:a16="http://schemas.microsoft.com/office/drawing/2014/main" xmlns="" val="194545254"/>
                   </a:ext>
                 </a:extLst>
               </a:tr>
@@ -22313,7 +22313,7 @@
                 </a:tc>
                 <a:extLst>
                   <a:ext uri="{0D108BD9-81ED-4DB2-BD59-A6C34878D82A}">
-                    <a16:rowId xmlns="" xmlns:a16="http://schemas.microsoft.com/office/drawing/2014/main" val="44223002"/>
+                    <a16:rowId xmlns:a16="http://schemas.microsoft.com/office/drawing/2014/main" xmlns="" val="44223002"/>
                   </a:ext>
                 </a:extLst>
               </a:tr>
@@ -22419,7 +22419,7 @@
                 </a:tc>
                 <a:extLst>
                   <a:ext uri="{0D108BD9-81ED-4DB2-BD59-A6C34878D82A}">
-                    <a16:rowId xmlns="" xmlns:a16="http://schemas.microsoft.com/office/drawing/2014/main" val="4268083801"/>
+                    <a16:rowId xmlns:a16="http://schemas.microsoft.com/office/drawing/2014/main" xmlns="" val="4268083801"/>
                   </a:ext>
                 </a:extLst>
               </a:tr>
@@ -22525,7 +22525,7 @@
                 </a:tc>
                 <a:extLst>
                   <a:ext uri="{0D108BD9-81ED-4DB2-BD59-A6C34878D82A}">
-                    <a16:rowId xmlns="" xmlns:a16="http://schemas.microsoft.com/office/drawing/2014/main" val="2987823741"/>
+                    <a16:rowId xmlns:a16="http://schemas.microsoft.com/office/drawing/2014/main" xmlns="" val="2987823741"/>
                   </a:ext>
                 </a:extLst>
               </a:tr>
@@ -22631,7 +22631,7 @@
                 </a:tc>
                 <a:extLst>
                   <a:ext uri="{0D108BD9-81ED-4DB2-BD59-A6C34878D82A}">
-                    <a16:rowId xmlns="" xmlns:a16="http://schemas.microsoft.com/office/drawing/2014/main" val="193482310"/>
+                    <a16:rowId xmlns:a16="http://schemas.microsoft.com/office/drawing/2014/main" xmlns="" val="193482310"/>
                   </a:ext>
                 </a:extLst>
               </a:tr>
@@ -22843,7 +22843,7 @@
                 <a:gridCol w="1152128">
                   <a:extLst>
                     <a:ext uri="{9D8B030D-6E8A-4147-A177-3AD203B41FA5}">
-                      <a16:colId xmlns="" xmlns:a16="http://schemas.microsoft.com/office/drawing/2014/main" val="1214683687"/>
+                      <a16:colId xmlns:a16="http://schemas.microsoft.com/office/drawing/2014/main" xmlns="" val="1214683687"/>
                     </a:ext>
                   </a:extLst>
                 </a:gridCol>
@@ -22916,7 +22916,7 @@
                 </a:tc>
                 <a:extLst>
                   <a:ext uri="{0D108BD9-81ED-4DB2-BD59-A6C34878D82A}">
-                    <a16:rowId xmlns="" xmlns:a16="http://schemas.microsoft.com/office/drawing/2014/main" val="1006269131"/>
+                    <a16:rowId xmlns:a16="http://schemas.microsoft.com/office/drawing/2014/main" xmlns="" val="1006269131"/>
                   </a:ext>
                 </a:extLst>
               </a:tr>
@@ -23022,7 +23022,7 @@
                 </a:tc>
                 <a:extLst>
                   <a:ext uri="{0D108BD9-81ED-4DB2-BD59-A6C34878D82A}">
-                    <a16:rowId xmlns="" xmlns:a16="http://schemas.microsoft.com/office/drawing/2014/main" val="194545254"/>
+                    <a16:rowId xmlns:a16="http://schemas.microsoft.com/office/drawing/2014/main" xmlns="" val="194545254"/>
                   </a:ext>
                 </a:extLst>
               </a:tr>
@@ -23128,7 +23128,7 @@
                 </a:tc>
                 <a:extLst>
                   <a:ext uri="{0D108BD9-81ED-4DB2-BD59-A6C34878D82A}">
-                    <a16:rowId xmlns="" xmlns:a16="http://schemas.microsoft.com/office/drawing/2014/main" val="44223002"/>
+                    <a16:rowId xmlns:a16="http://schemas.microsoft.com/office/drawing/2014/main" xmlns="" val="44223002"/>
                   </a:ext>
                 </a:extLst>
               </a:tr>
@@ -23234,7 +23234,7 @@
                 </a:tc>
                 <a:extLst>
                   <a:ext uri="{0D108BD9-81ED-4DB2-BD59-A6C34878D82A}">
-                    <a16:rowId xmlns="" xmlns:a16="http://schemas.microsoft.com/office/drawing/2014/main" val="4268083801"/>
+                    <a16:rowId xmlns:a16="http://schemas.microsoft.com/office/drawing/2014/main" xmlns="" val="4268083801"/>
                   </a:ext>
                 </a:extLst>
               </a:tr>
@@ -23340,7 +23340,7 @@
                 </a:tc>
                 <a:extLst>
                   <a:ext uri="{0D108BD9-81ED-4DB2-BD59-A6C34878D82A}">
-                    <a16:rowId xmlns="" xmlns:a16="http://schemas.microsoft.com/office/drawing/2014/main" val="2987823741"/>
+                    <a16:rowId xmlns:a16="http://schemas.microsoft.com/office/drawing/2014/main" xmlns="" val="2987823741"/>
                   </a:ext>
                 </a:extLst>
               </a:tr>
@@ -23446,7 +23446,7 @@
                 </a:tc>
                 <a:extLst>
                   <a:ext uri="{0D108BD9-81ED-4DB2-BD59-A6C34878D82A}">
-                    <a16:rowId xmlns="" xmlns:a16="http://schemas.microsoft.com/office/drawing/2014/main" val="193482310"/>
+                    <a16:rowId xmlns:a16="http://schemas.microsoft.com/office/drawing/2014/main" xmlns="" val="193482310"/>
                   </a:ext>
                 </a:extLst>
               </a:tr>
@@ -23552,7 +23552,7 @@
                 </a:tc>
                 <a:extLst>
                   <a:ext uri="{0D108BD9-81ED-4DB2-BD59-A6C34878D82A}">
-                    <a16:rowId xmlns="" xmlns:a16="http://schemas.microsoft.com/office/drawing/2014/main" val="589513760"/>
+                    <a16:rowId xmlns:a16="http://schemas.microsoft.com/office/drawing/2014/main" xmlns="" val="589513760"/>
                   </a:ext>
                 </a:extLst>
               </a:tr>
@@ -23658,7 +23658,7 @@
                 </a:tc>
                 <a:extLst>
                   <a:ext uri="{0D108BD9-81ED-4DB2-BD59-A6C34878D82A}">
-                    <a16:rowId xmlns="" xmlns:a16="http://schemas.microsoft.com/office/drawing/2014/main" val="3314464373"/>
+                    <a16:rowId xmlns:a16="http://schemas.microsoft.com/office/drawing/2014/main" xmlns="" val="3314464373"/>
                   </a:ext>
                 </a:extLst>
               </a:tr>
@@ -23764,7 +23764,7 @@
                 </a:tc>
                 <a:extLst>
                   <a:ext uri="{0D108BD9-81ED-4DB2-BD59-A6C34878D82A}">
-                    <a16:rowId xmlns="" xmlns:a16="http://schemas.microsoft.com/office/drawing/2014/main" val="1811545710"/>
+                    <a16:rowId xmlns:a16="http://schemas.microsoft.com/office/drawing/2014/main" xmlns="" val="1811545710"/>
                   </a:ext>
                 </a:extLst>
               </a:tr>
@@ -23870,7 +23870,7 @@
                 </a:tc>
                 <a:extLst>
                   <a:ext uri="{0D108BD9-81ED-4DB2-BD59-A6C34878D82A}">
-                    <a16:rowId xmlns="" xmlns:a16="http://schemas.microsoft.com/office/drawing/2014/main" val="2525566091"/>
+                    <a16:rowId xmlns:a16="http://schemas.microsoft.com/office/drawing/2014/main" xmlns="" val="2525566091"/>
                   </a:ext>
                 </a:extLst>
               </a:tr>
@@ -23976,7 +23976,7 @@
                 </a:tc>
                 <a:extLst>
                   <a:ext uri="{0D108BD9-81ED-4DB2-BD59-A6C34878D82A}">
-                    <a16:rowId xmlns="" xmlns:a16="http://schemas.microsoft.com/office/drawing/2014/main" val="3360797041"/>
+                    <a16:rowId xmlns:a16="http://schemas.microsoft.com/office/drawing/2014/main" xmlns="" val="3360797041"/>
                   </a:ext>
                 </a:extLst>
               </a:tr>
@@ -24048,7 +24048,7 @@
                 </a:tc>
                 <a:extLst>
                   <a:ext uri="{0D108BD9-81ED-4DB2-BD59-A6C34878D82A}">
-                    <a16:rowId xmlns="" xmlns:a16="http://schemas.microsoft.com/office/drawing/2014/main" val="2873669025"/>
+                    <a16:rowId xmlns:a16="http://schemas.microsoft.com/office/drawing/2014/main" xmlns="" val="2873669025"/>
                   </a:ext>
                 </a:extLst>
               </a:tr>
@@ -24120,7 +24120,7 @@
                 </a:tc>
                 <a:extLst>
                   <a:ext uri="{0D108BD9-81ED-4DB2-BD59-A6C34878D82A}">
-                    <a16:rowId xmlns="" xmlns:a16="http://schemas.microsoft.com/office/drawing/2014/main" val="3732079516"/>
+                    <a16:rowId xmlns:a16="http://schemas.microsoft.com/office/drawing/2014/main" xmlns="" val="3732079516"/>
                   </a:ext>
                 </a:extLst>
               </a:tr>
@@ -24192,7 +24192,7 @@
                 </a:tc>
                 <a:extLst>
                   <a:ext uri="{0D108BD9-81ED-4DB2-BD59-A6C34878D82A}">
-                    <a16:rowId xmlns="" xmlns:a16="http://schemas.microsoft.com/office/drawing/2014/main" val="2966636214"/>
+                    <a16:rowId xmlns:a16="http://schemas.microsoft.com/office/drawing/2014/main" xmlns="" val="2966636214"/>
                   </a:ext>
                 </a:extLst>
               </a:tr>
@@ -24264,7 +24264,7 @@
                 </a:tc>
                 <a:extLst>
                   <a:ext uri="{0D108BD9-81ED-4DB2-BD59-A6C34878D82A}">
-                    <a16:rowId xmlns="" xmlns:a16="http://schemas.microsoft.com/office/drawing/2014/main" val="3891840487"/>
+                    <a16:rowId xmlns:a16="http://schemas.microsoft.com/office/drawing/2014/main" xmlns="" val="3891840487"/>
                   </a:ext>
                 </a:extLst>
               </a:tr>
@@ -24300,7 +24300,7 @@
                 <a:gridCol w="1152128">
                   <a:extLst>
                     <a:ext uri="{9D8B030D-6E8A-4147-A177-3AD203B41FA5}">
-                      <a16:colId xmlns="" xmlns:a16="http://schemas.microsoft.com/office/drawing/2014/main" val="1214683687"/>
+                      <a16:colId xmlns:a16="http://schemas.microsoft.com/office/drawing/2014/main" xmlns="" val="1214683687"/>
                     </a:ext>
                   </a:extLst>
                 </a:gridCol>
@@ -24373,7 +24373,7 @@
                 </a:tc>
                 <a:extLst>
                   <a:ext uri="{0D108BD9-81ED-4DB2-BD59-A6C34878D82A}">
-                    <a16:rowId xmlns="" xmlns:a16="http://schemas.microsoft.com/office/drawing/2014/main" val="1006269131"/>
+                    <a16:rowId xmlns:a16="http://schemas.microsoft.com/office/drawing/2014/main" xmlns="" val="1006269131"/>
                   </a:ext>
                 </a:extLst>
               </a:tr>
@@ -24479,7 +24479,7 @@
                 </a:tc>
                 <a:extLst>
                   <a:ext uri="{0D108BD9-81ED-4DB2-BD59-A6C34878D82A}">
-                    <a16:rowId xmlns="" xmlns:a16="http://schemas.microsoft.com/office/drawing/2014/main" val="194545254"/>
+                    <a16:rowId xmlns:a16="http://schemas.microsoft.com/office/drawing/2014/main" xmlns="" val="194545254"/>
                   </a:ext>
                 </a:extLst>
               </a:tr>
@@ -24585,7 +24585,7 @@
                 </a:tc>
                 <a:extLst>
                   <a:ext uri="{0D108BD9-81ED-4DB2-BD59-A6C34878D82A}">
-                    <a16:rowId xmlns="" xmlns:a16="http://schemas.microsoft.com/office/drawing/2014/main" val="44223002"/>
+                    <a16:rowId xmlns:a16="http://schemas.microsoft.com/office/drawing/2014/main" xmlns="" val="44223002"/>
                   </a:ext>
                 </a:extLst>
               </a:tr>
@@ -24674,7 +24674,7 @@
                 </a:tc>
                 <a:extLst>
                   <a:ext uri="{0D108BD9-81ED-4DB2-BD59-A6C34878D82A}">
-                    <a16:rowId xmlns="" xmlns:a16="http://schemas.microsoft.com/office/drawing/2014/main" val="4268083801"/>
+                    <a16:rowId xmlns:a16="http://schemas.microsoft.com/office/drawing/2014/main" xmlns="" val="4268083801"/>
                   </a:ext>
                 </a:extLst>
               </a:tr>
@@ -24780,7 +24780,7 @@
                 </a:tc>
                 <a:extLst>
                   <a:ext uri="{0D108BD9-81ED-4DB2-BD59-A6C34878D82A}">
-                    <a16:rowId xmlns="" xmlns:a16="http://schemas.microsoft.com/office/drawing/2014/main" val="2987823741"/>
+                    <a16:rowId xmlns:a16="http://schemas.microsoft.com/office/drawing/2014/main" xmlns="" val="2987823741"/>
                   </a:ext>
                 </a:extLst>
               </a:tr>
@@ -24886,7 +24886,7 @@
                 </a:tc>
                 <a:extLst>
                   <a:ext uri="{0D108BD9-81ED-4DB2-BD59-A6C34878D82A}">
-                    <a16:rowId xmlns="" xmlns:a16="http://schemas.microsoft.com/office/drawing/2014/main" val="193482310"/>
+                    <a16:rowId xmlns:a16="http://schemas.microsoft.com/office/drawing/2014/main" xmlns="" val="193482310"/>
                   </a:ext>
                 </a:extLst>
               </a:tr>
@@ -25027,7 +25027,7 @@
                 <a:gridCol w="1152128">
                   <a:extLst>
                     <a:ext uri="{9D8B030D-6E8A-4147-A177-3AD203B41FA5}">
-                      <a16:colId xmlns="" xmlns:a16="http://schemas.microsoft.com/office/drawing/2014/main" val="1214683687"/>
+                      <a16:colId xmlns:a16="http://schemas.microsoft.com/office/drawing/2014/main" xmlns="" val="1214683687"/>
                     </a:ext>
                   </a:extLst>
                 </a:gridCol>
@@ -25134,7 +25134,7 @@
                 </a:tc>
                 <a:extLst>
                   <a:ext uri="{0D108BD9-81ED-4DB2-BD59-A6C34878D82A}">
-                    <a16:rowId xmlns="" xmlns:a16="http://schemas.microsoft.com/office/drawing/2014/main" val="4268083801"/>
+                    <a16:rowId xmlns:a16="http://schemas.microsoft.com/office/drawing/2014/main" xmlns="" val="4268083801"/>
                   </a:ext>
                 </a:extLst>
               </a:tr>
@@ -25361,7 +25361,7 @@
                 <a:gridCol w="1152128">
                   <a:extLst>
                     <a:ext uri="{9D8B030D-6E8A-4147-A177-3AD203B41FA5}">
-                      <a16:colId xmlns="" xmlns:a16="http://schemas.microsoft.com/office/drawing/2014/main" val="1214683687"/>
+                      <a16:colId xmlns:a16="http://schemas.microsoft.com/office/drawing/2014/main" xmlns="" val="1214683687"/>
                     </a:ext>
                   </a:extLst>
                 </a:gridCol>
@@ -25434,7 +25434,7 @@
                 </a:tc>
                 <a:extLst>
                   <a:ext uri="{0D108BD9-81ED-4DB2-BD59-A6C34878D82A}">
-                    <a16:rowId xmlns="" xmlns:a16="http://schemas.microsoft.com/office/drawing/2014/main" val="1006269131"/>
+                    <a16:rowId xmlns:a16="http://schemas.microsoft.com/office/drawing/2014/main" xmlns="" val="1006269131"/>
                   </a:ext>
                 </a:extLst>
               </a:tr>
@@ -25540,7 +25540,7 @@
                 </a:tc>
                 <a:extLst>
                   <a:ext uri="{0D108BD9-81ED-4DB2-BD59-A6C34878D82A}">
-                    <a16:rowId xmlns="" xmlns:a16="http://schemas.microsoft.com/office/drawing/2014/main" val="194545254"/>
+                    <a16:rowId xmlns:a16="http://schemas.microsoft.com/office/drawing/2014/main" xmlns="" val="194545254"/>
                   </a:ext>
                 </a:extLst>
               </a:tr>
@@ -25646,7 +25646,7 @@
                 </a:tc>
                 <a:extLst>
                   <a:ext uri="{0D108BD9-81ED-4DB2-BD59-A6C34878D82A}">
-                    <a16:rowId xmlns="" xmlns:a16="http://schemas.microsoft.com/office/drawing/2014/main" val="44223002"/>
+                    <a16:rowId xmlns:a16="http://schemas.microsoft.com/office/drawing/2014/main" xmlns="" val="44223002"/>
                   </a:ext>
                 </a:extLst>
               </a:tr>
@@ -25752,7 +25752,7 @@
                 </a:tc>
                 <a:extLst>
                   <a:ext uri="{0D108BD9-81ED-4DB2-BD59-A6C34878D82A}">
-                    <a16:rowId xmlns="" xmlns:a16="http://schemas.microsoft.com/office/drawing/2014/main" val="4268083801"/>
+                    <a16:rowId xmlns:a16="http://schemas.microsoft.com/office/drawing/2014/main" xmlns="" val="4268083801"/>
                   </a:ext>
                 </a:extLst>
               </a:tr>
@@ -25858,7 +25858,7 @@
                 </a:tc>
                 <a:extLst>
                   <a:ext uri="{0D108BD9-81ED-4DB2-BD59-A6C34878D82A}">
-                    <a16:rowId xmlns="" xmlns:a16="http://schemas.microsoft.com/office/drawing/2014/main" val="2987823741"/>
+                    <a16:rowId xmlns:a16="http://schemas.microsoft.com/office/drawing/2014/main" xmlns="" val="2987823741"/>
                   </a:ext>
                 </a:extLst>
               </a:tr>
@@ -25964,7 +25964,7 @@
                 </a:tc>
                 <a:extLst>
                   <a:ext uri="{0D108BD9-81ED-4DB2-BD59-A6C34878D82A}">
-                    <a16:rowId xmlns="" xmlns:a16="http://schemas.microsoft.com/office/drawing/2014/main" val="193482310"/>
+                    <a16:rowId xmlns:a16="http://schemas.microsoft.com/office/drawing/2014/main" xmlns="" val="193482310"/>
                   </a:ext>
                 </a:extLst>
               </a:tr>
@@ -26076,7 +26076,7 @@
                 </a:tc>
                 <a:extLst>
                   <a:ext uri="{0D108BD9-81ED-4DB2-BD59-A6C34878D82A}">
-                    <a16:rowId xmlns="" xmlns:a16="http://schemas.microsoft.com/office/drawing/2014/main" val="589513760"/>
+                    <a16:rowId xmlns:a16="http://schemas.microsoft.com/office/drawing/2014/main" xmlns="" val="589513760"/>
                   </a:ext>
                 </a:extLst>
               </a:tr>
@@ -26182,7 +26182,7 @@
                 </a:tc>
                 <a:extLst>
                   <a:ext uri="{0D108BD9-81ED-4DB2-BD59-A6C34878D82A}">
-                    <a16:rowId xmlns="" xmlns:a16="http://schemas.microsoft.com/office/drawing/2014/main" val="3314464373"/>
+                    <a16:rowId xmlns:a16="http://schemas.microsoft.com/office/drawing/2014/main" xmlns="" val="3314464373"/>
                   </a:ext>
                 </a:extLst>
               </a:tr>
@@ -26288,7 +26288,7 @@
                 </a:tc>
                 <a:extLst>
                   <a:ext uri="{0D108BD9-81ED-4DB2-BD59-A6C34878D82A}">
-                    <a16:rowId xmlns="" xmlns:a16="http://schemas.microsoft.com/office/drawing/2014/main" val="1811545710"/>
+                    <a16:rowId xmlns:a16="http://schemas.microsoft.com/office/drawing/2014/main" xmlns="" val="1811545710"/>
                   </a:ext>
                 </a:extLst>
               </a:tr>
@@ -26394,7 +26394,7 @@
                 </a:tc>
                 <a:extLst>
                   <a:ext uri="{0D108BD9-81ED-4DB2-BD59-A6C34878D82A}">
-                    <a16:rowId xmlns="" xmlns:a16="http://schemas.microsoft.com/office/drawing/2014/main" val="2525566091"/>
+                    <a16:rowId xmlns:a16="http://schemas.microsoft.com/office/drawing/2014/main" xmlns="" val="2525566091"/>
                   </a:ext>
                 </a:extLst>
               </a:tr>
@@ -26500,7 +26500,7 @@
                 </a:tc>
                 <a:extLst>
                   <a:ext uri="{0D108BD9-81ED-4DB2-BD59-A6C34878D82A}">
-                    <a16:rowId xmlns="" xmlns:a16="http://schemas.microsoft.com/office/drawing/2014/main" val="3360797041"/>
+                    <a16:rowId xmlns:a16="http://schemas.microsoft.com/office/drawing/2014/main" xmlns="" val="3360797041"/>
                   </a:ext>
                 </a:extLst>
               </a:tr>
@@ -26572,7 +26572,7 @@
                 </a:tc>
                 <a:extLst>
                   <a:ext uri="{0D108BD9-81ED-4DB2-BD59-A6C34878D82A}">
-                    <a16:rowId xmlns="" xmlns:a16="http://schemas.microsoft.com/office/drawing/2014/main" val="2873669025"/>
+                    <a16:rowId xmlns:a16="http://schemas.microsoft.com/office/drawing/2014/main" xmlns="" val="2873669025"/>
                   </a:ext>
                 </a:extLst>
               </a:tr>
@@ -26644,7 +26644,7 @@
                 </a:tc>
                 <a:extLst>
                   <a:ext uri="{0D108BD9-81ED-4DB2-BD59-A6C34878D82A}">
-                    <a16:rowId xmlns="" xmlns:a16="http://schemas.microsoft.com/office/drawing/2014/main" val="3732079516"/>
+                    <a16:rowId xmlns:a16="http://schemas.microsoft.com/office/drawing/2014/main" xmlns="" val="3732079516"/>
                   </a:ext>
                 </a:extLst>
               </a:tr>
@@ -26716,7 +26716,7 @@
                 </a:tc>
                 <a:extLst>
                   <a:ext uri="{0D108BD9-81ED-4DB2-BD59-A6C34878D82A}">
-                    <a16:rowId xmlns="" xmlns:a16="http://schemas.microsoft.com/office/drawing/2014/main" val="2966636214"/>
+                    <a16:rowId xmlns:a16="http://schemas.microsoft.com/office/drawing/2014/main" xmlns="" val="2966636214"/>
                   </a:ext>
                 </a:extLst>
               </a:tr>
@@ -26788,7 +26788,7 @@
                 </a:tc>
                 <a:extLst>
                   <a:ext uri="{0D108BD9-81ED-4DB2-BD59-A6C34878D82A}">
-                    <a16:rowId xmlns="" xmlns:a16="http://schemas.microsoft.com/office/drawing/2014/main" val="3891840487"/>
+                    <a16:rowId xmlns:a16="http://schemas.microsoft.com/office/drawing/2014/main" xmlns="" val="3891840487"/>
                   </a:ext>
                 </a:extLst>
               </a:tr>
@@ -26824,7 +26824,7 @@
                 <a:gridCol w="1152128">
                   <a:extLst>
                     <a:ext uri="{9D8B030D-6E8A-4147-A177-3AD203B41FA5}">
-                      <a16:colId xmlns="" xmlns:a16="http://schemas.microsoft.com/office/drawing/2014/main" val="1214683687"/>
+                      <a16:colId xmlns:a16="http://schemas.microsoft.com/office/drawing/2014/main" xmlns="" val="1214683687"/>
                     </a:ext>
                   </a:extLst>
                 </a:gridCol>
@@ -26897,7 +26897,7 @@
                 </a:tc>
                 <a:extLst>
                   <a:ext uri="{0D108BD9-81ED-4DB2-BD59-A6C34878D82A}">
-                    <a16:rowId xmlns="" xmlns:a16="http://schemas.microsoft.com/office/drawing/2014/main" val="1006269131"/>
+                    <a16:rowId xmlns:a16="http://schemas.microsoft.com/office/drawing/2014/main" xmlns="" val="1006269131"/>
                   </a:ext>
                 </a:extLst>
               </a:tr>
@@ -27003,7 +27003,7 @@
                 </a:tc>
                 <a:extLst>
                   <a:ext uri="{0D108BD9-81ED-4DB2-BD59-A6C34878D82A}">
-                    <a16:rowId xmlns="" xmlns:a16="http://schemas.microsoft.com/office/drawing/2014/main" val="194545254"/>
+                    <a16:rowId xmlns:a16="http://schemas.microsoft.com/office/drawing/2014/main" xmlns="" val="194545254"/>
                   </a:ext>
                 </a:extLst>
               </a:tr>
@@ -27109,7 +27109,7 @@
                 </a:tc>
                 <a:extLst>
                   <a:ext uri="{0D108BD9-81ED-4DB2-BD59-A6C34878D82A}">
-                    <a16:rowId xmlns="" xmlns:a16="http://schemas.microsoft.com/office/drawing/2014/main" val="44223002"/>
+                    <a16:rowId xmlns:a16="http://schemas.microsoft.com/office/drawing/2014/main" xmlns="" val="44223002"/>
                   </a:ext>
                 </a:extLst>
               </a:tr>
@@ -27221,7 +27221,7 @@
                 </a:tc>
                 <a:extLst>
                   <a:ext uri="{0D108BD9-81ED-4DB2-BD59-A6C34878D82A}">
-                    <a16:rowId xmlns="" xmlns:a16="http://schemas.microsoft.com/office/drawing/2014/main" val="4268083801"/>
+                    <a16:rowId xmlns:a16="http://schemas.microsoft.com/office/drawing/2014/main" xmlns="" val="4268083801"/>
                   </a:ext>
                 </a:extLst>
               </a:tr>
@@ -27327,7 +27327,7 @@
                 </a:tc>
                 <a:extLst>
                   <a:ext uri="{0D108BD9-81ED-4DB2-BD59-A6C34878D82A}">
-                    <a16:rowId xmlns="" xmlns:a16="http://schemas.microsoft.com/office/drawing/2014/main" val="2987823741"/>
+                    <a16:rowId xmlns:a16="http://schemas.microsoft.com/office/drawing/2014/main" xmlns="" val="2987823741"/>
                   </a:ext>
                 </a:extLst>
               </a:tr>
@@ -27433,7 +27433,7 @@
                 </a:tc>
                 <a:extLst>
                   <a:ext uri="{0D108BD9-81ED-4DB2-BD59-A6C34878D82A}">
-                    <a16:rowId xmlns="" xmlns:a16="http://schemas.microsoft.com/office/drawing/2014/main" val="193482310"/>
+                    <a16:rowId xmlns:a16="http://schemas.microsoft.com/office/drawing/2014/main" xmlns="" val="193482310"/>
                   </a:ext>
                 </a:extLst>
               </a:tr>
@@ -33593,6 +33593,1602 @@
           <a:chExt cx="0" cy="0"/>
         </a:xfrm>
       </p:grpSpPr>
+      <p:sp>
+        <p:nvSpPr>
+          <p:cNvPr id="3" name="矩形 2"/>
+          <p:cNvSpPr/>
+          <p:nvPr/>
+        </p:nvSpPr>
+        <p:spPr>
+          <a:xfrm>
+            <a:off x="1282233" y="1484784"/>
+            <a:ext cx="841495" cy="432048"/>
+          </a:xfrm>
+          <a:prstGeom prst="rect">
+            <a:avLst/>
+          </a:prstGeom>
+          <a:solidFill>
+            <a:schemeClr val="accent6">
+              <a:lumMod val="20000"/>
+              <a:lumOff val="80000"/>
+            </a:schemeClr>
+          </a:solidFill>
+          <a:ln w="12700">
+            <a:solidFill>
+              <a:schemeClr val="bg1">
+                <a:lumMod val="50000"/>
+              </a:schemeClr>
+            </a:solidFill>
+          </a:ln>
+        </p:spPr>
+        <p:style>
+          <a:lnRef idx="2">
+            <a:schemeClr val="accent1">
+              <a:shade val="50000"/>
+            </a:schemeClr>
+          </a:lnRef>
+          <a:fillRef idx="1">
+            <a:schemeClr val="accent1"/>
+          </a:fillRef>
+          <a:effectRef idx="0">
+            <a:schemeClr val="accent1"/>
+          </a:effectRef>
+          <a:fontRef idx="minor">
+            <a:schemeClr val="lt1"/>
+          </a:fontRef>
+        </p:style>
+        <p:txBody>
+          <a:bodyPr rtlCol="0" anchor="ctr"/>
+          <a:lstStyle/>
+          <a:p>
+            <a:pPr algn="ctr"/>
+            <a:r>
+              <a:rPr lang="en-US" altLang="zh-CN" sz="1200" b="1" dirty="0">
+                <a:solidFill>
+                  <a:schemeClr val="tx1"/>
+                </a:solidFill>
+              </a:rPr>
+              <a:t>r</a:t>
+            </a:r>
+            <a:r>
+              <a:rPr lang="en-US" altLang="zh-CN" sz="1200" b="1" dirty="0" smtClean="0">
+                <a:solidFill>
+                  <a:schemeClr val="tx1"/>
+                </a:solidFill>
+              </a:rPr>
+              <a:t>ead data 1#</a:t>
+            </a:r>
+            <a:endParaRPr lang="zh-CN" altLang="en-US" sz="1200" b="1" dirty="0">
+              <a:solidFill>
+                <a:schemeClr val="tx1"/>
+              </a:solidFill>
+            </a:endParaRPr>
+          </a:p>
+        </p:txBody>
+      </p:sp>
+      <p:sp>
+        <p:nvSpPr>
+          <p:cNvPr id="5" name="矩形 4"/>
+          <p:cNvSpPr/>
+          <p:nvPr/>
+        </p:nvSpPr>
+        <p:spPr>
+          <a:xfrm>
+            <a:off x="2123728" y="1916832"/>
+            <a:ext cx="1030713" cy="432048"/>
+          </a:xfrm>
+          <a:prstGeom prst="rect">
+            <a:avLst/>
+          </a:prstGeom>
+          <a:solidFill>
+            <a:schemeClr val="accent5">
+              <a:lumMod val="20000"/>
+              <a:lumOff val="80000"/>
+            </a:schemeClr>
+          </a:solidFill>
+          <a:ln w="12700">
+            <a:solidFill>
+              <a:schemeClr val="bg1">
+                <a:lumMod val="50000"/>
+              </a:schemeClr>
+            </a:solidFill>
+          </a:ln>
+        </p:spPr>
+        <p:style>
+          <a:lnRef idx="2">
+            <a:schemeClr val="accent1">
+              <a:shade val="50000"/>
+            </a:schemeClr>
+          </a:lnRef>
+          <a:fillRef idx="1">
+            <a:schemeClr val="accent1"/>
+          </a:fillRef>
+          <a:effectRef idx="0">
+            <a:schemeClr val="accent1"/>
+          </a:effectRef>
+          <a:fontRef idx="minor">
+            <a:schemeClr val="lt1"/>
+          </a:fontRef>
+        </p:style>
+        <p:txBody>
+          <a:bodyPr rtlCol="0" anchor="ctr"/>
+          <a:lstStyle/>
+          <a:p>
+            <a:pPr algn="ctr"/>
+            <a:r>
+              <a:rPr lang="en-US" altLang="zh-CN" sz="1200" b="1" dirty="0">
+                <a:solidFill>
+                  <a:schemeClr val="tx1"/>
+                </a:solidFill>
+              </a:rPr>
+              <a:t>m</a:t>
+            </a:r>
+            <a:r>
+              <a:rPr lang="en-US" altLang="zh-CN" sz="1200" b="1" dirty="0" smtClean="0">
+                <a:solidFill>
+                  <a:schemeClr val="tx1"/>
+                </a:solidFill>
+              </a:rPr>
+              <a:t>ap 1#</a:t>
+            </a:r>
+            <a:endParaRPr lang="zh-CN" altLang="en-US" sz="1200" b="1" dirty="0">
+              <a:solidFill>
+                <a:schemeClr val="tx1"/>
+              </a:solidFill>
+            </a:endParaRPr>
+          </a:p>
+        </p:txBody>
+      </p:sp>
+      <p:sp>
+        <p:nvSpPr>
+          <p:cNvPr id="4" name="TextBox 3"/>
+          <p:cNvSpPr txBox="1"/>
+          <p:nvPr/>
+        </p:nvSpPr>
+        <p:spPr>
+          <a:xfrm>
+            <a:off x="3154441" y="1008491"/>
+            <a:ext cx="2986843" cy="369332"/>
+          </a:xfrm>
+          <a:prstGeom prst="rect">
+            <a:avLst/>
+          </a:prstGeom>
+          <a:noFill/>
+        </p:spPr>
+        <p:txBody>
+          <a:bodyPr wrap="none" rtlCol="0">
+            <a:spAutoFit/>
+          </a:bodyPr>
+          <a:lstStyle/>
+          <a:p>
+            <a:r>
+              <a:rPr lang="en-US" altLang="zh-CN" b="1" dirty="0" smtClean="0">
+                <a:solidFill>
+                  <a:schemeClr val="accent5">
+                    <a:lumMod val="75000"/>
+                  </a:schemeClr>
+                </a:solidFill>
+              </a:rPr>
+              <a:t>Prepare Data</a:t>
+            </a:r>
+            <a:r>
+              <a:rPr lang="zh-CN" altLang="en-US" b="1" dirty="0" smtClean="0">
+                <a:solidFill>
+                  <a:schemeClr val="accent5">
+                    <a:lumMod val="75000"/>
+                  </a:schemeClr>
+                </a:solidFill>
+              </a:rPr>
+              <a:t>：</a:t>
+            </a:r>
+            <a:r>
+              <a:rPr lang="en-US" altLang="zh-CN" b="1" dirty="0" smtClean="0">
+                <a:solidFill>
+                  <a:schemeClr val="accent5">
+                    <a:lumMod val="75000"/>
+                  </a:schemeClr>
+                </a:solidFill>
+              </a:rPr>
+              <a:t>Normal Mode</a:t>
+            </a:r>
+            <a:endParaRPr lang="zh-CN" altLang="en-US" b="1" dirty="0">
+              <a:solidFill>
+                <a:schemeClr val="accent5">
+                  <a:lumMod val="75000"/>
+                </a:schemeClr>
+              </a:solidFill>
+            </a:endParaRPr>
+          </a:p>
+        </p:txBody>
+      </p:sp>
+      <p:sp>
+        <p:nvSpPr>
+          <p:cNvPr id="11" name="TextBox 10"/>
+          <p:cNvSpPr txBox="1"/>
+          <p:nvPr/>
+        </p:nvSpPr>
+        <p:spPr>
+          <a:xfrm>
+            <a:off x="-36512" y="1547041"/>
+            <a:ext cx="1126014" cy="307777"/>
+          </a:xfrm>
+          <a:prstGeom prst="rect">
+            <a:avLst/>
+          </a:prstGeom>
+          <a:noFill/>
+        </p:spPr>
+        <p:txBody>
+          <a:bodyPr wrap="none" rtlCol="0">
+            <a:spAutoFit/>
+          </a:bodyPr>
+          <a:lstStyle/>
+          <a:p>
+            <a:r>
+              <a:rPr lang="en-US" altLang="zh-CN" sz="1400" b="1" dirty="0" smtClean="0"/>
+              <a:t>Read Data</a:t>
+            </a:r>
+            <a:r>
+              <a:rPr lang="zh-CN" altLang="en-US" sz="1400" b="1" dirty="0" smtClean="0"/>
+              <a:t>：</a:t>
+            </a:r>
+            <a:endParaRPr lang="zh-CN" altLang="en-US" sz="1400" b="1" dirty="0"/>
+          </a:p>
+        </p:txBody>
+      </p:sp>
+      <p:sp>
+        <p:nvSpPr>
+          <p:cNvPr id="12" name="TextBox 11"/>
+          <p:cNvSpPr txBox="1"/>
+          <p:nvPr/>
+        </p:nvSpPr>
+        <p:spPr>
+          <a:xfrm>
+            <a:off x="173674" y="1978967"/>
+            <a:ext cx="705642" cy="307777"/>
+          </a:xfrm>
+          <a:prstGeom prst="rect">
+            <a:avLst/>
+          </a:prstGeom>
+          <a:noFill/>
+        </p:spPr>
+        <p:txBody>
+          <a:bodyPr wrap="none" rtlCol="0">
+            <a:spAutoFit/>
+          </a:bodyPr>
+          <a:lstStyle/>
+          <a:p>
+            <a:r>
+              <a:rPr lang="en-US" altLang="zh-CN" sz="1400" b="1" dirty="0" smtClean="0"/>
+              <a:t>Map</a:t>
+            </a:r>
+            <a:r>
+              <a:rPr lang="zh-CN" altLang="en-US" sz="1400" b="1" dirty="0" smtClean="0"/>
+              <a:t>：</a:t>
+            </a:r>
+            <a:endParaRPr lang="zh-CN" altLang="en-US" sz="1400" b="1" dirty="0"/>
+          </a:p>
+        </p:txBody>
+      </p:sp>
+      <p:cxnSp>
+        <p:nvCxnSpPr>
+          <p:cNvPr id="13" name="直接箭头连接符 12"/>
+          <p:cNvCxnSpPr/>
+          <p:nvPr/>
+        </p:nvCxnSpPr>
+        <p:spPr>
+          <a:xfrm>
+            <a:off x="1115616" y="2564904"/>
+            <a:ext cx="7704856" cy="0"/>
+          </a:xfrm>
+          <a:prstGeom prst="straightConnector1">
+            <a:avLst/>
+          </a:prstGeom>
+          <a:ln>
+            <a:solidFill>
+              <a:schemeClr val="tx1"/>
+            </a:solidFill>
+            <a:headEnd type="none" w="med" len="med"/>
+            <a:tailEnd type="triangle" w="med" len="med"/>
+          </a:ln>
+        </p:spPr>
+        <p:style>
+          <a:lnRef idx="1">
+            <a:schemeClr val="accent1"/>
+          </a:lnRef>
+          <a:fillRef idx="0">
+            <a:schemeClr val="accent1"/>
+          </a:fillRef>
+          <a:effectRef idx="0">
+            <a:schemeClr val="accent1"/>
+          </a:effectRef>
+          <a:fontRef idx="minor">
+            <a:schemeClr val="tx1"/>
+          </a:fontRef>
+        </p:style>
+      </p:cxnSp>
+      <p:sp>
+        <p:nvSpPr>
+          <p:cNvPr id="15" name="TextBox 14"/>
+          <p:cNvSpPr txBox="1"/>
+          <p:nvPr/>
+        </p:nvSpPr>
+        <p:spPr>
+          <a:xfrm>
+            <a:off x="3851920" y="2492896"/>
+            <a:ext cx="1157112" cy="307777"/>
+          </a:xfrm>
+          <a:prstGeom prst="rect">
+            <a:avLst/>
+          </a:prstGeom>
+          <a:noFill/>
+        </p:spPr>
+        <p:txBody>
+          <a:bodyPr wrap="none" rtlCol="0">
+            <a:spAutoFit/>
+          </a:bodyPr>
+          <a:lstStyle/>
+          <a:p>
+            <a:r>
+              <a:rPr lang="en-US" altLang="zh-CN" sz="1400" b="1" dirty="0" smtClean="0"/>
+              <a:t>Process Time</a:t>
+            </a:r>
+            <a:endParaRPr lang="zh-CN" altLang="en-US" sz="1400" b="1" dirty="0"/>
+          </a:p>
+        </p:txBody>
+      </p:sp>
+      <p:sp>
+        <p:nvSpPr>
+          <p:cNvPr id="22" name="TextBox 21"/>
+          <p:cNvSpPr txBox="1"/>
+          <p:nvPr/>
+        </p:nvSpPr>
+        <p:spPr>
+          <a:xfrm>
+            <a:off x="3154441" y="3240739"/>
+            <a:ext cx="2986843" cy="369332"/>
+          </a:xfrm>
+          <a:prstGeom prst="rect">
+            <a:avLst/>
+          </a:prstGeom>
+          <a:noFill/>
+        </p:spPr>
+        <p:txBody>
+          <a:bodyPr wrap="none" rtlCol="0">
+            <a:spAutoFit/>
+          </a:bodyPr>
+          <a:lstStyle/>
+          <a:p>
+            <a:r>
+              <a:rPr lang="en-US" altLang="zh-CN" b="1" dirty="0" smtClean="0">
+                <a:solidFill>
+                  <a:schemeClr val="accent5">
+                    <a:lumMod val="75000"/>
+                  </a:schemeClr>
+                </a:solidFill>
+              </a:rPr>
+              <a:t>Prepare Data</a:t>
+            </a:r>
+            <a:r>
+              <a:rPr lang="zh-CN" altLang="en-US" b="1" dirty="0" smtClean="0">
+                <a:solidFill>
+                  <a:schemeClr val="accent5">
+                    <a:lumMod val="75000"/>
+                  </a:schemeClr>
+                </a:solidFill>
+              </a:rPr>
+              <a:t>：</a:t>
+            </a:r>
+            <a:r>
+              <a:rPr lang="en-US" altLang="zh-CN" b="1" dirty="0" smtClean="0">
+                <a:solidFill>
+                  <a:schemeClr val="accent5">
+                    <a:lumMod val="75000"/>
+                  </a:schemeClr>
+                </a:solidFill>
+              </a:rPr>
+              <a:t>Parallel Mode</a:t>
+            </a:r>
+            <a:endParaRPr lang="zh-CN" altLang="en-US" b="1" dirty="0">
+              <a:solidFill>
+                <a:schemeClr val="accent5">
+                  <a:lumMod val="75000"/>
+                </a:schemeClr>
+              </a:solidFill>
+            </a:endParaRPr>
+          </a:p>
+        </p:txBody>
+      </p:sp>
+      <p:sp>
+        <p:nvSpPr>
+          <p:cNvPr id="23" name="TextBox 22"/>
+          <p:cNvSpPr txBox="1"/>
+          <p:nvPr/>
+        </p:nvSpPr>
+        <p:spPr>
+          <a:xfrm>
+            <a:off x="107504" y="3779289"/>
+            <a:ext cx="1126014" cy="307777"/>
+          </a:xfrm>
+          <a:prstGeom prst="rect">
+            <a:avLst/>
+          </a:prstGeom>
+          <a:noFill/>
+        </p:spPr>
+        <p:txBody>
+          <a:bodyPr wrap="none" rtlCol="0">
+            <a:spAutoFit/>
+          </a:bodyPr>
+          <a:lstStyle/>
+          <a:p>
+            <a:r>
+              <a:rPr lang="en-US" altLang="zh-CN" sz="1400" b="1" dirty="0" smtClean="0"/>
+              <a:t>Read Data</a:t>
+            </a:r>
+            <a:r>
+              <a:rPr lang="zh-CN" altLang="en-US" sz="1400" b="1" dirty="0" smtClean="0"/>
+              <a:t>：</a:t>
+            </a:r>
+            <a:endParaRPr lang="zh-CN" altLang="en-US" sz="1400" b="1" dirty="0"/>
+          </a:p>
+        </p:txBody>
+      </p:sp>
+      <p:sp>
+        <p:nvSpPr>
+          <p:cNvPr id="24" name="TextBox 23"/>
+          <p:cNvSpPr txBox="1"/>
+          <p:nvPr/>
+        </p:nvSpPr>
+        <p:spPr>
+          <a:xfrm>
+            <a:off x="0" y="4211215"/>
+            <a:ext cx="1356397" cy="307777"/>
+          </a:xfrm>
+          <a:prstGeom prst="rect">
+            <a:avLst/>
+          </a:prstGeom>
+          <a:noFill/>
+        </p:spPr>
+        <p:txBody>
+          <a:bodyPr wrap="none" rtlCol="0">
+            <a:spAutoFit/>
+          </a:bodyPr>
+          <a:lstStyle/>
+          <a:p>
+            <a:r>
+              <a:rPr lang="en-US" altLang="zh-CN" sz="1400" b="1" dirty="0" smtClean="0"/>
+              <a:t>Map Kernel 1</a:t>
+            </a:r>
+            <a:r>
+              <a:rPr lang="zh-CN" altLang="en-US" sz="1400" b="1" dirty="0" smtClean="0"/>
+              <a:t>：</a:t>
+            </a:r>
+            <a:endParaRPr lang="zh-CN" altLang="en-US" sz="1400" b="1" dirty="0"/>
+          </a:p>
+        </p:txBody>
+      </p:sp>
+      <p:sp>
+        <p:nvSpPr>
+          <p:cNvPr id="31" name="矩形 30"/>
+          <p:cNvSpPr/>
+          <p:nvPr/>
+        </p:nvSpPr>
+        <p:spPr>
+          <a:xfrm>
+            <a:off x="3154441" y="1484784"/>
+            <a:ext cx="841495" cy="432048"/>
+          </a:xfrm>
+          <a:prstGeom prst="rect">
+            <a:avLst/>
+          </a:prstGeom>
+          <a:solidFill>
+            <a:schemeClr val="accent6">
+              <a:lumMod val="20000"/>
+              <a:lumOff val="80000"/>
+            </a:schemeClr>
+          </a:solidFill>
+          <a:ln w="12700">
+            <a:solidFill>
+              <a:schemeClr val="bg1">
+                <a:lumMod val="50000"/>
+              </a:schemeClr>
+            </a:solidFill>
+          </a:ln>
+        </p:spPr>
+        <p:style>
+          <a:lnRef idx="2">
+            <a:schemeClr val="accent1">
+              <a:shade val="50000"/>
+            </a:schemeClr>
+          </a:lnRef>
+          <a:fillRef idx="1">
+            <a:schemeClr val="accent1"/>
+          </a:fillRef>
+          <a:effectRef idx="0">
+            <a:schemeClr val="accent1"/>
+          </a:effectRef>
+          <a:fontRef idx="minor">
+            <a:schemeClr val="lt1"/>
+          </a:fontRef>
+        </p:style>
+        <p:txBody>
+          <a:bodyPr rtlCol="0" anchor="ctr"/>
+          <a:lstStyle/>
+          <a:p>
+            <a:pPr algn="ctr"/>
+            <a:r>
+              <a:rPr lang="en-US" altLang="zh-CN" sz="1200" b="1" dirty="0">
+                <a:solidFill>
+                  <a:schemeClr val="tx1"/>
+                </a:solidFill>
+              </a:rPr>
+              <a:t>r</a:t>
+            </a:r>
+            <a:r>
+              <a:rPr lang="en-US" altLang="zh-CN" sz="1200" b="1" dirty="0" smtClean="0">
+                <a:solidFill>
+                  <a:schemeClr val="tx1"/>
+                </a:solidFill>
+              </a:rPr>
+              <a:t>ead data 2#</a:t>
+            </a:r>
+            <a:endParaRPr lang="zh-CN" altLang="en-US" sz="1200" b="1" dirty="0">
+              <a:solidFill>
+                <a:schemeClr val="tx1"/>
+              </a:solidFill>
+            </a:endParaRPr>
+          </a:p>
+        </p:txBody>
+      </p:sp>
+      <p:sp>
+        <p:nvSpPr>
+          <p:cNvPr id="32" name="矩形 31"/>
+          <p:cNvSpPr/>
+          <p:nvPr/>
+        </p:nvSpPr>
+        <p:spPr>
+          <a:xfrm>
+            <a:off x="3995936" y="1916832"/>
+            <a:ext cx="1030713" cy="432048"/>
+          </a:xfrm>
+          <a:prstGeom prst="rect">
+            <a:avLst/>
+          </a:prstGeom>
+          <a:solidFill>
+            <a:schemeClr val="accent5">
+              <a:lumMod val="20000"/>
+              <a:lumOff val="80000"/>
+            </a:schemeClr>
+          </a:solidFill>
+          <a:ln w="12700">
+            <a:solidFill>
+              <a:schemeClr val="bg1">
+                <a:lumMod val="50000"/>
+              </a:schemeClr>
+            </a:solidFill>
+          </a:ln>
+        </p:spPr>
+        <p:style>
+          <a:lnRef idx="2">
+            <a:schemeClr val="accent1">
+              <a:shade val="50000"/>
+            </a:schemeClr>
+          </a:lnRef>
+          <a:fillRef idx="1">
+            <a:schemeClr val="accent1"/>
+          </a:fillRef>
+          <a:effectRef idx="0">
+            <a:schemeClr val="accent1"/>
+          </a:effectRef>
+          <a:fontRef idx="minor">
+            <a:schemeClr val="lt1"/>
+          </a:fontRef>
+        </p:style>
+        <p:txBody>
+          <a:bodyPr rtlCol="0" anchor="ctr"/>
+          <a:lstStyle/>
+          <a:p>
+            <a:pPr algn="ctr"/>
+            <a:r>
+              <a:rPr lang="en-US" altLang="zh-CN" sz="1200" b="1" dirty="0">
+                <a:solidFill>
+                  <a:schemeClr val="tx1"/>
+                </a:solidFill>
+              </a:rPr>
+              <a:t>m</a:t>
+            </a:r>
+            <a:r>
+              <a:rPr lang="en-US" altLang="zh-CN" sz="1200" b="1" dirty="0" smtClean="0">
+                <a:solidFill>
+                  <a:schemeClr val="tx1"/>
+                </a:solidFill>
+              </a:rPr>
+              <a:t>ap 2#</a:t>
+            </a:r>
+            <a:endParaRPr lang="zh-CN" altLang="en-US" sz="1200" b="1" dirty="0">
+              <a:solidFill>
+                <a:schemeClr val="tx1"/>
+              </a:solidFill>
+            </a:endParaRPr>
+          </a:p>
+        </p:txBody>
+      </p:sp>
+      <p:sp>
+        <p:nvSpPr>
+          <p:cNvPr id="33" name="矩形 32"/>
+          <p:cNvSpPr/>
+          <p:nvPr/>
+        </p:nvSpPr>
+        <p:spPr>
+          <a:xfrm>
+            <a:off x="5019038" y="1484784"/>
+            <a:ext cx="841495" cy="432048"/>
+          </a:xfrm>
+          <a:prstGeom prst="rect">
+            <a:avLst/>
+          </a:prstGeom>
+          <a:solidFill>
+            <a:schemeClr val="accent6">
+              <a:lumMod val="20000"/>
+              <a:lumOff val="80000"/>
+            </a:schemeClr>
+          </a:solidFill>
+          <a:ln w="12700">
+            <a:solidFill>
+              <a:schemeClr val="bg1">
+                <a:lumMod val="50000"/>
+              </a:schemeClr>
+            </a:solidFill>
+          </a:ln>
+        </p:spPr>
+        <p:style>
+          <a:lnRef idx="2">
+            <a:schemeClr val="accent1">
+              <a:shade val="50000"/>
+            </a:schemeClr>
+          </a:lnRef>
+          <a:fillRef idx="1">
+            <a:schemeClr val="accent1"/>
+          </a:fillRef>
+          <a:effectRef idx="0">
+            <a:schemeClr val="accent1"/>
+          </a:effectRef>
+          <a:fontRef idx="minor">
+            <a:schemeClr val="lt1"/>
+          </a:fontRef>
+        </p:style>
+        <p:txBody>
+          <a:bodyPr rtlCol="0" anchor="ctr"/>
+          <a:lstStyle/>
+          <a:p>
+            <a:pPr algn="ctr"/>
+            <a:r>
+              <a:rPr lang="en-US" altLang="zh-CN" sz="1200" b="1" dirty="0">
+                <a:solidFill>
+                  <a:schemeClr val="tx1"/>
+                </a:solidFill>
+              </a:rPr>
+              <a:t>r</a:t>
+            </a:r>
+            <a:r>
+              <a:rPr lang="en-US" altLang="zh-CN" sz="1200" b="1" dirty="0" smtClean="0">
+                <a:solidFill>
+                  <a:schemeClr val="tx1"/>
+                </a:solidFill>
+              </a:rPr>
+              <a:t>ead data 3#</a:t>
+            </a:r>
+            <a:endParaRPr lang="zh-CN" altLang="en-US" sz="1200" b="1" dirty="0">
+              <a:solidFill>
+                <a:schemeClr val="tx1"/>
+              </a:solidFill>
+            </a:endParaRPr>
+          </a:p>
+        </p:txBody>
+      </p:sp>
+      <p:sp>
+        <p:nvSpPr>
+          <p:cNvPr id="34" name="矩形 33"/>
+          <p:cNvSpPr/>
+          <p:nvPr/>
+        </p:nvSpPr>
+        <p:spPr>
+          <a:xfrm>
+            <a:off x="5860533" y="1916832"/>
+            <a:ext cx="1030713" cy="432048"/>
+          </a:xfrm>
+          <a:prstGeom prst="rect">
+            <a:avLst/>
+          </a:prstGeom>
+          <a:solidFill>
+            <a:schemeClr val="accent5">
+              <a:lumMod val="20000"/>
+              <a:lumOff val="80000"/>
+            </a:schemeClr>
+          </a:solidFill>
+          <a:ln w="12700">
+            <a:solidFill>
+              <a:schemeClr val="bg1">
+                <a:lumMod val="50000"/>
+              </a:schemeClr>
+            </a:solidFill>
+          </a:ln>
+        </p:spPr>
+        <p:style>
+          <a:lnRef idx="2">
+            <a:schemeClr val="accent1">
+              <a:shade val="50000"/>
+            </a:schemeClr>
+          </a:lnRef>
+          <a:fillRef idx="1">
+            <a:schemeClr val="accent1"/>
+          </a:fillRef>
+          <a:effectRef idx="0">
+            <a:schemeClr val="accent1"/>
+          </a:effectRef>
+          <a:fontRef idx="minor">
+            <a:schemeClr val="lt1"/>
+          </a:fontRef>
+        </p:style>
+        <p:txBody>
+          <a:bodyPr rtlCol="0" anchor="ctr"/>
+          <a:lstStyle/>
+          <a:p>
+            <a:pPr algn="ctr"/>
+            <a:r>
+              <a:rPr lang="en-US" altLang="zh-CN" sz="1200" b="1" dirty="0">
+                <a:solidFill>
+                  <a:schemeClr val="tx1"/>
+                </a:solidFill>
+              </a:rPr>
+              <a:t>m</a:t>
+            </a:r>
+            <a:r>
+              <a:rPr lang="en-US" altLang="zh-CN" sz="1200" b="1" dirty="0" smtClean="0">
+                <a:solidFill>
+                  <a:schemeClr val="tx1"/>
+                </a:solidFill>
+              </a:rPr>
+              <a:t>ap 3#</a:t>
+            </a:r>
+            <a:endParaRPr lang="zh-CN" altLang="en-US" sz="1200" b="1" dirty="0">
+              <a:solidFill>
+                <a:schemeClr val="tx1"/>
+              </a:solidFill>
+            </a:endParaRPr>
+          </a:p>
+        </p:txBody>
+      </p:sp>
+      <p:sp>
+        <p:nvSpPr>
+          <p:cNvPr id="35" name="矩形 34"/>
+          <p:cNvSpPr/>
+          <p:nvPr/>
+        </p:nvSpPr>
+        <p:spPr>
+          <a:xfrm>
+            <a:off x="6887522" y="1484784"/>
+            <a:ext cx="841495" cy="432048"/>
+          </a:xfrm>
+          <a:prstGeom prst="rect">
+            <a:avLst/>
+          </a:prstGeom>
+          <a:solidFill>
+            <a:schemeClr val="accent6">
+              <a:lumMod val="20000"/>
+              <a:lumOff val="80000"/>
+            </a:schemeClr>
+          </a:solidFill>
+          <a:ln w="12700">
+            <a:solidFill>
+              <a:schemeClr val="bg1">
+                <a:lumMod val="50000"/>
+              </a:schemeClr>
+            </a:solidFill>
+          </a:ln>
+        </p:spPr>
+        <p:style>
+          <a:lnRef idx="2">
+            <a:schemeClr val="accent1">
+              <a:shade val="50000"/>
+            </a:schemeClr>
+          </a:lnRef>
+          <a:fillRef idx="1">
+            <a:schemeClr val="accent1"/>
+          </a:fillRef>
+          <a:effectRef idx="0">
+            <a:schemeClr val="accent1"/>
+          </a:effectRef>
+          <a:fontRef idx="minor">
+            <a:schemeClr val="lt1"/>
+          </a:fontRef>
+        </p:style>
+        <p:txBody>
+          <a:bodyPr rtlCol="0" anchor="ctr"/>
+          <a:lstStyle/>
+          <a:p>
+            <a:pPr algn="ctr"/>
+            <a:r>
+              <a:rPr lang="en-US" altLang="zh-CN" sz="1200" b="1" dirty="0">
+                <a:solidFill>
+                  <a:schemeClr val="tx1"/>
+                </a:solidFill>
+              </a:rPr>
+              <a:t>r</a:t>
+            </a:r>
+            <a:r>
+              <a:rPr lang="en-US" altLang="zh-CN" sz="1200" b="1" dirty="0" smtClean="0">
+                <a:solidFill>
+                  <a:schemeClr val="tx1"/>
+                </a:solidFill>
+              </a:rPr>
+              <a:t>ead data 4#</a:t>
+            </a:r>
+            <a:endParaRPr lang="zh-CN" altLang="en-US" sz="1200" b="1" dirty="0">
+              <a:solidFill>
+                <a:schemeClr val="tx1"/>
+              </a:solidFill>
+            </a:endParaRPr>
+          </a:p>
+        </p:txBody>
+      </p:sp>
+      <p:sp>
+        <p:nvSpPr>
+          <p:cNvPr id="36" name="矩形 35"/>
+          <p:cNvSpPr/>
+          <p:nvPr/>
+        </p:nvSpPr>
+        <p:spPr>
+          <a:xfrm>
+            <a:off x="7729017" y="1916832"/>
+            <a:ext cx="1030713" cy="432048"/>
+          </a:xfrm>
+          <a:prstGeom prst="rect">
+            <a:avLst/>
+          </a:prstGeom>
+          <a:solidFill>
+            <a:schemeClr val="accent5">
+              <a:lumMod val="20000"/>
+              <a:lumOff val="80000"/>
+            </a:schemeClr>
+          </a:solidFill>
+          <a:ln w="12700">
+            <a:solidFill>
+              <a:schemeClr val="bg1">
+                <a:lumMod val="50000"/>
+              </a:schemeClr>
+            </a:solidFill>
+          </a:ln>
+        </p:spPr>
+        <p:style>
+          <a:lnRef idx="2">
+            <a:schemeClr val="accent1">
+              <a:shade val="50000"/>
+            </a:schemeClr>
+          </a:lnRef>
+          <a:fillRef idx="1">
+            <a:schemeClr val="accent1"/>
+          </a:fillRef>
+          <a:effectRef idx="0">
+            <a:schemeClr val="accent1"/>
+          </a:effectRef>
+          <a:fontRef idx="minor">
+            <a:schemeClr val="lt1"/>
+          </a:fontRef>
+        </p:style>
+        <p:txBody>
+          <a:bodyPr rtlCol="0" anchor="ctr"/>
+          <a:lstStyle/>
+          <a:p>
+            <a:pPr algn="ctr"/>
+            <a:r>
+              <a:rPr lang="en-US" altLang="zh-CN" sz="1200" b="1" dirty="0">
+                <a:solidFill>
+                  <a:schemeClr val="tx1"/>
+                </a:solidFill>
+              </a:rPr>
+              <a:t>m</a:t>
+            </a:r>
+            <a:r>
+              <a:rPr lang="en-US" altLang="zh-CN" sz="1200" b="1" dirty="0" smtClean="0">
+                <a:solidFill>
+                  <a:schemeClr val="tx1"/>
+                </a:solidFill>
+              </a:rPr>
+              <a:t>ap 1#</a:t>
+            </a:r>
+            <a:endParaRPr lang="zh-CN" altLang="en-US" sz="1200" b="1" dirty="0">
+              <a:solidFill>
+                <a:schemeClr val="tx1"/>
+              </a:solidFill>
+            </a:endParaRPr>
+          </a:p>
+        </p:txBody>
+      </p:sp>
+      <p:sp>
+        <p:nvSpPr>
+          <p:cNvPr id="38" name="矩形 37"/>
+          <p:cNvSpPr/>
+          <p:nvPr/>
+        </p:nvSpPr>
+        <p:spPr>
+          <a:xfrm>
+            <a:off x="1282233" y="3680301"/>
+            <a:ext cx="841495" cy="432048"/>
+          </a:xfrm>
+          <a:prstGeom prst="rect">
+            <a:avLst/>
+          </a:prstGeom>
+          <a:solidFill>
+            <a:schemeClr val="accent6">
+              <a:lumMod val="20000"/>
+              <a:lumOff val="80000"/>
+            </a:schemeClr>
+          </a:solidFill>
+          <a:ln w="12700">
+            <a:solidFill>
+              <a:schemeClr val="bg1">
+                <a:lumMod val="50000"/>
+              </a:schemeClr>
+            </a:solidFill>
+          </a:ln>
+        </p:spPr>
+        <p:style>
+          <a:lnRef idx="2">
+            <a:schemeClr val="accent1">
+              <a:shade val="50000"/>
+            </a:schemeClr>
+          </a:lnRef>
+          <a:fillRef idx="1">
+            <a:schemeClr val="accent1"/>
+          </a:fillRef>
+          <a:effectRef idx="0">
+            <a:schemeClr val="accent1"/>
+          </a:effectRef>
+          <a:fontRef idx="minor">
+            <a:schemeClr val="lt1"/>
+          </a:fontRef>
+        </p:style>
+        <p:txBody>
+          <a:bodyPr rtlCol="0" anchor="ctr"/>
+          <a:lstStyle/>
+          <a:p>
+            <a:pPr algn="ctr"/>
+            <a:r>
+              <a:rPr lang="en-US" altLang="zh-CN" sz="1200" b="1" dirty="0">
+                <a:solidFill>
+                  <a:schemeClr val="tx1"/>
+                </a:solidFill>
+              </a:rPr>
+              <a:t>r</a:t>
+            </a:r>
+            <a:r>
+              <a:rPr lang="en-US" altLang="zh-CN" sz="1200" b="1" dirty="0" smtClean="0">
+                <a:solidFill>
+                  <a:schemeClr val="tx1"/>
+                </a:solidFill>
+              </a:rPr>
+              <a:t>ead data 1#</a:t>
+            </a:r>
+            <a:endParaRPr lang="zh-CN" altLang="en-US" sz="1200" b="1" dirty="0">
+              <a:solidFill>
+                <a:schemeClr val="tx1"/>
+              </a:solidFill>
+            </a:endParaRPr>
+          </a:p>
+        </p:txBody>
+      </p:sp>
+      <p:sp>
+        <p:nvSpPr>
+          <p:cNvPr id="39" name="矩形 38"/>
+          <p:cNvSpPr/>
+          <p:nvPr/>
+        </p:nvSpPr>
+        <p:spPr>
+          <a:xfrm>
+            <a:off x="2123728" y="4112349"/>
+            <a:ext cx="1030713" cy="432048"/>
+          </a:xfrm>
+          <a:prstGeom prst="rect">
+            <a:avLst/>
+          </a:prstGeom>
+          <a:solidFill>
+            <a:schemeClr val="accent5">
+              <a:lumMod val="20000"/>
+              <a:lumOff val="80000"/>
+            </a:schemeClr>
+          </a:solidFill>
+          <a:ln w="12700">
+            <a:solidFill>
+              <a:schemeClr val="bg1">
+                <a:lumMod val="50000"/>
+              </a:schemeClr>
+            </a:solidFill>
+          </a:ln>
+        </p:spPr>
+        <p:style>
+          <a:lnRef idx="2">
+            <a:schemeClr val="accent1">
+              <a:shade val="50000"/>
+            </a:schemeClr>
+          </a:lnRef>
+          <a:fillRef idx="1">
+            <a:schemeClr val="accent1"/>
+          </a:fillRef>
+          <a:effectRef idx="0">
+            <a:schemeClr val="accent1"/>
+          </a:effectRef>
+          <a:fontRef idx="minor">
+            <a:schemeClr val="lt1"/>
+          </a:fontRef>
+        </p:style>
+        <p:txBody>
+          <a:bodyPr rtlCol="0" anchor="ctr"/>
+          <a:lstStyle/>
+          <a:p>
+            <a:pPr algn="ctr"/>
+            <a:r>
+              <a:rPr lang="en-US" altLang="zh-CN" sz="1200" b="1" dirty="0">
+                <a:solidFill>
+                  <a:schemeClr val="tx1"/>
+                </a:solidFill>
+              </a:rPr>
+              <a:t>m</a:t>
+            </a:r>
+            <a:r>
+              <a:rPr lang="en-US" altLang="zh-CN" sz="1200" b="1" dirty="0" smtClean="0">
+                <a:solidFill>
+                  <a:schemeClr val="tx1"/>
+                </a:solidFill>
+              </a:rPr>
+              <a:t>ap 1#</a:t>
+            </a:r>
+            <a:endParaRPr lang="zh-CN" altLang="en-US" sz="1200" b="1" dirty="0">
+              <a:solidFill>
+                <a:schemeClr val="tx1"/>
+              </a:solidFill>
+            </a:endParaRPr>
+          </a:p>
+        </p:txBody>
+      </p:sp>
+      <p:sp>
+        <p:nvSpPr>
+          <p:cNvPr id="40" name="矩形 39"/>
+          <p:cNvSpPr/>
+          <p:nvPr/>
+        </p:nvSpPr>
+        <p:spPr>
+          <a:xfrm>
+            <a:off x="2112691" y="3680301"/>
+            <a:ext cx="841495" cy="432048"/>
+          </a:xfrm>
+          <a:prstGeom prst="rect">
+            <a:avLst/>
+          </a:prstGeom>
+          <a:solidFill>
+            <a:schemeClr val="accent6">
+              <a:lumMod val="20000"/>
+              <a:lumOff val="80000"/>
+            </a:schemeClr>
+          </a:solidFill>
+          <a:ln w="12700">
+            <a:solidFill>
+              <a:schemeClr val="bg1">
+                <a:lumMod val="50000"/>
+              </a:schemeClr>
+            </a:solidFill>
+          </a:ln>
+        </p:spPr>
+        <p:style>
+          <a:lnRef idx="2">
+            <a:schemeClr val="accent1">
+              <a:shade val="50000"/>
+            </a:schemeClr>
+          </a:lnRef>
+          <a:fillRef idx="1">
+            <a:schemeClr val="accent1"/>
+          </a:fillRef>
+          <a:effectRef idx="0">
+            <a:schemeClr val="accent1"/>
+          </a:effectRef>
+          <a:fontRef idx="minor">
+            <a:schemeClr val="lt1"/>
+          </a:fontRef>
+        </p:style>
+        <p:txBody>
+          <a:bodyPr rtlCol="0" anchor="ctr"/>
+          <a:lstStyle/>
+          <a:p>
+            <a:pPr algn="ctr"/>
+            <a:r>
+              <a:rPr lang="en-US" altLang="zh-CN" sz="1200" b="1" dirty="0">
+                <a:solidFill>
+                  <a:schemeClr val="tx1"/>
+                </a:solidFill>
+              </a:rPr>
+              <a:t>r</a:t>
+            </a:r>
+            <a:r>
+              <a:rPr lang="en-US" altLang="zh-CN" sz="1200" b="1" dirty="0" smtClean="0">
+                <a:solidFill>
+                  <a:schemeClr val="tx1"/>
+                </a:solidFill>
+              </a:rPr>
+              <a:t>ead data 2#</a:t>
+            </a:r>
+            <a:endParaRPr lang="zh-CN" altLang="en-US" sz="1200" b="1" dirty="0">
+              <a:solidFill>
+                <a:schemeClr val="tx1"/>
+              </a:solidFill>
+            </a:endParaRPr>
+          </a:p>
+        </p:txBody>
+      </p:sp>
+      <p:sp>
+        <p:nvSpPr>
+          <p:cNvPr id="41" name="矩形 40"/>
+          <p:cNvSpPr/>
+          <p:nvPr/>
+        </p:nvSpPr>
+        <p:spPr>
+          <a:xfrm>
+            <a:off x="2954186" y="3680301"/>
+            <a:ext cx="841495" cy="432048"/>
+          </a:xfrm>
+          <a:prstGeom prst="rect">
+            <a:avLst/>
+          </a:prstGeom>
+          <a:solidFill>
+            <a:schemeClr val="accent6">
+              <a:lumMod val="20000"/>
+              <a:lumOff val="80000"/>
+            </a:schemeClr>
+          </a:solidFill>
+          <a:ln w="12700">
+            <a:solidFill>
+              <a:schemeClr val="bg1">
+                <a:lumMod val="50000"/>
+              </a:schemeClr>
+            </a:solidFill>
+          </a:ln>
+        </p:spPr>
+        <p:style>
+          <a:lnRef idx="2">
+            <a:schemeClr val="accent1">
+              <a:shade val="50000"/>
+            </a:schemeClr>
+          </a:lnRef>
+          <a:fillRef idx="1">
+            <a:schemeClr val="accent1"/>
+          </a:fillRef>
+          <a:effectRef idx="0">
+            <a:schemeClr val="accent1"/>
+          </a:effectRef>
+          <a:fontRef idx="minor">
+            <a:schemeClr val="lt1"/>
+          </a:fontRef>
+        </p:style>
+        <p:txBody>
+          <a:bodyPr rtlCol="0" anchor="ctr"/>
+          <a:lstStyle/>
+          <a:p>
+            <a:pPr algn="ctr"/>
+            <a:r>
+              <a:rPr lang="en-US" altLang="zh-CN" sz="1200" b="1" dirty="0">
+                <a:solidFill>
+                  <a:schemeClr val="tx1"/>
+                </a:solidFill>
+              </a:rPr>
+              <a:t>r</a:t>
+            </a:r>
+            <a:r>
+              <a:rPr lang="en-US" altLang="zh-CN" sz="1200" b="1" dirty="0" smtClean="0">
+                <a:solidFill>
+                  <a:schemeClr val="tx1"/>
+                </a:solidFill>
+              </a:rPr>
+              <a:t>ead data 3#</a:t>
+            </a:r>
+            <a:endParaRPr lang="zh-CN" altLang="en-US" sz="1200" b="1" dirty="0">
+              <a:solidFill>
+                <a:schemeClr val="tx1"/>
+              </a:solidFill>
+            </a:endParaRPr>
+          </a:p>
+        </p:txBody>
+      </p:sp>
+      <p:sp>
+        <p:nvSpPr>
+          <p:cNvPr id="42" name="矩形 41"/>
+          <p:cNvSpPr/>
+          <p:nvPr/>
+        </p:nvSpPr>
+        <p:spPr>
+          <a:xfrm>
+            <a:off x="3787358" y="3680301"/>
+            <a:ext cx="841495" cy="432048"/>
+          </a:xfrm>
+          <a:prstGeom prst="rect">
+            <a:avLst/>
+          </a:prstGeom>
+          <a:solidFill>
+            <a:schemeClr val="accent6">
+              <a:lumMod val="20000"/>
+              <a:lumOff val="80000"/>
+            </a:schemeClr>
+          </a:solidFill>
+          <a:ln w="12700">
+            <a:solidFill>
+              <a:schemeClr val="bg1">
+                <a:lumMod val="50000"/>
+              </a:schemeClr>
+            </a:solidFill>
+          </a:ln>
+        </p:spPr>
+        <p:style>
+          <a:lnRef idx="2">
+            <a:schemeClr val="accent1">
+              <a:shade val="50000"/>
+            </a:schemeClr>
+          </a:lnRef>
+          <a:fillRef idx="1">
+            <a:schemeClr val="accent1"/>
+          </a:fillRef>
+          <a:effectRef idx="0">
+            <a:schemeClr val="accent1"/>
+          </a:effectRef>
+          <a:fontRef idx="minor">
+            <a:schemeClr val="lt1"/>
+          </a:fontRef>
+        </p:style>
+        <p:txBody>
+          <a:bodyPr rtlCol="0" anchor="ctr"/>
+          <a:lstStyle/>
+          <a:p>
+            <a:pPr algn="ctr"/>
+            <a:r>
+              <a:rPr lang="en-US" altLang="zh-CN" sz="1200" b="1" dirty="0">
+                <a:solidFill>
+                  <a:schemeClr val="tx1"/>
+                </a:solidFill>
+              </a:rPr>
+              <a:t>r</a:t>
+            </a:r>
+            <a:r>
+              <a:rPr lang="en-US" altLang="zh-CN" sz="1200" b="1" dirty="0" smtClean="0">
+                <a:solidFill>
+                  <a:schemeClr val="tx1"/>
+                </a:solidFill>
+              </a:rPr>
+              <a:t>ead data 4#</a:t>
+            </a:r>
+            <a:endParaRPr lang="zh-CN" altLang="en-US" sz="1200" b="1" dirty="0">
+              <a:solidFill>
+                <a:schemeClr val="tx1"/>
+              </a:solidFill>
+            </a:endParaRPr>
+          </a:p>
+        </p:txBody>
+      </p:sp>
+      <p:sp>
+        <p:nvSpPr>
+          <p:cNvPr id="43" name="矩形 42"/>
+          <p:cNvSpPr/>
+          <p:nvPr/>
+        </p:nvSpPr>
+        <p:spPr>
+          <a:xfrm>
+            <a:off x="2954186" y="4546774"/>
+            <a:ext cx="1030713" cy="432048"/>
+          </a:xfrm>
+          <a:prstGeom prst="rect">
+            <a:avLst/>
+          </a:prstGeom>
+          <a:solidFill>
+            <a:schemeClr val="accent5">
+              <a:lumMod val="20000"/>
+              <a:lumOff val="80000"/>
+            </a:schemeClr>
+          </a:solidFill>
+          <a:ln w="12700">
+            <a:solidFill>
+              <a:schemeClr val="bg1">
+                <a:lumMod val="50000"/>
+              </a:schemeClr>
+            </a:solidFill>
+          </a:ln>
+        </p:spPr>
+        <p:style>
+          <a:lnRef idx="2">
+            <a:schemeClr val="accent1">
+              <a:shade val="50000"/>
+            </a:schemeClr>
+          </a:lnRef>
+          <a:fillRef idx="1">
+            <a:schemeClr val="accent1"/>
+          </a:fillRef>
+          <a:effectRef idx="0">
+            <a:schemeClr val="accent1"/>
+          </a:effectRef>
+          <a:fontRef idx="minor">
+            <a:schemeClr val="lt1"/>
+          </a:fontRef>
+        </p:style>
+        <p:txBody>
+          <a:bodyPr rtlCol="0" anchor="ctr"/>
+          <a:lstStyle/>
+          <a:p>
+            <a:pPr algn="ctr"/>
+            <a:r>
+              <a:rPr lang="en-US" altLang="zh-CN" sz="1200" b="1" dirty="0">
+                <a:solidFill>
+                  <a:schemeClr val="tx1"/>
+                </a:solidFill>
+              </a:rPr>
+              <a:t>m</a:t>
+            </a:r>
+            <a:r>
+              <a:rPr lang="en-US" altLang="zh-CN" sz="1200" b="1" dirty="0" smtClean="0">
+                <a:solidFill>
+                  <a:schemeClr val="tx1"/>
+                </a:solidFill>
+              </a:rPr>
+              <a:t>ap 2#</a:t>
+            </a:r>
+            <a:endParaRPr lang="zh-CN" altLang="en-US" sz="1200" b="1" dirty="0">
+              <a:solidFill>
+                <a:schemeClr val="tx1"/>
+              </a:solidFill>
+            </a:endParaRPr>
+          </a:p>
+        </p:txBody>
+      </p:sp>
+      <p:sp>
+        <p:nvSpPr>
+          <p:cNvPr id="44" name="TextBox 43"/>
+          <p:cNvSpPr txBox="1"/>
+          <p:nvPr/>
+        </p:nvSpPr>
+        <p:spPr>
+          <a:xfrm>
+            <a:off x="0" y="4608909"/>
+            <a:ext cx="1356397" cy="307777"/>
+          </a:xfrm>
+          <a:prstGeom prst="rect">
+            <a:avLst/>
+          </a:prstGeom>
+          <a:noFill/>
+        </p:spPr>
+        <p:txBody>
+          <a:bodyPr wrap="none" rtlCol="0">
+            <a:spAutoFit/>
+          </a:bodyPr>
+          <a:lstStyle/>
+          <a:p>
+            <a:r>
+              <a:rPr lang="en-US" altLang="zh-CN" sz="1400" b="1" dirty="0" smtClean="0"/>
+              <a:t>Map Kernel 2</a:t>
+            </a:r>
+            <a:r>
+              <a:rPr lang="zh-CN" altLang="en-US" sz="1400" b="1" dirty="0" smtClean="0"/>
+              <a:t>：</a:t>
+            </a:r>
+            <a:endParaRPr lang="zh-CN" altLang="en-US" sz="1400" b="1" dirty="0"/>
+          </a:p>
+        </p:txBody>
+      </p:sp>
+      <p:sp>
+        <p:nvSpPr>
+          <p:cNvPr id="45" name="矩形 44"/>
+          <p:cNvSpPr/>
+          <p:nvPr/>
+        </p:nvSpPr>
+        <p:spPr>
+          <a:xfrm>
+            <a:off x="3787358" y="4112349"/>
+            <a:ext cx="1030713" cy="432048"/>
+          </a:xfrm>
+          <a:prstGeom prst="rect">
+            <a:avLst/>
+          </a:prstGeom>
+          <a:solidFill>
+            <a:schemeClr val="accent5">
+              <a:lumMod val="20000"/>
+              <a:lumOff val="80000"/>
+            </a:schemeClr>
+          </a:solidFill>
+          <a:ln w="12700">
+            <a:solidFill>
+              <a:schemeClr val="bg1">
+                <a:lumMod val="50000"/>
+              </a:schemeClr>
+            </a:solidFill>
+          </a:ln>
+        </p:spPr>
+        <p:style>
+          <a:lnRef idx="2">
+            <a:schemeClr val="accent1">
+              <a:shade val="50000"/>
+            </a:schemeClr>
+          </a:lnRef>
+          <a:fillRef idx="1">
+            <a:schemeClr val="accent1"/>
+          </a:fillRef>
+          <a:effectRef idx="0">
+            <a:schemeClr val="accent1"/>
+          </a:effectRef>
+          <a:fontRef idx="minor">
+            <a:schemeClr val="lt1"/>
+          </a:fontRef>
+        </p:style>
+        <p:txBody>
+          <a:bodyPr rtlCol="0" anchor="ctr"/>
+          <a:lstStyle/>
+          <a:p>
+            <a:pPr algn="ctr"/>
+            <a:r>
+              <a:rPr lang="en-US" altLang="zh-CN" sz="1200" b="1" dirty="0">
+                <a:solidFill>
+                  <a:schemeClr val="tx1"/>
+                </a:solidFill>
+              </a:rPr>
+              <a:t>m</a:t>
+            </a:r>
+            <a:r>
+              <a:rPr lang="en-US" altLang="zh-CN" sz="1200" b="1" dirty="0" smtClean="0">
+                <a:solidFill>
+                  <a:schemeClr val="tx1"/>
+                </a:solidFill>
+              </a:rPr>
+              <a:t>ap 3#</a:t>
+            </a:r>
+            <a:endParaRPr lang="zh-CN" altLang="en-US" sz="1200" b="1" dirty="0">
+              <a:solidFill>
+                <a:schemeClr val="tx1"/>
+              </a:solidFill>
+            </a:endParaRPr>
+          </a:p>
+        </p:txBody>
+      </p:sp>
+      <p:sp>
+        <p:nvSpPr>
+          <p:cNvPr id="46" name="矩形 45"/>
+          <p:cNvSpPr/>
+          <p:nvPr/>
+        </p:nvSpPr>
+        <p:spPr>
+          <a:xfrm>
+            <a:off x="4647862" y="4546774"/>
+            <a:ext cx="1030713" cy="432048"/>
+          </a:xfrm>
+          <a:prstGeom prst="rect">
+            <a:avLst/>
+          </a:prstGeom>
+          <a:solidFill>
+            <a:schemeClr val="accent5">
+              <a:lumMod val="20000"/>
+              <a:lumOff val="80000"/>
+            </a:schemeClr>
+          </a:solidFill>
+          <a:ln w="12700">
+            <a:solidFill>
+              <a:schemeClr val="bg1">
+                <a:lumMod val="50000"/>
+              </a:schemeClr>
+            </a:solidFill>
+          </a:ln>
+        </p:spPr>
+        <p:style>
+          <a:lnRef idx="2">
+            <a:schemeClr val="accent1">
+              <a:shade val="50000"/>
+            </a:schemeClr>
+          </a:lnRef>
+          <a:fillRef idx="1">
+            <a:schemeClr val="accent1"/>
+          </a:fillRef>
+          <a:effectRef idx="0">
+            <a:schemeClr val="accent1"/>
+          </a:effectRef>
+          <a:fontRef idx="minor">
+            <a:schemeClr val="lt1"/>
+          </a:fontRef>
+        </p:style>
+        <p:txBody>
+          <a:bodyPr rtlCol="0" anchor="ctr"/>
+          <a:lstStyle/>
+          <a:p>
+            <a:pPr algn="ctr"/>
+            <a:r>
+              <a:rPr lang="en-US" altLang="zh-CN" sz="1200" b="1" dirty="0">
+                <a:solidFill>
+                  <a:schemeClr val="tx1"/>
+                </a:solidFill>
+              </a:rPr>
+              <a:t>m</a:t>
+            </a:r>
+            <a:r>
+              <a:rPr lang="en-US" altLang="zh-CN" sz="1200" b="1" dirty="0" smtClean="0">
+                <a:solidFill>
+                  <a:schemeClr val="tx1"/>
+                </a:solidFill>
+              </a:rPr>
+              <a:t>ap 4#</a:t>
+            </a:r>
+            <a:endParaRPr lang="zh-CN" altLang="en-US" sz="1200" b="1" dirty="0">
+              <a:solidFill>
+                <a:schemeClr val="tx1"/>
+              </a:solidFill>
+            </a:endParaRPr>
+          </a:p>
+        </p:txBody>
+      </p:sp>
+      <p:cxnSp>
+        <p:nvCxnSpPr>
+          <p:cNvPr id="47" name="直接箭头连接符 46"/>
+          <p:cNvCxnSpPr/>
+          <p:nvPr/>
+        </p:nvCxnSpPr>
+        <p:spPr>
+          <a:xfrm>
+            <a:off x="1115616" y="5157192"/>
+            <a:ext cx="7704856" cy="0"/>
+          </a:xfrm>
+          <a:prstGeom prst="straightConnector1">
+            <a:avLst/>
+          </a:prstGeom>
+          <a:ln>
+            <a:solidFill>
+              <a:schemeClr val="tx1"/>
+            </a:solidFill>
+            <a:headEnd type="none" w="med" len="med"/>
+            <a:tailEnd type="triangle" w="med" len="med"/>
+          </a:ln>
+        </p:spPr>
+        <p:style>
+          <a:lnRef idx="1">
+            <a:schemeClr val="accent1"/>
+          </a:lnRef>
+          <a:fillRef idx="0">
+            <a:schemeClr val="accent1"/>
+          </a:fillRef>
+          <a:effectRef idx="0">
+            <a:schemeClr val="accent1"/>
+          </a:effectRef>
+          <a:fontRef idx="minor">
+            <a:schemeClr val="tx1"/>
+          </a:fontRef>
+        </p:style>
+      </p:cxnSp>
+      <p:sp>
+        <p:nvSpPr>
+          <p:cNvPr id="48" name="TextBox 47"/>
+          <p:cNvSpPr txBox="1"/>
+          <p:nvPr/>
+        </p:nvSpPr>
+        <p:spPr>
+          <a:xfrm>
+            <a:off x="3851920" y="5085184"/>
+            <a:ext cx="1157112" cy="307777"/>
+          </a:xfrm>
+          <a:prstGeom prst="rect">
+            <a:avLst/>
+          </a:prstGeom>
+          <a:noFill/>
+        </p:spPr>
+        <p:txBody>
+          <a:bodyPr wrap="none" rtlCol="0">
+            <a:spAutoFit/>
+          </a:bodyPr>
+          <a:lstStyle/>
+          <a:p>
+            <a:r>
+              <a:rPr lang="en-US" altLang="zh-CN" sz="1400" b="1" dirty="0" smtClean="0"/>
+              <a:t>Process Time</a:t>
+            </a:r>
+            <a:endParaRPr lang="zh-CN" altLang="en-US" sz="1400" b="1" dirty="0"/>
+          </a:p>
+        </p:txBody>
+      </p:sp>
     </p:spTree>
     <p:extLst>
       <p:ext uri="{BB962C8B-B14F-4D97-AF65-F5344CB8AC3E}">
@@ -33682,35 +35278,35 @@
                 <a:gridCol w="763270">
                   <a:extLst>
                     <a:ext uri="{9D8B030D-6E8A-4147-A177-3AD203B41FA5}">
-                      <a16:colId xmlns="" xmlns:a16="http://schemas.microsoft.com/office/drawing/2014/main" val="3326979791"/>
+                      <a16:colId xmlns:a16="http://schemas.microsoft.com/office/drawing/2014/main" xmlns="" val="3326979791"/>
                     </a:ext>
                   </a:extLst>
                 </a:gridCol>
                 <a:gridCol w="542325">
                   <a:extLst>
                     <a:ext uri="{9D8B030D-6E8A-4147-A177-3AD203B41FA5}">
-                      <a16:colId xmlns="" xmlns:a16="http://schemas.microsoft.com/office/drawing/2014/main" val="637607070"/>
+                      <a16:colId xmlns:a16="http://schemas.microsoft.com/office/drawing/2014/main" xmlns="" val="637607070"/>
                     </a:ext>
                   </a:extLst>
                 </a:gridCol>
                 <a:gridCol w="542325">
                   <a:extLst>
                     <a:ext uri="{9D8B030D-6E8A-4147-A177-3AD203B41FA5}">
-                      <a16:colId xmlns="" xmlns:a16="http://schemas.microsoft.com/office/drawing/2014/main" val="1695508235"/>
+                      <a16:colId xmlns:a16="http://schemas.microsoft.com/office/drawing/2014/main" xmlns="" val="1695508235"/>
                     </a:ext>
                   </a:extLst>
                 </a:gridCol>
                 <a:gridCol w="542325">
                   <a:extLst>
                     <a:ext uri="{9D8B030D-6E8A-4147-A177-3AD203B41FA5}">
-                      <a16:colId xmlns="" xmlns:a16="http://schemas.microsoft.com/office/drawing/2014/main" val="1870987448"/>
+                      <a16:colId xmlns:a16="http://schemas.microsoft.com/office/drawing/2014/main" xmlns="" val="1870987448"/>
                     </a:ext>
                   </a:extLst>
                 </a:gridCol>
                 <a:gridCol w="542325">
                   <a:extLst>
                     <a:ext uri="{9D8B030D-6E8A-4147-A177-3AD203B41FA5}">
-                      <a16:colId xmlns="" xmlns:a16="http://schemas.microsoft.com/office/drawing/2014/main" val="324699617"/>
+                      <a16:colId xmlns:a16="http://schemas.microsoft.com/office/drawing/2014/main" xmlns="" val="324699617"/>
                     </a:ext>
                   </a:extLst>
                 </a:gridCol>
@@ -34078,7 +35674,7 @@
                 </a:tc>
                 <a:extLst>
                   <a:ext uri="{0D108BD9-81ED-4DB2-BD59-A6C34878D82A}">
-                    <a16:rowId xmlns="" xmlns:a16="http://schemas.microsoft.com/office/drawing/2014/main" val="798814532"/>
+                    <a16:rowId xmlns:a16="http://schemas.microsoft.com/office/drawing/2014/main" xmlns="" val="798814532"/>
                   </a:ext>
                 </a:extLst>
               </a:tr>
@@ -34425,7 +36021,7 @@
                 </a:tc>
                 <a:extLst>
                   <a:ext uri="{0D108BD9-81ED-4DB2-BD59-A6C34878D82A}">
-                    <a16:rowId xmlns="" xmlns:a16="http://schemas.microsoft.com/office/drawing/2014/main" val="1491202224"/>
+                    <a16:rowId xmlns:a16="http://schemas.microsoft.com/office/drawing/2014/main" xmlns="" val="1491202224"/>
                   </a:ext>
                 </a:extLst>
               </a:tr>
@@ -34750,7 +36346,7 @@
                 </a:tc>
                 <a:extLst>
                   <a:ext uri="{0D108BD9-81ED-4DB2-BD59-A6C34878D82A}">
-                    <a16:rowId xmlns="" xmlns:a16="http://schemas.microsoft.com/office/drawing/2014/main" val="2457331936"/>
+                    <a16:rowId xmlns:a16="http://schemas.microsoft.com/office/drawing/2014/main" xmlns="" val="2457331936"/>
                   </a:ext>
                 </a:extLst>
               </a:tr>
@@ -34880,35 +36476,35 @@
                 <a:gridCol w="763270">
                   <a:extLst>
                     <a:ext uri="{9D8B030D-6E8A-4147-A177-3AD203B41FA5}">
-                      <a16:colId xmlns="" xmlns:a16="http://schemas.microsoft.com/office/drawing/2014/main" val="3326979791"/>
+                      <a16:colId xmlns:a16="http://schemas.microsoft.com/office/drawing/2014/main" xmlns="" val="3326979791"/>
                     </a:ext>
                   </a:extLst>
                 </a:gridCol>
                 <a:gridCol w="542325">
                   <a:extLst>
                     <a:ext uri="{9D8B030D-6E8A-4147-A177-3AD203B41FA5}">
-                      <a16:colId xmlns="" xmlns:a16="http://schemas.microsoft.com/office/drawing/2014/main" val="637607070"/>
+                      <a16:colId xmlns:a16="http://schemas.microsoft.com/office/drawing/2014/main" xmlns="" val="637607070"/>
                     </a:ext>
                   </a:extLst>
                 </a:gridCol>
                 <a:gridCol w="542325">
                   <a:extLst>
                     <a:ext uri="{9D8B030D-6E8A-4147-A177-3AD203B41FA5}">
-                      <a16:colId xmlns="" xmlns:a16="http://schemas.microsoft.com/office/drawing/2014/main" val="1695508235"/>
+                      <a16:colId xmlns:a16="http://schemas.microsoft.com/office/drawing/2014/main" xmlns="" val="1695508235"/>
                     </a:ext>
                   </a:extLst>
                 </a:gridCol>
                 <a:gridCol w="542325">
                   <a:extLst>
                     <a:ext uri="{9D8B030D-6E8A-4147-A177-3AD203B41FA5}">
-                      <a16:colId xmlns="" xmlns:a16="http://schemas.microsoft.com/office/drawing/2014/main" val="1870987448"/>
+                      <a16:colId xmlns:a16="http://schemas.microsoft.com/office/drawing/2014/main" xmlns="" val="1870987448"/>
                     </a:ext>
                   </a:extLst>
                 </a:gridCol>
                 <a:gridCol w="542325">
                   <a:extLst>
                     <a:ext uri="{9D8B030D-6E8A-4147-A177-3AD203B41FA5}">
-                      <a16:colId xmlns="" xmlns:a16="http://schemas.microsoft.com/office/drawing/2014/main" val="324699617"/>
+                      <a16:colId xmlns:a16="http://schemas.microsoft.com/office/drawing/2014/main" xmlns="" val="324699617"/>
                     </a:ext>
                   </a:extLst>
                 </a:gridCol>
@@ -35276,7 +36872,7 @@
                 </a:tc>
                 <a:extLst>
                   <a:ext uri="{0D108BD9-81ED-4DB2-BD59-A6C34878D82A}">
-                    <a16:rowId xmlns="" xmlns:a16="http://schemas.microsoft.com/office/drawing/2014/main" val="798814532"/>
+                    <a16:rowId xmlns:a16="http://schemas.microsoft.com/office/drawing/2014/main" xmlns="" val="798814532"/>
                   </a:ext>
                 </a:extLst>
               </a:tr>
@@ -35623,7 +37219,7 @@
                 </a:tc>
                 <a:extLst>
                   <a:ext uri="{0D108BD9-81ED-4DB2-BD59-A6C34878D82A}">
-                    <a16:rowId xmlns="" xmlns:a16="http://schemas.microsoft.com/office/drawing/2014/main" val="1491202224"/>
+                    <a16:rowId xmlns:a16="http://schemas.microsoft.com/office/drawing/2014/main" xmlns="" val="1491202224"/>
                   </a:ext>
                 </a:extLst>
               </a:tr>
@@ -35978,7 +37574,7 @@
                 </a:tc>
                 <a:extLst>
                   <a:ext uri="{0D108BD9-81ED-4DB2-BD59-A6C34878D82A}">
-                    <a16:rowId xmlns="" xmlns:a16="http://schemas.microsoft.com/office/drawing/2014/main" val="2457331936"/>
+                    <a16:rowId xmlns:a16="http://schemas.microsoft.com/office/drawing/2014/main" xmlns="" val="2457331936"/>
                   </a:ext>
                 </a:extLst>
               </a:tr>
@@ -36116,35 +37712,35 @@
                 <a:gridCol w="763270">
                   <a:extLst>
                     <a:ext uri="{9D8B030D-6E8A-4147-A177-3AD203B41FA5}">
-                      <a16:colId xmlns="" xmlns:a16="http://schemas.microsoft.com/office/drawing/2014/main" val="3326979791"/>
+                      <a16:colId xmlns:a16="http://schemas.microsoft.com/office/drawing/2014/main" xmlns="" val="3326979791"/>
                     </a:ext>
                   </a:extLst>
                 </a:gridCol>
                 <a:gridCol w="542325">
                   <a:extLst>
                     <a:ext uri="{9D8B030D-6E8A-4147-A177-3AD203B41FA5}">
-                      <a16:colId xmlns="" xmlns:a16="http://schemas.microsoft.com/office/drawing/2014/main" val="637607070"/>
+                      <a16:colId xmlns:a16="http://schemas.microsoft.com/office/drawing/2014/main" xmlns="" val="637607070"/>
                     </a:ext>
                   </a:extLst>
                 </a:gridCol>
                 <a:gridCol w="542325">
                   <a:extLst>
                     <a:ext uri="{9D8B030D-6E8A-4147-A177-3AD203B41FA5}">
-                      <a16:colId xmlns="" xmlns:a16="http://schemas.microsoft.com/office/drawing/2014/main" val="1695508235"/>
+                      <a16:colId xmlns:a16="http://schemas.microsoft.com/office/drawing/2014/main" xmlns="" val="1695508235"/>
                     </a:ext>
                   </a:extLst>
                 </a:gridCol>
                 <a:gridCol w="542325">
                   <a:extLst>
                     <a:ext uri="{9D8B030D-6E8A-4147-A177-3AD203B41FA5}">
-                      <a16:colId xmlns="" xmlns:a16="http://schemas.microsoft.com/office/drawing/2014/main" val="1870987448"/>
+                      <a16:colId xmlns:a16="http://schemas.microsoft.com/office/drawing/2014/main" xmlns="" val="1870987448"/>
                     </a:ext>
                   </a:extLst>
                 </a:gridCol>
                 <a:gridCol w="542325">
                   <a:extLst>
                     <a:ext uri="{9D8B030D-6E8A-4147-A177-3AD203B41FA5}">
-                      <a16:colId xmlns="" xmlns:a16="http://schemas.microsoft.com/office/drawing/2014/main" val="324699617"/>
+                      <a16:colId xmlns:a16="http://schemas.microsoft.com/office/drawing/2014/main" xmlns="" val="324699617"/>
                     </a:ext>
                   </a:extLst>
                 </a:gridCol>
@@ -36512,7 +38108,7 @@
                 </a:tc>
                 <a:extLst>
                   <a:ext uri="{0D108BD9-81ED-4DB2-BD59-A6C34878D82A}">
-                    <a16:rowId xmlns="" xmlns:a16="http://schemas.microsoft.com/office/drawing/2014/main" val="798814532"/>
+                    <a16:rowId xmlns:a16="http://schemas.microsoft.com/office/drawing/2014/main" xmlns="" val="798814532"/>
                   </a:ext>
                 </a:extLst>
               </a:tr>
@@ -36859,7 +38455,7 @@
                 </a:tc>
                 <a:extLst>
                   <a:ext uri="{0D108BD9-81ED-4DB2-BD59-A6C34878D82A}">
-                    <a16:rowId xmlns="" xmlns:a16="http://schemas.microsoft.com/office/drawing/2014/main" val="1491202224"/>
+                    <a16:rowId xmlns:a16="http://schemas.microsoft.com/office/drawing/2014/main" xmlns="" val="1491202224"/>
                   </a:ext>
                 </a:extLst>
               </a:tr>
@@ -37222,7 +38818,7 @@
                 </a:tc>
                 <a:extLst>
                   <a:ext uri="{0D108BD9-81ED-4DB2-BD59-A6C34878D82A}">
-                    <a16:rowId xmlns="" xmlns:a16="http://schemas.microsoft.com/office/drawing/2014/main" val="2457331936"/>
+                    <a16:rowId xmlns:a16="http://schemas.microsoft.com/office/drawing/2014/main" xmlns="" val="2457331936"/>
                   </a:ext>
                 </a:extLst>
               </a:tr>

</xml_diff>

<commit_message>
add 2.10 keras api 20210113.
</commit_message>
<xml_diff>
--- a/ppt/tf.reduce_mean.pptx
+++ b/ppt/tf.reduce_mean.pptx
@@ -141,7 +141,7 @@
   </p:defaultTextStyle>
   <p:extLst>
     <p:ext uri="{EFAFB233-063F-42B5-8137-9DF3F51BA10A}">
-      <p15:sldGuideLst xmlns="" xmlns:p15="http://schemas.microsoft.com/office/powerpoint/2012/main">
+      <p15:sldGuideLst xmlns:p15="http://schemas.microsoft.com/office/powerpoint/2012/main" xmlns="">
         <p15:guide id="1" orient="horz" pos="2160">
           <p15:clr>
             <a:srgbClr val="A4A3A4"/>
@@ -339,7 +339,7 @@
           <a:p>
             <a:fld id="{154D151C-2C25-4305-8E14-82B64FCC1564}" type="datetimeFigureOut">
               <a:rPr lang="zh-CN" altLang="en-US" smtClean="0"/>
-              <a:t>2020/11/28</a:t>
+              <a:t>2021/1/13</a:t>
             </a:fld>
             <a:endParaRPr lang="zh-CN" altLang="en-US"/>
           </a:p>
@@ -509,7 +509,7 @@
           <a:p>
             <a:fld id="{154D151C-2C25-4305-8E14-82B64FCC1564}" type="datetimeFigureOut">
               <a:rPr lang="zh-CN" altLang="en-US" smtClean="0"/>
-              <a:t>2020/11/28</a:t>
+              <a:t>2021/1/13</a:t>
             </a:fld>
             <a:endParaRPr lang="zh-CN" altLang="en-US"/>
           </a:p>
@@ -689,7 +689,7 @@
           <a:p>
             <a:fld id="{154D151C-2C25-4305-8E14-82B64FCC1564}" type="datetimeFigureOut">
               <a:rPr lang="zh-CN" altLang="en-US" smtClean="0"/>
-              <a:t>2020/11/28</a:t>
+              <a:t>2021/1/13</a:t>
             </a:fld>
             <a:endParaRPr lang="zh-CN" altLang="en-US"/>
           </a:p>
@@ -1119,7 +1119,7 @@
           <a:p>
             <a:fld id="{154D151C-2C25-4305-8E14-82B64FCC1564}" type="datetimeFigureOut">
               <a:rPr lang="zh-CN" altLang="en-US" smtClean="0"/>
-              <a:t>2020/11/28</a:t>
+              <a:t>2021/1/13</a:t>
             </a:fld>
             <a:endParaRPr lang="zh-CN" altLang="en-US"/>
           </a:p>
@@ -1365,7 +1365,7 @@
           <a:p>
             <a:fld id="{154D151C-2C25-4305-8E14-82B64FCC1564}" type="datetimeFigureOut">
               <a:rPr lang="zh-CN" altLang="en-US" smtClean="0"/>
-              <a:t>2020/11/28</a:t>
+              <a:t>2021/1/13</a:t>
             </a:fld>
             <a:endParaRPr lang="zh-CN" altLang="en-US"/>
           </a:p>
@@ -1653,7 +1653,7 @@
           <a:p>
             <a:fld id="{154D151C-2C25-4305-8E14-82B64FCC1564}" type="datetimeFigureOut">
               <a:rPr lang="zh-CN" altLang="en-US" smtClean="0"/>
-              <a:t>2020/11/28</a:t>
+              <a:t>2021/1/13</a:t>
             </a:fld>
             <a:endParaRPr lang="zh-CN" altLang="en-US"/>
           </a:p>
@@ -2075,7 +2075,7 @@
           <a:p>
             <a:fld id="{154D151C-2C25-4305-8E14-82B64FCC1564}" type="datetimeFigureOut">
               <a:rPr lang="zh-CN" altLang="en-US" smtClean="0"/>
-              <a:t>2020/11/28</a:t>
+              <a:t>2021/1/13</a:t>
             </a:fld>
             <a:endParaRPr lang="zh-CN" altLang="en-US"/>
           </a:p>
@@ -2193,7 +2193,7 @@
           <a:p>
             <a:fld id="{154D151C-2C25-4305-8E14-82B64FCC1564}" type="datetimeFigureOut">
               <a:rPr lang="zh-CN" altLang="en-US" smtClean="0"/>
-              <a:t>2020/11/28</a:t>
+              <a:t>2021/1/13</a:t>
             </a:fld>
             <a:endParaRPr lang="zh-CN" altLang="en-US"/>
           </a:p>
@@ -2288,7 +2288,7 @@
           <a:p>
             <a:fld id="{154D151C-2C25-4305-8E14-82B64FCC1564}" type="datetimeFigureOut">
               <a:rPr lang="zh-CN" altLang="en-US" smtClean="0"/>
-              <a:t>2020/11/28</a:t>
+              <a:t>2021/1/13</a:t>
             </a:fld>
             <a:endParaRPr lang="zh-CN" altLang="en-US"/>
           </a:p>
@@ -2565,7 +2565,7 @@
           <a:p>
             <a:fld id="{154D151C-2C25-4305-8E14-82B64FCC1564}" type="datetimeFigureOut">
               <a:rPr lang="zh-CN" altLang="en-US" smtClean="0"/>
-              <a:t>2020/11/28</a:t>
+              <a:t>2021/1/13</a:t>
             </a:fld>
             <a:endParaRPr lang="zh-CN" altLang="en-US"/>
           </a:p>
@@ -2818,7 +2818,7 @@
           <a:p>
             <a:fld id="{154D151C-2C25-4305-8E14-82B64FCC1564}" type="datetimeFigureOut">
               <a:rPr lang="zh-CN" altLang="en-US" smtClean="0"/>
-              <a:t>2020/11/28</a:t>
+              <a:t>2021/1/13</a:t>
             </a:fld>
             <a:endParaRPr lang="zh-CN" altLang="en-US"/>
           </a:p>
@@ -3031,7 +3031,7 @@
           <a:p>
             <a:fld id="{154D151C-2C25-4305-8E14-82B64FCC1564}" type="datetimeFigureOut">
               <a:rPr lang="zh-CN" altLang="en-US" smtClean="0"/>
-              <a:t>2020/11/28</a:t>
+              <a:t>2021/1/13</a:t>
             </a:fld>
             <a:endParaRPr lang="zh-CN" altLang="en-US"/>
           </a:p>
@@ -16245,35 +16245,35 @@
                 <a:gridCol w="763270">
                   <a:extLst>
                     <a:ext uri="{9D8B030D-6E8A-4147-A177-3AD203B41FA5}">
-                      <a16:colId xmlns="" xmlns:a16="http://schemas.microsoft.com/office/drawing/2014/main" val="3326979791"/>
+                      <a16:colId xmlns:a16="http://schemas.microsoft.com/office/drawing/2014/main" xmlns="" val="3326979791"/>
                     </a:ext>
                   </a:extLst>
                 </a:gridCol>
                 <a:gridCol w="542325">
                   <a:extLst>
                     <a:ext uri="{9D8B030D-6E8A-4147-A177-3AD203B41FA5}">
-                      <a16:colId xmlns="" xmlns:a16="http://schemas.microsoft.com/office/drawing/2014/main" val="637607070"/>
+                      <a16:colId xmlns:a16="http://schemas.microsoft.com/office/drawing/2014/main" xmlns="" val="637607070"/>
                     </a:ext>
                   </a:extLst>
                 </a:gridCol>
                 <a:gridCol w="542325">
                   <a:extLst>
                     <a:ext uri="{9D8B030D-6E8A-4147-A177-3AD203B41FA5}">
-                      <a16:colId xmlns="" xmlns:a16="http://schemas.microsoft.com/office/drawing/2014/main" val="1695508235"/>
+                      <a16:colId xmlns:a16="http://schemas.microsoft.com/office/drawing/2014/main" xmlns="" val="1695508235"/>
                     </a:ext>
                   </a:extLst>
                 </a:gridCol>
                 <a:gridCol w="542325">
                   <a:extLst>
                     <a:ext uri="{9D8B030D-6E8A-4147-A177-3AD203B41FA5}">
-                      <a16:colId xmlns="" xmlns:a16="http://schemas.microsoft.com/office/drawing/2014/main" val="1870987448"/>
+                      <a16:colId xmlns:a16="http://schemas.microsoft.com/office/drawing/2014/main" xmlns="" val="1870987448"/>
                     </a:ext>
                   </a:extLst>
                 </a:gridCol>
                 <a:gridCol w="542325">
                   <a:extLst>
                     <a:ext uri="{9D8B030D-6E8A-4147-A177-3AD203B41FA5}">
-                      <a16:colId xmlns="" xmlns:a16="http://schemas.microsoft.com/office/drawing/2014/main" val="324699617"/>
+                      <a16:colId xmlns:a16="http://schemas.microsoft.com/office/drawing/2014/main" xmlns="" val="324699617"/>
                     </a:ext>
                   </a:extLst>
                 </a:gridCol>
@@ -16641,7 +16641,7 @@
                 </a:tc>
                 <a:extLst>
                   <a:ext uri="{0D108BD9-81ED-4DB2-BD59-A6C34878D82A}">
-                    <a16:rowId xmlns="" xmlns:a16="http://schemas.microsoft.com/office/drawing/2014/main" val="798814532"/>
+                    <a16:rowId xmlns:a16="http://schemas.microsoft.com/office/drawing/2014/main" xmlns="" val="798814532"/>
                   </a:ext>
                 </a:extLst>
               </a:tr>
@@ -16988,7 +16988,7 @@
                 </a:tc>
                 <a:extLst>
                   <a:ext uri="{0D108BD9-81ED-4DB2-BD59-A6C34878D82A}">
-                    <a16:rowId xmlns="" xmlns:a16="http://schemas.microsoft.com/office/drawing/2014/main" val="1491202224"/>
+                    <a16:rowId xmlns:a16="http://schemas.microsoft.com/office/drawing/2014/main" xmlns="" val="1491202224"/>
                   </a:ext>
                 </a:extLst>
               </a:tr>
@@ -17313,7 +17313,7 @@
                 </a:tc>
                 <a:extLst>
                   <a:ext uri="{0D108BD9-81ED-4DB2-BD59-A6C34878D82A}">
-                    <a16:rowId xmlns="" xmlns:a16="http://schemas.microsoft.com/office/drawing/2014/main" val="2457331936"/>
+                    <a16:rowId xmlns:a16="http://schemas.microsoft.com/office/drawing/2014/main" xmlns="" val="2457331936"/>
                   </a:ext>
                 </a:extLst>
               </a:tr>
@@ -17443,35 +17443,35 @@
                 <a:gridCol w="763270">
                   <a:extLst>
                     <a:ext uri="{9D8B030D-6E8A-4147-A177-3AD203B41FA5}">
-                      <a16:colId xmlns="" xmlns:a16="http://schemas.microsoft.com/office/drawing/2014/main" val="3326979791"/>
+                      <a16:colId xmlns:a16="http://schemas.microsoft.com/office/drawing/2014/main" xmlns="" val="3326979791"/>
                     </a:ext>
                   </a:extLst>
                 </a:gridCol>
                 <a:gridCol w="542325">
                   <a:extLst>
                     <a:ext uri="{9D8B030D-6E8A-4147-A177-3AD203B41FA5}">
-                      <a16:colId xmlns="" xmlns:a16="http://schemas.microsoft.com/office/drawing/2014/main" val="637607070"/>
+                      <a16:colId xmlns:a16="http://schemas.microsoft.com/office/drawing/2014/main" xmlns="" val="637607070"/>
                     </a:ext>
                   </a:extLst>
                 </a:gridCol>
                 <a:gridCol w="542325">
                   <a:extLst>
                     <a:ext uri="{9D8B030D-6E8A-4147-A177-3AD203B41FA5}">
-                      <a16:colId xmlns="" xmlns:a16="http://schemas.microsoft.com/office/drawing/2014/main" val="1695508235"/>
+                      <a16:colId xmlns:a16="http://schemas.microsoft.com/office/drawing/2014/main" xmlns="" val="1695508235"/>
                     </a:ext>
                   </a:extLst>
                 </a:gridCol>
                 <a:gridCol w="542325">
                   <a:extLst>
                     <a:ext uri="{9D8B030D-6E8A-4147-A177-3AD203B41FA5}">
-                      <a16:colId xmlns="" xmlns:a16="http://schemas.microsoft.com/office/drawing/2014/main" val="1870987448"/>
+                      <a16:colId xmlns:a16="http://schemas.microsoft.com/office/drawing/2014/main" xmlns="" val="1870987448"/>
                     </a:ext>
                   </a:extLst>
                 </a:gridCol>
                 <a:gridCol w="542325">
                   <a:extLst>
                     <a:ext uri="{9D8B030D-6E8A-4147-A177-3AD203B41FA5}">
-                      <a16:colId xmlns="" xmlns:a16="http://schemas.microsoft.com/office/drawing/2014/main" val="324699617"/>
+                      <a16:colId xmlns:a16="http://schemas.microsoft.com/office/drawing/2014/main" xmlns="" val="324699617"/>
                     </a:ext>
                   </a:extLst>
                 </a:gridCol>
@@ -17839,7 +17839,7 @@
                 </a:tc>
                 <a:extLst>
                   <a:ext uri="{0D108BD9-81ED-4DB2-BD59-A6C34878D82A}">
-                    <a16:rowId xmlns="" xmlns:a16="http://schemas.microsoft.com/office/drawing/2014/main" val="798814532"/>
+                    <a16:rowId xmlns:a16="http://schemas.microsoft.com/office/drawing/2014/main" xmlns="" val="798814532"/>
                   </a:ext>
                 </a:extLst>
               </a:tr>
@@ -18186,7 +18186,7 @@
                 </a:tc>
                 <a:extLst>
                   <a:ext uri="{0D108BD9-81ED-4DB2-BD59-A6C34878D82A}">
-                    <a16:rowId xmlns="" xmlns:a16="http://schemas.microsoft.com/office/drawing/2014/main" val="1491202224"/>
+                    <a16:rowId xmlns:a16="http://schemas.microsoft.com/office/drawing/2014/main" xmlns="" val="1491202224"/>
                   </a:ext>
                 </a:extLst>
               </a:tr>
@@ -18541,7 +18541,7 @@
                 </a:tc>
                 <a:extLst>
                   <a:ext uri="{0D108BD9-81ED-4DB2-BD59-A6C34878D82A}">
-                    <a16:rowId xmlns="" xmlns:a16="http://schemas.microsoft.com/office/drawing/2014/main" val="2457331936"/>
+                    <a16:rowId xmlns:a16="http://schemas.microsoft.com/office/drawing/2014/main" xmlns="" val="2457331936"/>
                   </a:ext>
                 </a:extLst>
               </a:tr>
@@ -18679,35 +18679,35 @@
                 <a:gridCol w="763270">
                   <a:extLst>
                     <a:ext uri="{9D8B030D-6E8A-4147-A177-3AD203B41FA5}">
-                      <a16:colId xmlns="" xmlns:a16="http://schemas.microsoft.com/office/drawing/2014/main" val="3326979791"/>
+                      <a16:colId xmlns:a16="http://schemas.microsoft.com/office/drawing/2014/main" xmlns="" val="3326979791"/>
                     </a:ext>
                   </a:extLst>
                 </a:gridCol>
                 <a:gridCol w="542325">
                   <a:extLst>
                     <a:ext uri="{9D8B030D-6E8A-4147-A177-3AD203B41FA5}">
-                      <a16:colId xmlns="" xmlns:a16="http://schemas.microsoft.com/office/drawing/2014/main" val="637607070"/>
+                      <a16:colId xmlns:a16="http://schemas.microsoft.com/office/drawing/2014/main" xmlns="" val="637607070"/>
                     </a:ext>
                   </a:extLst>
                 </a:gridCol>
                 <a:gridCol w="542325">
                   <a:extLst>
                     <a:ext uri="{9D8B030D-6E8A-4147-A177-3AD203B41FA5}">
-                      <a16:colId xmlns="" xmlns:a16="http://schemas.microsoft.com/office/drawing/2014/main" val="1695508235"/>
+                      <a16:colId xmlns:a16="http://schemas.microsoft.com/office/drawing/2014/main" xmlns="" val="1695508235"/>
                     </a:ext>
                   </a:extLst>
                 </a:gridCol>
                 <a:gridCol w="542325">
                   <a:extLst>
                     <a:ext uri="{9D8B030D-6E8A-4147-A177-3AD203B41FA5}">
-                      <a16:colId xmlns="" xmlns:a16="http://schemas.microsoft.com/office/drawing/2014/main" val="1870987448"/>
+                      <a16:colId xmlns:a16="http://schemas.microsoft.com/office/drawing/2014/main" xmlns="" val="1870987448"/>
                     </a:ext>
                   </a:extLst>
                 </a:gridCol>
                 <a:gridCol w="542325">
                   <a:extLst>
                     <a:ext uri="{9D8B030D-6E8A-4147-A177-3AD203B41FA5}">
-                      <a16:colId xmlns="" xmlns:a16="http://schemas.microsoft.com/office/drawing/2014/main" val="324699617"/>
+                      <a16:colId xmlns:a16="http://schemas.microsoft.com/office/drawing/2014/main" xmlns="" val="324699617"/>
                     </a:ext>
                   </a:extLst>
                 </a:gridCol>
@@ -19075,7 +19075,7 @@
                 </a:tc>
                 <a:extLst>
                   <a:ext uri="{0D108BD9-81ED-4DB2-BD59-A6C34878D82A}">
-                    <a16:rowId xmlns="" xmlns:a16="http://schemas.microsoft.com/office/drawing/2014/main" val="798814532"/>
+                    <a16:rowId xmlns:a16="http://schemas.microsoft.com/office/drawing/2014/main" xmlns="" val="798814532"/>
                   </a:ext>
                 </a:extLst>
               </a:tr>
@@ -19422,7 +19422,7 @@
                 </a:tc>
                 <a:extLst>
                   <a:ext uri="{0D108BD9-81ED-4DB2-BD59-A6C34878D82A}">
-                    <a16:rowId xmlns="" xmlns:a16="http://schemas.microsoft.com/office/drawing/2014/main" val="1491202224"/>
+                    <a16:rowId xmlns:a16="http://schemas.microsoft.com/office/drawing/2014/main" xmlns="" val="1491202224"/>
                   </a:ext>
                 </a:extLst>
               </a:tr>
@@ -19785,7 +19785,7 @@
                 </a:tc>
                 <a:extLst>
                   <a:ext uri="{0D108BD9-81ED-4DB2-BD59-A6C34878D82A}">
-                    <a16:rowId xmlns="" xmlns:a16="http://schemas.microsoft.com/office/drawing/2014/main" val="2457331936"/>
+                    <a16:rowId xmlns:a16="http://schemas.microsoft.com/office/drawing/2014/main" xmlns="" val="2457331936"/>
                   </a:ext>
                 </a:extLst>
               </a:tr>
@@ -20571,7 +20571,7 @@
                 <a:gridCol w="1152128">
                   <a:extLst>
                     <a:ext uri="{9D8B030D-6E8A-4147-A177-3AD203B41FA5}">
-                      <a16:colId xmlns="" xmlns:a16="http://schemas.microsoft.com/office/drawing/2014/main" val="1214683687"/>
+                      <a16:colId xmlns:a16="http://schemas.microsoft.com/office/drawing/2014/main" xmlns="" val="1214683687"/>
                     </a:ext>
                   </a:extLst>
                 </a:gridCol>
@@ -20644,7 +20644,7 @@
                 </a:tc>
                 <a:extLst>
                   <a:ext uri="{0D108BD9-81ED-4DB2-BD59-A6C34878D82A}">
-                    <a16:rowId xmlns="" xmlns:a16="http://schemas.microsoft.com/office/drawing/2014/main" val="1006269131"/>
+                    <a16:rowId xmlns:a16="http://schemas.microsoft.com/office/drawing/2014/main" xmlns="" val="1006269131"/>
                   </a:ext>
                 </a:extLst>
               </a:tr>
@@ -20750,7 +20750,7 @@
                 </a:tc>
                 <a:extLst>
                   <a:ext uri="{0D108BD9-81ED-4DB2-BD59-A6C34878D82A}">
-                    <a16:rowId xmlns="" xmlns:a16="http://schemas.microsoft.com/office/drawing/2014/main" val="194545254"/>
+                    <a16:rowId xmlns:a16="http://schemas.microsoft.com/office/drawing/2014/main" xmlns="" val="194545254"/>
                   </a:ext>
                 </a:extLst>
               </a:tr>
@@ -20856,7 +20856,7 @@
                 </a:tc>
                 <a:extLst>
                   <a:ext uri="{0D108BD9-81ED-4DB2-BD59-A6C34878D82A}">
-                    <a16:rowId xmlns="" xmlns:a16="http://schemas.microsoft.com/office/drawing/2014/main" val="44223002"/>
+                    <a16:rowId xmlns:a16="http://schemas.microsoft.com/office/drawing/2014/main" xmlns="" val="44223002"/>
                   </a:ext>
                 </a:extLst>
               </a:tr>
@@ -20962,7 +20962,7 @@
                 </a:tc>
                 <a:extLst>
                   <a:ext uri="{0D108BD9-81ED-4DB2-BD59-A6C34878D82A}">
-                    <a16:rowId xmlns="" xmlns:a16="http://schemas.microsoft.com/office/drawing/2014/main" val="4268083801"/>
+                    <a16:rowId xmlns:a16="http://schemas.microsoft.com/office/drawing/2014/main" xmlns="" val="4268083801"/>
                   </a:ext>
                 </a:extLst>
               </a:tr>
@@ -21068,7 +21068,7 @@
                 </a:tc>
                 <a:extLst>
                   <a:ext uri="{0D108BD9-81ED-4DB2-BD59-A6C34878D82A}">
-                    <a16:rowId xmlns="" xmlns:a16="http://schemas.microsoft.com/office/drawing/2014/main" val="2987823741"/>
+                    <a16:rowId xmlns:a16="http://schemas.microsoft.com/office/drawing/2014/main" xmlns="" val="2987823741"/>
                   </a:ext>
                 </a:extLst>
               </a:tr>
@@ -21174,7 +21174,7 @@
                 </a:tc>
                 <a:extLst>
                   <a:ext uri="{0D108BD9-81ED-4DB2-BD59-A6C34878D82A}">
-                    <a16:rowId xmlns="" xmlns:a16="http://schemas.microsoft.com/office/drawing/2014/main" val="193482310"/>
+                    <a16:rowId xmlns:a16="http://schemas.microsoft.com/office/drawing/2014/main" xmlns="" val="193482310"/>
                   </a:ext>
                 </a:extLst>
               </a:tr>
@@ -21280,7 +21280,7 @@
                 </a:tc>
                 <a:extLst>
                   <a:ext uri="{0D108BD9-81ED-4DB2-BD59-A6C34878D82A}">
-                    <a16:rowId xmlns="" xmlns:a16="http://schemas.microsoft.com/office/drawing/2014/main" val="589513760"/>
+                    <a16:rowId xmlns:a16="http://schemas.microsoft.com/office/drawing/2014/main" xmlns="" val="589513760"/>
                   </a:ext>
                 </a:extLst>
               </a:tr>
@@ -21386,7 +21386,7 @@
                 </a:tc>
                 <a:extLst>
                   <a:ext uri="{0D108BD9-81ED-4DB2-BD59-A6C34878D82A}">
-                    <a16:rowId xmlns="" xmlns:a16="http://schemas.microsoft.com/office/drawing/2014/main" val="3314464373"/>
+                    <a16:rowId xmlns:a16="http://schemas.microsoft.com/office/drawing/2014/main" xmlns="" val="3314464373"/>
                   </a:ext>
                 </a:extLst>
               </a:tr>
@@ -21492,7 +21492,7 @@
                 </a:tc>
                 <a:extLst>
                   <a:ext uri="{0D108BD9-81ED-4DB2-BD59-A6C34878D82A}">
-                    <a16:rowId xmlns="" xmlns:a16="http://schemas.microsoft.com/office/drawing/2014/main" val="1811545710"/>
+                    <a16:rowId xmlns:a16="http://schemas.microsoft.com/office/drawing/2014/main" xmlns="" val="1811545710"/>
                   </a:ext>
                 </a:extLst>
               </a:tr>
@@ -21598,7 +21598,7 @@
                 </a:tc>
                 <a:extLst>
                   <a:ext uri="{0D108BD9-81ED-4DB2-BD59-A6C34878D82A}">
-                    <a16:rowId xmlns="" xmlns:a16="http://schemas.microsoft.com/office/drawing/2014/main" val="2525566091"/>
+                    <a16:rowId xmlns:a16="http://schemas.microsoft.com/office/drawing/2014/main" xmlns="" val="2525566091"/>
                   </a:ext>
                 </a:extLst>
               </a:tr>
@@ -21704,7 +21704,7 @@
                 </a:tc>
                 <a:extLst>
                   <a:ext uri="{0D108BD9-81ED-4DB2-BD59-A6C34878D82A}">
-                    <a16:rowId xmlns="" xmlns:a16="http://schemas.microsoft.com/office/drawing/2014/main" val="3360797041"/>
+                    <a16:rowId xmlns:a16="http://schemas.microsoft.com/office/drawing/2014/main" xmlns="" val="3360797041"/>
                   </a:ext>
                 </a:extLst>
               </a:tr>
@@ -21776,7 +21776,7 @@
                 </a:tc>
                 <a:extLst>
                   <a:ext uri="{0D108BD9-81ED-4DB2-BD59-A6C34878D82A}">
-                    <a16:rowId xmlns="" xmlns:a16="http://schemas.microsoft.com/office/drawing/2014/main" val="2873669025"/>
+                    <a16:rowId xmlns:a16="http://schemas.microsoft.com/office/drawing/2014/main" xmlns="" val="2873669025"/>
                   </a:ext>
                 </a:extLst>
               </a:tr>
@@ -21848,7 +21848,7 @@
                 </a:tc>
                 <a:extLst>
                   <a:ext uri="{0D108BD9-81ED-4DB2-BD59-A6C34878D82A}">
-                    <a16:rowId xmlns="" xmlns:a16="http://schemas.microsoft.com/office/drawing/2014/main" val="3732079516"/>
+                    <a16:rowId xmlns:a16="http://schemas.microsoft.com/office/drawing/2014/main" xmlns="" val="3732079516"/>
                   </a:ext>
                 </a:extLst>
               </a:tr>
@@ -21920,7 +21920,7 @@
                 </a:tc>
                 <a:extLst>
                   <a:ext uri="{0D108BD9-81ED-4DB2-BD59-A6C34878D82A}">
-                    <a16:rowId xmlns="" xmlns:a16="http://schemas.microsoft.com/office/drawing/2014/main" val="2966636214"/>
+                    <a16:rowId xmlns:a16="http://schemas.microsoft.com/office/drawing/2014/main" xmlns="" val="2966636214"/>
                   </a:ext>
                 </a:extLst>
               </a:tr>
@@ -21992,7 +21992,7 @@
                 </a:tc>
                 <a:extLst>
                   <a:ext uri="{0D108BD9-81ED-4DB2-BD59-A6C34878D82A}">
-                    <a16:rowId xmlns="" xmlns:a16="http://schemas.microsoft.com/office/drawing/2014/main" val="3891840487"/>
+                    <a16:rowId xmlns:a16="http://schemas.microsoft.com/office/drawing/2014/main" xmlns="" val="3891840487"/>
                   </a:ext>
                 </a:extLst>
               </a:tr>
@@ -22028,7 +22028,7 @@
                 <a:gridCol w="1152128">
                   <a:extLst>
                     <a:ext uri="{9D8B030D-6E8A-4147-A177-3AD203B41FA5}">
-                      <a16:colId xmlns="" xmlns:a16="http://schemas.microsoft.com/office/drawing/2014/main" val="1214683687"/>
+                      <a16:colId xmlns:a16="http://schemas.microsoft.com/office/drawing/2014/main" xmlns="" val="1214683687"/>
                     </a:ext>
                   </a:extLst>
                 </a:gridCol>
@@ -22101,7 +22101,7 @@
                 </a:tc>
                 <a:extLst>
                   <a:ext uri="{0D108BD9-81ED-4DB2-BD59-A6C34878D82A}">
-                    <a16:rowId xmlns="" xmlns:a16="http://schemas.microsoft.com/office/drawing/2014/main" val="1006269131"/>
+                    <a16:rowId xmlns:a16="http://schemas.microsoft.com/office/drawing/2014/main" xmlns="" val="1006269131"/>
                   </a:ext>
                 </a:extLst>
               </a:tr>
@@ -22207,7 +22207,7 @@
                 </a:tc>
                 <a:extLst>
                   <a:ext uri="{0D108BD9-81ED-4DB2-BD59-A6C34878D82A}">
-                    <a16:rowId xmlns="" xmlns:a16="http://schemas.microsoft.com/office/drawing/2014/main" val="194545254"/>
+                    <a16:rowId xmlns:a16="http://schemas.microsoft.com/office/drawing/2014/main" xmlns="" val="194545254"/>
                   </a:ext>
                 </a:extLst>
               </a:tr>
@@ -22313,7 +22313,7 @@
                 </a:tc>
                 <a:extLst>
                   <a:ext uri="{0D108BD9-81ED-4DB2-BD59-A6C34878D82A}">
-                    <a16:rowId xmlns="" xmlns:a16="http://schemas.microsoft.com/office/drawing/2014/main" val="44223002"/>
+                    <a16:rowId xmlns:a16="http://schemas.microsoft.com/office/drawing/2014/main" xmlns="" val="44223002"/>
                   </a:ext>
                 </a:extLst>
               </a:tr>
@@ -22419,7 +22419,7 @@
                 </a:tc>
                 <a:extLst>
                   <a:ext uri="{0D108BD9-81ED-4DB2-BD59-A6C34878D82A}">
-                    <a16:rowId xmlns="" xmlns:a16="http://schemas.microsoft.com/office/drawing/2014/main" val="4268083801"/>
+                    <a16:rowId xmlns:a16="http://schemas.microsoft.com/office/drawing/2014/main" xmlns="" val="4268083801"/>
                   </a:ext>
                 </a:extLst>
               </a:tr>
@@ -22525,7 +22525,7 @@
                 </a:tc>
                 <a:extLst>
                   <a:ext uri="{0D108BD9-81ED-4DB2-BD59-A6C34878D82A}">
-                    <a16:rowId xmlns="" xmlns:a16="http://schemas.microsoft.com/office/drawing/2014/main" val="2987823741"/>
+                    <a16:rowId xmlns:a16="http://schemas.microsoft.com/office/drawing/2014/main" xmlns="" val="2987823741"/>
                   </a:ext>
                 </a:extLst>
               </a:tr>
@@ -22631,7 +22631,7 @@
                 </a:tc>
                 <a:extLst>
                   <a:ext uri="{0D108BD9-81ED-4DB2-BD59-A6C34878D82A}">
-                    <a16:rowId xmlns="" xmlns:a16="http://schemas.microsoft.com/office/drawing/2014/main" val="193482310"/>
+                    <a16:rowId xmlns:a16="http://schemas.microsoft.com/office/drawing/2014/main" xmlns="" val="193482310"/>
                   </a:ext>
                 </a:extLst>
               </a:tr>
@@ -22843,7 +22843,7 @@
                 <a:gridCol w="1152128">
                   <a:extLst>
                     <a:ext uri="{9D8B030D-6E8A-4147-A177-3AD203B41FA5}">
-                      <a16:colId xmlns="" xmlns:a16="http://schemas.microsoft.com/office/drawing/2014/main" val="1214683687"/>
+                      <a16:colId xmlns:a16="http://schemas.microsoft.com/office/drawing/2014/main" xmlns="" val="1214683687"/>
                     </a:ext>
                   </a:extLst>
                 </a:gridCol>
@@ -22916,7 +22916,7 @@
                 </a:tc>
                 <a:extLst>
                   <a:ext uri="{0D108BD9-81ED-4DB2-BD59-A6C34878D82A}">
-                    <a16:rowId xmlns="" xmlns:a16="http://schemas.microsoft.com/office/drawing/2014/main" val="1006269131"/>
+                    <a16:rowId xmlns:a16="http://schemas.microsoft.com/office/drawing/2014/main" xmlns="" val="1006269131"/>
                   </a:ext>
                 </a:extLst>
               </a:tr>
@@ -23022,7 +23022,7 @@
                 </a:tc>
                 <a:extLst>
                   <a:ext uri="{0D108BD9-81ED-4DB2-BD59-A6C34878D82A}">
-                    <a16:rowId xmlns="" xmlns:a16="http://schemas.microsoft.com/office/drawing/2014/main" val="194545254"/>
+                    <a16:rowId xmlns:a16="http://schemas.microsoft.com/office/drawing/2014/main" xmlns="" val="194545254"/>
                   </a:ext>
                 </a:extLst>
               </a:tr>
@@ -23128,7 +23128,7 @@
                 </a:tc>
                 <a:extLst>
                   <a:ext uri="{0D108BD9-81ED-4DB2-BD59-A6C34878D82A}">
-                    <a16:rowId xmlns="" xmlns:a16="http://schemas.microsoft.com/office/drawing/2014/main" val="44223002"/>
+                    <a16:rowId xmlns:a16="http://schemas.microsoft.com/office/drawing/2014/main" xmlns="" val="44223002"/>
                   </a:ext>
                 </a:extLst>
               </a:tr>
@@ -23234,7 +23234,7 @@
                 </a:tc>
                 <a:extLst>
                   <a:ext uri="{0D108BD9-81ED-4DB2-BD59-A6C34878D82A}">
-                    <a16:rowId xmlns="" xmlns:a16="http://schemas.microsoft.com/office/drawing/2014/main" val="4268083801"/>
+                    <a16:rowId xmlns:a16="http://schemas.microsoft.com/office/drawing/2014/main" xmlns="" val="4268083801"/>
                   </a:ext>
                 </a:extLst>
               </a:tr>
@@ -23340,7 +23340,7 @@
                 </a:tc>
                 <a:extLst>
                   <a:ext uri="{0D108BD9-81ED-4DB2-BD59-A6C34878D82A}">
-                    <a16:rowId xmlns="" xmlns:a16="http://schemas.microsoft.com/office/drawing/2014/main" val="2987823741"/>
+                    <a16:rowId xmlns:a16="http://schemas.microsoft.com/office/drawing/2014/main" xmlns="" val="2987823741"/>
                   </a:ext>
                 </a:extLst>
               </a:tr>
@@ -23446,7 +23446,7 @@
                 </a:tc>
                 <a:extLst>
                   <a:ext uri="{0D108BD9-81ED-4DB2-BD59-A6C34878D82A}">
-                    <a16:rowId xmlns="" xmlns:a16="http://schemas.microsoft.com/office/drawing/2014/main" val="193482310"/>
+                    <a16:rowId xmlns:a16="http://schemas.microsoft.com/office/drawing/2014/main" xmlns="" val="193482310"/>
                   </a:ext>
                 </a:extLst>
               </a:tr>
@@ -23552,7 +23552,7 @@
                 </a:tc>
                 <a:extLst>
                   <a:ext uri="{0D108BD9-81ED-4DB2-BD59-A6C34878D82A}">
-                    <a16:rowId xmlns="" xmlns:a16="http://schemas.microsoft.com/office/drawing/2014/main" val="589513760"/>
+                    <a16:rowId xmlns:a16="http://schemas.microsoft.com/office/drawing/2014/main" xmlns="" val="589513760"/>
                   </a:ext>
                 </a:extLst>
               </a:tr>
@@ -23658,7 +23658,7 @@
                 </a:tc>
                 <a:extLst>
                   <a:ext uri="{0D108BD9-81ED-4DB2-BD59-A6C34878D82A}">
-                    <a16:rowId xmlns="" xmlns:a16="http://schemas.microsoft.com/office/drawing/2014/main" val="3314464373"/>
+                    <a16:rowId xmlns:a16="http://schemas.microsoft.com/office/drawing/2014/main" xmlns="" val="3314464373"/>
                   </a:ext>
                 </a:extLst>
               </a:tr>
@@ -23764,7 +23764,7 @@
                 </a:tc>
                 <a:extLst>
                   <a:ext uri="{0D108BD9-81ED-4DB2-BD59-A6C34878D82A}">
-                    <a16:rowId xmlns="" xmlns:a16="http://schemas.microsoft.com/office/drawing/2014/main" val="1811545710"/>
+                    <a16:rowId xmlns:a16="http://schemas.microsoft.com/office/drawing/2014/main" xmlns="" val="1811545710"/>
                   </a:ext>
                 </a:extLst>
               </a:tr>
@@ -23870,7 +23870,7 @@
                 </a:tc>
                 <a:extLst>
                   <a:ext uri="{0D108BD9-81ED-4DB2-BD59-A6C34878D82A}">
-                    <a16:rowId xmlns="" xmlns:a16="http://schemas.microsoft.com/office/drawing/2014/main" val="2525566091"/>
+                    <a16:rowId xmlns:a16="http://schemas.microsoft.com/office/drawing/2014/main" xmlns="" val="2525566091"/>
                   </a:ext>
                 </a:extLst>
               </a:tr>
@@ -23976,7 +23976,7 @@
                 </a:tc>
                 <a:extLst>
                   <a:ext uri="{0D108BD9-81ED-4DB2-BD59-A6C34878D82A}">
-                    <a16:rowId xmlns="" xmlns:a16="http://schemas.microsoft.com/office/drawing/2014/main" val="3360797041"/>
+                    <a16:rowId xmlns:a16="http://schemas.microsoft.com/office/drawing/2014/main" xmlns="" val="3360797041"/>
                   </a:ext>
                 </a:extLst>
               </a:tr>
@@ -24048,7 +24048,7 @@
                 </a:tc>
                 <a:extLst>
                   <a:ext uri="{0D108BD9-81ED-4DB2-BD59-A6C34878D82A}">
-                    <a16:rowId xmlns="" xmlns:a16="http://schemas.microsoft.com/office/drawing/2014/main" val="2873669025"/>
+                    <a16:rowId xmlns:a16="http://schemas.microsoft.com/office/drawing/2014/main" xmlns="" val="2873669025"/>
                   </a:ext>
                 </a:extLst>
               </a:tr>
@@ -24120,7 +24120,7 @@
                 </a:tc>
                 <a:extLst>
                   <a:ext uri="{0D108BD9-81ED-4DB2-BD59-A6C34878D82A}">
-                    <a16:rowId xmlns="" xmlns:a16="http://schemas.microsoft.com/office/drawing/2014/main" val="3732079516"/>
+                    <a16:rowId xmlns:a16="http://schemas.microsoft.com/office/drawing/2014/main" xmlns="" val="3732079516"/>
                   </a:ext>
                 </a:extLst>
               </a:tr>
@@ -24192,7 +24192,7 @@
                 </a:tc>
                 <a:extLst>
                   <a:ext uri="{0D108BD9-81ED-4DB2-BD59-A6C34878D82A}">
-                    <a16:rowId xmlns="" xmlns:a16="http://schemas.microsoft.com/office/drawing/2014/main" val="2966636214"/>
+                    <a16:rowId xmlns:a16="http://schemas.microsoft.com/office/drawing/2014/main" xmlns="" val="2966636214"/>
                   </a:ext>
                 </a:extLst>
               </a:tr>
@@ -24264,7 +24264,7 @@
                 </a:tc>
                 <a:extLst>
                   <a:ext uri="{0D108BD9-81ED-4DB2-BD59-A6C34878D82A}">
-                    <a16:rowId xmlns="" xmlns:a16="http://schemas.microsoft.com/office/drawing/2014/main" val="3891840487"/>
+                    <a16:rowId xmlns:a16="http://schemas.microsoft.com/office/drawing/2014/main" xmlns="" val="3891840487"/>
                   </a:ext>
                 </a:extLst>
               </a:tr>
@@ -24300,7 +24300,7 @@
                 <a:gridCol w="1152128">
                   <a:extLst>
                     <a:ext uri="{9D8B030D-6E8A-4147-A177-3AD203B41FA5}">
-                      <a16:colId xmlns="" xmlns:a16="http://schemas.microsoft.com/office/drawing/2014/main" val="1214683687"/>
+                      <a16:colId xmlns:a16="http://schemas.microsoft.com/office/drawing/2014/main" xmlns="" val="1214683687"/>
                     </a:ext>
                   </a:extLst>
                 </a:gridCol>
@@ -24373,7 +24373,7 @@
                 </a:tc>
                 <a:extLst>
                   <a:ext uri="{0D108BD9-81ED-4DB2-BD59-A6C34878D82A}">
-                    <a16:rowId xmlns="" xmlns:a16="http://schemas.microsoft.com/office/drawing/2014/main" val="1006269131"/>
+                    <a16:rowId xmlns:a16="http://schemas.microsoft.com/office/drawing/2014/main" xmlns="" val="1006269131"/>
                   </a:ext>
                 </a:extLst>
               </a:tr>
@@ -24479,7 +24479,7 @@
                 </a:tc>
                 <a:extLst>
                   <a:ext uri="{0D108BD9-81ED-4DB2-BD59-A6C34878D82A}">
-                    <a16:rowId xmlns="" xmlns:a16="http://schemas.microsoft.com/office/drawing/2014/main" val="194545254"/>
+                    <a16:rowId xmlns:a16="http://schemas.microsoft.com/office/drawing/2014/main" xmlns="" val="194545254"/>
                   </a:ext>
                 </a:extLst>
               </a:tr>
@@ -24585,7 +24585,7 @@
                 </a:tc>
                 <a:extLst>
                   <a:ext uri="{0D108BD9-81ED-4DB2-BD59-A6C34878D82A}">
-                    <a16:rowId xmlns="" xmlns:a16="http://schemas.microsoft.com/office/drawing/2014/main" val="44223002"/>
+                    <a16:rowId xmlns:a16="http://schemas.microsoft.com/office/drawing/2014/main" xmlns="" val="44223002"/>
                   </a:ext>
                 </a:extLst>
               </a:tr>
@@ -24674,7 +24674,7 @@
                 </a:tc>
                 <a:extLst>
                   <a:ext uri="{0D108BD9-81ED-4DB2-BD59-A6C34878D82A}">
-                    <a16:rowId xmlns="" xmlns:a16="http://schemas.microsoft.com/office/drawing/2014/main" val="4268083801"/>
+                    <a16:rowId xmlns:a16="http://schemas.microsoft.com/office/drawing/2014/main" xmlns="" val="4268083801"/>
                   </a:ext>
                 </a:extLst>
               </a:tr>
@@ -24780,7 +24780,7 @@
                 </a:tc>
                 <a:extLst>
                   <a:ext uri="{0D108BD9-81ED-4DB2-BD59-A6C34878D82A}">
-                    <a16:rowId xmlns="" xmlns:a16="http://schemas.microsoft.com/office/drawing/2014/main" val="2987823741"/>
+                    <a16:rowId xmlns:a16="http://schemas.microsoft.com/office/drawing/2014/main" xmlns="" val="2987823741"/>
                   </a:ext>
                 </a:extLst>
               </a:tr>
@@ -24886,7 +24886,7 @@
                 </a:tc>
                 <a:extLst>
                   <a:ext uri="{0D108BD9-81ED-4DB2-BD59-A6C34878D82A}">
-                    <a16:rowId xmlns="" xmlns:a16="http://schemas.microsoft.com/office/drawing/2014/main" val="193482310"/>
+                    <a16:rowId xmlns:a16="http://schemas.microsoft.com/office/drawing/2014/main" xmlns="" val="193482310"/>
                   </a:ext>
                 </a:extLst>
               </a:tr>
@@ -25027,7 +25027,7 @@
                 <a:gridCol w="1152128">
                   <a:extLst>
                     <a:ext uri="{9D8B030D-6E8A-4147-A177-3AD203B41FA5}">
-                      <a16:colId xmlns="" xmlns:a16="http://schemas.microsoft.com/office/drawing/2014/main" val="1214683687"/>
+                      <a16:colId xmlns:a16="http://schemas.microsoft.com/office/drawing/2014/main" xmlns="" val="1214683687"/>
                     </a:ext>
                   </a:extLst>
                 </a:gridCol>
@@ -25134,7 +25134,7 @@
                 </a:tc>
                 <a:extLst>
                   <a:ext uri="{0D108BD9-81ED-4DB2-BD59-A6C34878D82A}">
-                    <a16:rowId xmlns="" xmlns:a16="http://schemas.microsoft.com/office/drawing/2014/main" val="4268083801"/>
+                    <a16:rowId xmlns:a16="http://schemas.microsoft.com/office/drawing/2014/main" xmlns="" val="4268083801"/>
                   </a:ext>
                 </a:extLst>
               </a:tr>
@@ -25361,7 +25361,7 @@
                 <a:gridCol w="1152128">
                   <a:extLst>
                     <a:ext uri="{9D8B030D-6E8A-4147-A177-3AD203B41FA5}">
-                      <a16:colId xmlns="" xmlns:a16="http://schemas.microsoft.com/office/drawing/2014/main" val="1214683687"/>
+                      <a16:colId xmlns:a16="http://schemas.microsoft.com/office/drawing/2014/main" xmlns="" val="1214683687"/>
                     </a:ext>
                   </a:extLst>
                 </a:gridCol>
@@ -25434,7 +25434,7 @@
                 </a:tc>
                 <a:extLst>
                   <a:ext uri="{0D108BD9-81ED-4DB2-BD59-A6C34878D82A}">
-                    <a16:rowId xmlns="" xmlns:a16="http://schemas.microsoft.com/office/drawing/2014/main" val="1006269131"/>
+                    <a16:rowId xmlns:a16="http://schemas.microsoft.com/office/drawing/2014/main" xmlns="" val="1006269131"/>
                   </a:ext>
                 </a:extLst>
               </a:tr>
@@ -25540,7 +25540,7 @@
                 </a:tc>
                 <a:extLst>
                   <a:ext uri="{0D108BD9-81ED-4DB2-BD59-A6C34878D82A}">
-                    <a16:rowId xmlns="" xmlns:a16="http://schemas.microsoft.com/office/drawing/2014/main" val="194545254"/>
+                    <a16:rowId xmlns:a16="http://schemas.microsoft.com/office/drawing/2014/main" xmlns="" val="194545254"/>
                   </a:ext>
                 </a:extLst>
               </a:tr>
@@ -25646,7 +25646,7 @@
                 </a:tc>
                 <a:extLst>
                   <a:ext uri="{0D108BD9-81ED-4DB2-BD59-A6C34878D82A}">
-                    <a16:rowId xmlns="" xmlns:a16="http://schemas.microsoft.com/office/drawing/2014/main" val="44223002"/>
+                    <a16:rowId xmlns:a16="http://schemas.microsoft.com/office/drawing/2014/main" xmlns="" val="44223002"/>
                   </a:ext>
                 </a:extLst>
               </a:tr>
@@ -25752,7 +25752,7 @@
                 </a:tc>
                 <a:extLst>
                   <a:ext uri="{0D108BD9-81ED-4DB2-BD59-A6C34878D82A}">
-                    <a16:rowId xmlns="" xmlns:a16="http://schemas.microsoft.com/office/drawing/2014/main" val="4268083801"/>
+                    <a16:rowId xmlns:a16="http://schemas.microsoft.com/office/drawing/2014/main" xmlns="" val="4268083801"/>
                   </a:ext>
                 </a:extLst>
               </a:tr>
@@ -25858,7 +25858,7 @@
                 </a:tc>
                 <a:extLst>
                   <a:ext uri="{0D108BD9-81ED-4DB2-BD59-A6C34878D82A}">
-                    <a16:rowId xmlns="" xmlns:a16="http://schemas.microsoft.com/office/drawing/2014/main" val="2987823741"/>
+                    <a16:rowId xmlns:a16="http://schemas.microsoft.com/office/drawing/2014/main" xmlns="" val="2987823741"/>
                   </a:ext>
                 </a:extLst>
               </a:tr>
@@ -25964,7 +25964,7 @@
                 </a:tc>
                 <a:extLst>
                   <a:ext uri="{0D108BD9-81ED-4DB2-BD59-A6C34878D82A}">
-                    <a16:rowId xmlns="" xmlns:a16="http://schemas.microsoft.com/office/drawing/2014/main" val="193482310"/>
+                    <a16:rowId xmlns:a16="http://schemas.microsoft.com/office/drawing/2014/main" xmlns="" val="193482310"/>
                   </a:ext>
                 </a:extLst>
               </a:tr>
@@ -26076,7 +26076,7 @@
                 </a:tc>
                 <a:extLst>
                   <a:ext uri="{0D108BD9-81ED-4DB2-BD59-A6C34878D82A}">
-                    <a16:rowId xmlns="" xmlns:a16="http://schemas.microsoft.com/office/drawing/2014/main" val="589513760"/>
+                    <a16:rowId xmlns:a16="http://schemas.microsoft.com/office/drawing/2014/main" xmlns="" val="589513760"/>
                   </a:ext>
                 </a:extLst>
               </a:tr>
@@ -26182,7 +26182,7 @@
                 </a:tc>
                 <a:extLst>
                   <a:ext uri="{0D108BD9-81ED-4DB2-BD59-A6C34878D82A}">
-                    <a16:rowId xmlns="" xmlns:a16="http://schemas.microsoft.com/office/drawing/2014/main" val="3314464373"/>
+                    <a16:rowId xmlns:a16="http://schemas.microsoft.com/office/drawing/2014/main" xmlns="" val="3314464373"/>
                   </a:ext>
                 </a:extLst>
               </a:tr>
@@ -26288,7 +26288,7 @@
                 </a:tc>
                 <a:extLst>
                   <a:ext uri="{0D108BD9-81ED-4DB2-BD59-A6C34878D82A}">
-                    <a16:rowId xmlns="" xmlns:a16="http://schemas.microsoft.com/office/drawing/2014/main" val="1811545710"/>
+                    <a16:rowId xmlns:a16="http://schemas.microsoft.com/office/drawing/2014/main" xmlns="" val="1811545710"/>
                   </a:ext>
                 </a:extLst>
               </a:tr>
@@ -26394,7 +26394,7 @@
                 </a:tc>
                 <a:extLst>
                   <a:ext uri="{0D108BD9-81ED-4DB2-BD59-A6C34878D82A}">
-                    <a16:rowId xmlns="" xmlns:a16="http://schemas.microsoft.com/office/drawing/2014/main" val="2525566091"/>
+                    <a16:rowId xmlns:a16="http://schemas.microsoft.com/office/drawing/2014/main" xmlns="" val="2525566091"/>
                   </a:ext>
                 </a:extLst>
               </a:tr>
@@ -26500,7 +26500,7 @@
                 </a:tc>
                 <a:extLst>
                   <a:ext uri="{0D108BD9-81ED-4DB2-BD59-A6C34878D82A}">
-                    <a16:rowId xmlns="" xmlns:a16="http://schemas.microsoft.com/office/drawing/2014/main" val="3360797041"/>
+                    <a16:rowId xmlns:a16="http://schemas.microsoft.com/office/drawing/2014/main" xmlns="" val="3360797041"/>
                   </a:ext>
                 </a:extLst>
               </a:tr>
@@ -26572,7 +26572,7 @@
                 </a:tc>
                 <a:extLst>
                   <a:ext uri="{0D108BD9-81ED-4DB2-BD59-A6C34878D82A}">
-                    <a16:rowId xmlns="" xmlns:a16="http://schemas.microsoft.com/office/drawing/2014/main" val="2873669025"/>
+                    <a16:rowId xmlns:a16="http://schemas.microsoft.com/office/drawing/2014/main" xmlns="" val="2873669025"/>
                   </a:ext>
                 </a:extLst>
               </a:tr>
@@ -26644,7 +26644,7 @@
                 </a:tc>
                 <a:extLst>
                   <a:ext uri="{0D108BD9-81ED-4DB2-BD59-A6C34878D82A}">
-                    <a16:rowId xmlns="" xmlns:a16="http://schemas.microsoft.com/office/drawing/2014/main" val="3732079516"/>
+                    <a16:rowId xmlns:a16="http://schemas.microsoft.com/office/drawing/2014/main" xmlns="" val="3732079516"/>
                   </a:ext>
                 </a:extLst>
               </a:tr>
@@ -26716,7 +26716,7 @@
                 </a:tc>
                 <a:extLst>
                   <a:ext uri="{0D108BD9-81ED-4DB2-BD59-A6C34878D82A}">
-                    <a16:rowId xmlns="" xmlns:a16="http://schemas.microsoft.com/office/drawing/2014/main" val="2966636214"/>
+                    <a16:rowId xmlns:a16="http://schemas.microsoft.com/office/drawing/2014/main" xmlns="" val="2966636214"/>
                   </a:ext>
                 </a:extLst>
               </a:tr>
@@ -26788,7 +26788,7 @@
                 </a:tc>
                 <a:extLst>
                   <a:ext uri="{0D108BD9-81ED-4DB2-BD59-A6C34878D82A}">
-                    <a16:rowId xmlns="" xmlns:a16="http://schemas.microsoft.com/office/drawing/2014/main" val="3891840487"/>
+                    <a16:rowId xmlns:a16="http://schemas.microsoft.com/office/drawing/2014/main" xmlns="" val="3891840487"/>
                   </a:ext>
                 </a:extLst>
               </a:tr>
@@ -26824,7 +26824,7 @@
                 <a:gridCol w="1152128">
                   <a:extLst>
                     <a:ext uri="{9D8B030D-6E8A-4147-A177-3AD203B41FA5}">
-                      <a16:colId xmlns="" xmlns:a16="http://schemas.microsoft.com/office/drawing/2014/main" val="1214683687"/>
+                      <a16:colId xmlns:a16="http://schemas.microsoft.com/office/drawing/2014/main" xmlns="" val="1214683687"/>
                     </a:ext>
                   </a:extLst>
                 </a:gridCol>
@@ -26897,7 +26897,7 @@
                 </a:tc>
                 <a:extLst>
                   <a:ext uri="{0D108BD9-81ED-4DB2-BD59-A6C34878D82A}">
-                    <a16:rowId xmlns="" xmlns:a16="http://schemas.microsoft.com/office/drawing/2014/main" val="1006269131"/>
+                    <a16:rowId xmlns:a16="http://schemas.microsoft.com/office/drawing/2014/main" xmlns="" val="1006269131"/>
                   </a:ext>
                 </a:extLst>
               </a:tr>
@@ -27003,7 +27003,7 @@
                 </a:tc>
                 <a:extLst>
                   <a:ext uri="{0D108BD9-81ED-4DB2-BD59-A6C34878D82A}">
-                    <a16:rowId xmlns="" xmlns:a16="http://schemas.microsoft.com/office/drawing/2014/main" val="194545254"/>
+                    <a16:rowId xmlns:a16="http://schemas.microsoft.com/office/drawing/2014/main" xmlns="" val="194545254"/>
                   </a:ext>
                 </a:extLst>
               </a:tr>
@@ -27109,7 +27109,7 @@
                 </a:tc>
                 <a:extLst>
                   <a:ext uri="{0D108BD9-81ED-4DB2-BD59-A6C34878D82A}">
-                    <a16:rowId xmlns="" xmlns:a16="http://schemas.microsoft.com/office/drawing/2014/main" val="44223002"/>
+                    <a16:rowId xmlns:a16="http://schemas.microsoft.com/office/drawing/2014/main" xmlns="" val="44223002"/>
                   </a:ext>
                 </a:extLst>
               </a:tr>
@@ -27221,7 +27221,7 @@
                 </a:tc>
                 <a:extLst>
                   <a:ext uri="{0D108BD9-81ED-4DB2-BD59-A6C34878D82A}">
-                    <a16:rowId xmlns="" xmlns:a16="http://schemas.microsoft.com/office/drawing/2014/main" val="4268083801"/>
+                    <a16:rowId xmlns:a16="http://schemas.microsoft.com/office/drawing/2014/main" xmlns="" val="4268083801"/>
                   </a:ext>
                 </a:extLst>
               </a:tr>
@@ -27327,7 +27327,7 @@
                 </a:tc>
                 <a:extLst>
                   <a:ext uri="{0D108BD9-81ED-4DB2-BD59-A6C34878D82A}">
-                    <a16:rowId xmlns="" xmlns:a16="http://schemas.microsoft.com/office/drawing/2014/main" val="2987823741"/>
+                    <a16:rowId xmlns:a16="http://schemas.microsoft.com/office/drawing/2014/main" xmlns="" val="2987823741"/>
                   </a:ext>
                 </a:extLst>
               </a:tr>
@@ -27433,7 +27433,7 @@
                 </a:tc>
                 <a:extLst>
                   <a:ext uri="{0D108BD9-81ED-4DB2-BD59-A6C34878D82A}">
-                    <a16:rowId xmlns="" xmlns:a16="http://schemas.microsoft.com/office/drawing/2014/main" val="193482310"/>
+                    <a16:rowId xmlns:a16="http://schemas.microsoft.com/office/drawing/2014/main" xmlns="" val="193482310"/>
                   </a:ext>
                 </a:extLst>
               </a:tr>
@@ -35278,35 +35278,35 @@
                 <a:gridCol w="763270">
                   <a:extLst>
                     <a:ext uri="{9D8B030D-6E8A-4147-A177-3AD203B41FA5}">
-                      <a16:colId xmlns="" xmlns:a16="http://schemas.microsoft.com/office/drawing/2014/main" val="3326979791"/>
+                      <a16:colId xmlns:a16="http://schemas.microsoft.com/office/drawing/2014/main" xmlns="" val="3326979791"/>
                     </a:ext>
                   </a:extLst>
                 </a:gridCol>
                 <a:gridCol w="542325">
                   <a:extLst>
                     <a:ext uri="{9D8B030D-6E8A-4147-A177-3AD203B41FA5}">
-                      <a16:colId xmlns="" xmlns:a16="http://schemas.microsoft.com/office/drawing/2014/main" val="637607070"/>
+                      <a16:colId xmlns:a16="http://schemas.microsoft.com/office/drawing/2014/main" xmlns="" val="637607070"/>
                     </a:ext>
                   </a:extLst>
                 </a:gridCol>
                 <a:gridCol w="542325">
                   <a:extLst>
                     <a:ext uri="{9D8B030D-6E8A-4147-A177-3AD203B41FA5}">
-                      <a16:colId xmlns="" xmlns:a16="http://schemas.microsoft.com/office/drawing/2014/main" val="1695508235"/>
+                      <a16:colId xmlns:a16="http://schemas.microsoft.com/office/drawing/2014/main" xmlns="" val="1695508235"/>
                     </a:ext>
                   </a:extLst>
                 </a:gridCol>
                 <a:gridCol w="542325">
                   <a:extLst>
                     <a:ext uri="{9D8B030D-6E8A-4147-A177-3AD203B41FA5}">
-                      <a16:colId xmlns="" xmlns:a16="http://schemas.microsoft.com/office/drawing/2014/main" val="1870987448"/>
+                      <a16:colId xmlns:a16="http://schemas.microsoft.com/office/drawing/2014/main" xmlns="" val="1870987448"/>
                     </a:ext>
                   </a:extLst>
                 </a:gridCol>
                 <a:gridCol w="542325">
                   <a:extLst>
                     <a:ext uri="{9D8B030D-6E8A-4147-A177-3AD203B41FA5}">
-                      <a16:colId xmlns="" xmlns:a16="http://schemas.microsoft.com/office/drawing/2014/main" val="324699617"/>
+                      <a16:colId xmlns:a16="http://schemas.microsoft.com/office/drawing/2014/main" xmlns="" val="324699617"/>
                     </a:ext>
                   </a:extLst>
                 </a:gridCol>
@@ -35674,7 +35674,7 @@
                 </a:tc>
                 <a:extLst>
                   <a:ext uri="{0D108BD9-81ED-4DB2-BD59-A6C34878D82A}">
-                    <a16:rowId xmlns="" xmlns:a16="http://schemas.microsoft.com/office/drawing/2014/main" val="798814532"/>
+                    <a16:rowId xmlns:a16="http://schemas.microsoft.com/office/drawing/2014/main" xmlns="" val="798814532"/>
                   </a:ext>
                 </a:extLst>
               </a:tr>
@@ -36021,7 +36021,7 @@
                 </a:tc>
                 <a:extLst>
                   <a:ext uri="{0D108BD9-81ED-4DB2-BD59-A6C34878D82A}">
-                    <a16:rowId xmlns="" xmlns:a16="http://schemas.microsoft.com/office/drawing/2014/main" val="1491202224"/>
+                    <a16:rowId xmlns:a16="http://schemas.microsoft.com/office/drawing/2014/main" xmlns="" val="1491202224"/>
                   </a:ext>
                 </a:extLst>
               </a:tr>
@@ -36346,7 +36346,7 @@
                 </a:tc>
                 <a:extLst>
                   <a:ext uri="{0D108BD9-81ED-4DB2-BD59-A6C34878D82A}">
-                    <a16:rowId xmlns="" xmlns:a16="http://schemas.microsoft.com/office/drawing/2014/main" val="2457331936"/>
+                    <a16:rowId xmlns:a16="http://schemas.microsoft.com/office/drawing/2014/main" xmlns="" val="2457331936"/>
                   </a:ext>
                 </a:extLst>
               </a:tr>
@@ -36476,35 +36476,35 @@
                 <a:gridCol w="763270">
                   <a:extLst>
                     <a:ext uri="{9D8B030D-6E8A-4147-A177-3AD203B41FA5}">
-                      <a16:colId xmlns="" xmlns:a16="http://schemas.microsoft.com/office/drawing/2014/main" val="3326979791"/>
+                      <a16:colId xmlns:a16="http://schemas.microsoft.com/office/drawing/2014/main" xmlns="" val="3326979791"/>
                     </a:ext>
                   </a:extLst>
                 </a:gridCol>
                 <a:gridCol w="542325">
                   <a:extLst>
                     <a:ext uri="{9D8B030D-6E8A-4147-A177-3AD203B41FA5}">
-                      <a16:colId xmlns="" xmlns:a16="http://schemas.microsoft.com/office/drawing/2014/main" val="637607070"/>
+                      <a16:colId xmlns:a16="http://schemas.microsoft.com/office/drawing/2014/main" xmlns="" val="637607070"/>
                     </a:ext>
                   </a:extLst>
                 </a:gridCol>
                 <a:gridCol w="542325">
                   <a:extLst>
                     <a:ext uri="{9D8B030D-6E8A-4147-A177-3AD203B41FA5}">
-                      <a16:colId xmlns="" xmlns:a16="http://schemas.microsoft.com/office/drawing/2014/main" val="1695508235"/>
+                      <a16:colId xmlns:a16="http://schemas.microsoft.com/office/drawing/2014/main" xmlns="" val="1695508235"/>
                     </a:ext>
                   </a:extLst>
                 </a:gridCol>
                 <a:gridCol w="542325">
                   <a:extLst>
                     <a:ext uri="{9D8B030D-6E8A-4147-A177-3AD203B41FA5}">
-                      <a16:colId xmlns="" xmlns:a16="http://schemas.microsoft.com/office/drawing/2014/main" val="1870987448"/>
+                      <a16:colId xmlns:a16="http://schemas.microsoft.com/office/drawing/2014/main" xmlns="" val="1870987448"/>
                     </a:ext>
                   </a:extLst>
                 </a:gridCol>
                 <a:gridCol w="542325">
                   <a:extLst>
                     <a:ext uri="{9D8B030D-6E8A-4147-A177-3AD203B41FA5}">
-                      <a16:colId xmlns="" xmlns:a16="http://schemas.microsoft.com/office/drawing/2014/main" val="324699617"/>
+                      <a16:colId xmlns:a16="http://schemas.microsoft.com/office/drawing/2014/main" xmlns="" val="324699617"/>
                     </a:ext>
                   </a:extLst>
                 </a:gridCol>
@@ -36872,7 +36872,7 @@
                 </a:tc>
                 <a:extLst>
                   <a:ext uri="{0D108BD9-81ED-4DB2-BD59-A6C34878D82A}">
-                    <a16:rowId xmlns="" xmlns:a16="http://schemas.microsoft.com/office/drawing/2014/main" val="798814532"/>
+                    <a16:rowId xmlns:a16="http://schemas.microsoft.com/office/drawing/2014/main" xmlns="" val="798814532"/>
                   </a:ext>
                 </a:extLst>
               </a:tr>
@@ -37219,7 +37219,7 @@
                 </a:tc>
                 <a:extLst>
                   <a:ext uri="{0D108BD9-81ED-4DB2-BD59-A6C34878D82A}">
-                    <a16:rowId xmlns="" xmlns:a16="http://schemas.microsoft.com/office/drawing/2014/main" val="1491202224"/>
+                    <a16:rowId xmlns:a16="http://schemas.microsoft.com/office/drawing/2014/main" xmlns="" val="1491202224"/>
                   </a:ext>
                 </a:extLst>
               </a:tr>
@@ -37574,7 +37574,7 @@
                 </a:tc>
                 <a:extLst>
                   <a:ext uri="{0D108BD9-81ED-4DB2-BD59-A6C34878D82A}">
-                    <a16:rowId xmlns="" xmlns:a16="http://schemas.microsoft.com/office/drawing/2014/main" val="2457331936"/>
+                    <a16:rowId xmlns:a16="http://schemas.microsoft.com/office/drawing/2014/main" xmlns="" val="2457331936"/>
                   </a:ext>
                 </a:extLst>
               </a:tr>
@@ -37712,35 +37712,35 @@
                 <a:gridCol w="763270">
                   <a:extLst>
                     <a:ext uri="{9D8B030D-6E8A-4147-A177-3AD203B41FA5}">
-                      <a16:colId xmlns="" xmlns:a16="http://schemas.microsoft.com/office/drawing/2014/main" val="3326979791"/>
+                      <a16:colId xmlns:a16="http://schemas.microsoft.com/office/drawing/2014/main" xmlns="" val="3326979791"/>
                     </a:ext>
                   </a:extLst>
                 </a:gridCol>
                 <a:gridCol w="542325">
                   <a:extLst>
                     <a:ext uri="{9D8B030D-6E8A-4147-A177-3AD203B41FA5}">
-                      <a16:colId xmlns="" xmlns:a16="http://schemas.microsoft.com/office/drawing/2014/main" val="637607070"/>
+                      <a16:colId xmlns:a16="http://schemas.microsoft.com/office/drawing/2014/main" xmlns="" val="637607070"/>
                     </a:ext>
                   </a:extLst>
                 </a:gridCol>
                 <a:gridCol w="542325">
                   <a:extLst>
                     <a:ext uri="{9D8B030D-6E8A-4147-A177-3AD203B41FA5}">
-                      <a16:colId xmlns="" xmlns:a16="http://schemas.microsoft.com/office/drawing/2014/main" val="1695508235"/>
+                      <a16:colId xmlns:a16="http://schemas.microsoft.com/office/drawing/2014/main" xmlns="" val="1695508235"/>
                     </a:ext>
                   </a:extLst>
                 </a:gridCol>
                 <a:gridCol w="542325">
                   <a:extLst>
                     <a:ext uri="{9D8B030D-6E8A-4147-A177-3AD203B41FA5}">
-                      <a16:colId xmlns="" xmlns:a16="http://schemas.microsoft.com/office/drawing/2014/main" val="1870987448"/>
+                      <a16:colId xmlns:a16="http://schemas.microsoft.com/office/drawing/2014/main" xmlns="" val="1870987448"/>
                     </a:ext>
                   </a:extLst>
                 </a:gridCol>
                 <a:gridCol w="542325">
                   <a:extLst>
                     <a:ext uri="{9D8B030D-6E8A-4147-A177-3AD203B41FA5}">
-                      <a16:colId xmlns="" xmlns:a16="http://schemas.microsoft.com/office/drawing/2014/main" val="324699617"/>
+                      <a16:colId xmlns:a16="http://schemas.microsoft.com/office/drawing/2014/main" xmlns="" val="324699617"/>
                     </a:ext>
                   </a:extLst>
                 </a:gridCol>
@@ -38108,7 +38108,7 @@
                 </a:tc>
                 <a:extLst>
                   <a:ext uri="{0D108BD9-81ED-4DB2-BD59-A6C34878D82A}">
-                    <a16:rowId xmlns="" xmlns:a16="http://schemas.microsoft.com/office/drawing/2014/main" val="798814532"/>
+                    <a16:rowId xmlns:a16="http://schemas.microsoft.com/office/drawing/2014/main" xmlns="" val="798814532"/>
                   </a:ext>
                 </a:extLst>
               </a:tr>
@@ -38455,7 +38455,7 @@
                 </a:tc>
                 <a:extLst>
                   <a:ext uri="{0D108BD9-81ED-4DB2-BD59-A6C34878D82A}">
-                    <a16:rowId xmlns="" xmlns:a16="http://schemas.microsoft.com/office/drawing/2014/main" val="1491202224"/>
+                    <a16:rowId xmlns:a16="http://schemas.microsoft.com/office/drawing/2014/main" xmlns="" val="1491202224"/>
                   </a:ext>
                 </a:extLst>
               </a:tr>
@@ -38818,7 +38818,7 @@
                 </a:tc>
                 <a:extLst>
                   <a:ext uri="{0D108BD9-81ED-4DB2-BD59-A6C34878D82A}">
-                    <a16:rowId xmlns="" xmlns:a16="http://schemas.microsoft.com/office/drawing/2014/main" val="2457331936"/>
+                    <a16:rowId xmlns:a16="http://schemas.microsoft.com/office/drawing/2014/main" xmlns="" val="2457331936"/>
                   </a:ext>
                 </a:extLst>
               </a:tr>
@@ -39995,6 +39995,1260 @@
           <a:chExt cx="0" cy="0"/>
         </a:xfrm>
       </p:grpSpPr>
+      <p:sp>
+        <p:nvSpPr>
+          <p:cNvPr id="2" name="圆角矩形 1"/>
+          <p:cNvSpPr/>
+          <p:nvPr/>
+        </p:nvSpPr>
+        <p:spPr>
+          <a:xfrm>
+            <a:off x="655100" y="1067426"/>
+            <a:ext cx="1576837" cy="504056"/>
+          </a:xfrm>
+          <a:prstGeom prst="roundRect">
+            <a:avLst>
+              <a:gd name="adj" fmla="val 12088"/>
+            </a:avLst>
+          </a:prstGeom>
+        </p:spPr>
+        <p:style>
+          <a:lnRef idx="1">
+            <a:schemeClr val="accent5"/>
+          </a:lnRef>
+          <a:fillRef idx="2">
+            <a:schemeClr val="accent5"/>
+          </a:fillRef>
+          <a:effectRef idx="1">
+            <a:schemeClr val="accent5"/>
+          </a:effectRef>
+          <a:fontRef idx="minor">
+            <a:schemeClr val="dk1"/>
+          </a:fontRef>
+        </p:style>
+        <p:txBody>
+          <a:bodyPr rtlCol="0" anchor="ctr"/>
+          <a:lstStyle/>
+          <a:p>
+            <a:pPr algn="ctr"/>
+            <a:endParaRPr lang="zh-CN" altLang="en-US" sz="1600">
+              <a:solidFill>
+                <a:schemeClr val="tx1"/>
+              </a:solidFill>
+            </a:endParaRPr>
+          </a:p>
+        </p:txBody>
+      </p:sp>
+      <p:sp>
+        <p:nvSpPr>
+          <p:cNvPr id="3" name="文本框 2"/>
+          <p:cNvSpPr txBox="1"/>
+          <p:nvPr/>
+        </p:nvSpPr>
+        <p:spPr>
+          <a:xfrm>
+            <a:off x="807062" y="1158652"/>
+            <a:ext cx="1272913" cy="338554"/>
+          </a:xfrm>
+          <a:prstGeom prst="rect">
+            <a:avLst/>
+          </a:prstGeom>
+          <a:noFill/>
+        </p:spPr>
+        <p:txBody>
+          <a:bodyPr wrap="none" rtlCol="0">
+            <a:spAutoFit/>
+          </a:bodyPr>
+          <a:lstStyle/>
+          <a:p>
+            <a:r>
+              <a:rPr lang="en-US" altLang="zh-CN" sz="1600" dirty="0" smtClean="0"/>
+              <a:t>Prepare Data</a:t>
+            </a:r>
+            <a:endParaRPr lang="zh-CN" altLang="en-US" sz="1600" dirty="0"/>
+          </a:p>
+        </p:txBody>
+      </p:sp>
+      <p:sp>
+        <p:nvSpPr>
+          <p:cNvPr id="4" name="圆角矩形 3"/>
+          <p:cNvSpPr/>
+          <p:nvPr/>
+        </p:nvSpPr>
+        <p:spPr>
+          <a:xfrm>
+            <a:off x="655100" y="1920474"/>
+            <a:ext cx="1576837" cy="504056"/>
+          </a:xfrm>
+          <a:prstGeom prst="roundRect">
+            <a:avLst>
+              <a:gd name="adj" fmla="val 12088"/>
+            </a:avLst>
+          </a:prstGeom>
+        </p:spPr>
+        <p:style>
+          <a:lnRef idx="1">
+            <a:schemeClr val="accent5"/>
+          </a:lnRef>
+          <a:fillRef idx="2">
+            <a:schemeClr val="accent5"/>
+          </a:fillRef>
+          <a:effectRef idx="1">
+            <a:schemeClr val="accent5"/>
+          </a:effectRef>
+          <a:fontRef idx="minor">
+            <a:schemeClr val="dk1"/>
+          </a:fontRef>
+        </p:style>
+        <p:txBody>
+          <a:bodyPr rtlCol="0" anchor="ctr"/>
+          <a:lstStyle/>
+          <a:p>
+            <a:pPr algn="ctr"/>
+            <a:endParaRPr lang="zh-CN" altLang="en-US" sz="1600">
+              <a:solidFill>
+                <a:schemeClr val="tx1"/>
+              </a:solidFill>
+            </a:endParaRPr>
+          </a:p>
+        </p:txBody>
+      </p:sp>
+      <p:sp>
+        <p:nvSpPr>
+          <p:cNvPr id="5" name="文本框 4"/>
+          <p:cNvSpPr txBox="1"/>
+          <p:nvPr/>
+        </p:nvSpPr>
+        <p:spPr>
+          <a:xfrm>
+            <a:off x="847842" y="2003225"/>
+            <a:ext cx="1191352" cy="338554"/>
+          </a:xfrm>
+          <a:prstGeom prst="rect">
+            <a:avLst/>
+          </a:prstGeom>
+          <a:noFill/>
+        </p:spPr>
+        <p:txBody>
+          <a:bodyPr wrap="none" rtlCol="0">
+            <a:spAutoFit/>
+          </a:bodyPr>
+          <a:lstStyle/>
+          <a:p>
+            <a:r>
+              <a:rPr lang="en-US" altLang="zh-CN" sz="1600" dirty="0" smtClean="0"/>
+              <a:t>Build Model</a:t>
+            </a:r>
+            <a:endParaRPr lang="zh-CN" altLang="en-US" sz="1600" dirty="0"/>
+          </a:p>
+        </p:txBody>
+      </p:sp>
+      <p:sp>
+        <p:nvSpPr>
+          <p:cNvPr id="6" name="圆角矩形 5"/>
+          <p:cNvSpPr/>
+          <p:nvPr/>
+        </p:nvSpPr>
+        <p:spPr>
+          <a:xfrm>
+            <a:off x="655100" y="2761019"/>
+            <a:ext cx="1576837" cy="504056"/>
+          </a:xfrm>
+          <a:prstGeom prst="roundRect">
+            <a:avLst>
+              <a:gd name="adj" fmla="val 12088"/>
+            </a:avLst>
+          </a:prstGeom>
+        </p:spPr>
+        <p:style>
+          <a:lnRef idx="1">
+            <a:schemeClr val="accent5"/>
+          </a:lnRef>
+          <a:fillRef idx="2">
+            <a:schemeClr val="accent5"/>
+          </a:fillRef>
+          <a:effectRef idx="1">
+            <a:schemeClr val="accent5"/>
+          </a:effectRef>
+          <a:fontRef idx="minor">
+            <a:schemeClr val="dk1"/>
+          </a:fontRef>
+        </p:style>
+        <p:txBody>
+          <a:bodyPr rtlCol="0" anchor="ctr"/>
+          <a:lstStyle/>
+          <a:p>
+            <a:pPr algn="ctr"/>
+            <a:endParaRPr lang="zh-CN" altLang="en-US" sz="1600">
+              <a:solidFill>
+                <a:schemeClr val="tx1"/>
+              </a:solidFill>
+            </a:endParaRPr>
+          </a:p>
+        </p:txBody>
+      </p:sp>
+      <p:sp>
+        <p:nvSpPr>
+          <p:cNvPr id="7" name="文本框 6"/>
+          <p:cNvSpPr txBox="1"/>
+          <p:nvPr/>
+        </p:nvSpPr>
+        <p:spPr>
+          <a:xfrm>
+            <a:off x="1008944" y="2853295"/>
+            <a:ext cx="869149" cy="338554"/>
+          </a:xfrm>
+          <a:prstGeom prst="rect">
+            <a:avLst/>
+          </a:prstGeom>
+          <a:noFill/>
+        </p:spPr>
+        <p:txBody>
+          <a:bodyPr wrap="none" rtlCol="0">
+            <a:spAutoFit/>
+          </a:bodyPr>
+          <a:lstStyle/>
+          <a:p>
+            <a:r>
+              <a:rPr lang="en-US" altLang="zh-CN" sz="1600" dirty="0" smtClean="0"/>
+              <a:t>Compile</a:t>
+            </a:r>
+            <a:endParaRPr lang="zh-CN" altLang="en-US" sz="1600" dirty="0"/>
+          </a:p>
+        </p:txBody>
+      </p:sp>
+      <p:sp>
+        <p:nvSpPr>
+          <p:cNvPr id="8" name="圆角矩形 7"/>
+          <p:cNvSpPr/>
+          <p:nvPr/>
+        </p:nvSpPr>
+        <p:spPr>
+          <a:xfrm>
+            <a:off x="655100" y="3683255"/>
+            <a:ext cx="1576837" cy="504056"/>
+          </a:xfrm>
+          <a:prstGeom prst="roundRect">
+            <a:avLst>
+              <a:gd name="adj" fmla="val 12088"/>
+            </a:avLst>
+          </a:prstGeom>
+        </p:spPr>
+        <p:style>
+          <a:lnRef idx="1">
+            <a:schemeClr val="accent6"/>
+          </a:lnRef>
+          <a:fillRef idx="2">
+            <a:schemeClr val="accent6"/>
+          </a:fillRef>
+          <a:effectRef idx="1">
+            <a:schemeClr val="accent6"/>
+          </a:effectRef>
+          <a:fontRef idx="minor">
+            <a:schemeClr val="dk1"/>
+          </a:fontRef>
+        </p:style>
+        <p:txBody>
+          <a:bodyPr rtlCol="0" anchor="ctr"/>
+          <a:lstStyle/>
+          <a:p>
+            <a:pPr algn="ctr"/>
+            <a:endParaRPr lang="zh-CN" altLang="en-US" sz="1600">
+              <a:solidFill>
+                <a:schemeClr val="tx1"/>
+              </a:solidFill>
+            </a:endParaRPr>
+          </a:p>
+        </p:txBody>
+      </p:sp>
+      <p:sp>
+        <p:nvSpPr>
+          <p:cNvPr id="9" name="文本框 10"/>
+          <p:cNvSpPr txBox="1"/>
+          <p:nvPr/>
+        </p:nvSpPr>
+        <p:spPr>
+          <a:xfrm>
+            <a:off x="1148053" y="3772258"/>
+            <a:ext cx="590931" cy="338554"/>
+          </a:xfrm>
+          <a:prstGeom prst="rect">
+            <a:avLst/>
+          </a:prstGeom>
+          <a:noFill/>
+        </p:spPr>
+        <p:txBody>
+          <a:bodyPr wrap="none" rtlCol="0">
+            <a:spAutoFit/>
+          </a:bodyPr>
+          <a:lstStyle/>
+          <a:p>
+            <a:r>
+              <a:rPr lang="en-US" altLang="zh-CN" sz="1600" dirty="0" smtClean="0"/>
+              <a:t>Train</a:t>
+            </a:r>
+            <a:endParaRPr lang="zh-CN" altLang="en-US" sz="1600" dirty="0"/>
+          </a:p>
+        </p:txBody>
+      </p:sp>
+      <p:sp>
+        <p:nvSpPr>
+          <p:cNvPr id="10" name="圆角矩形 9"/>
+          <p:cNvSpPr/>
+          <p:nvPr/>
+        </p:nvSpPr>
+        <p:spPr>
+          <a:xfrm>
+            <a:off x="655100" y="4522633"/>
+            <a:ext cx="1576837" cy="504056"/>
+          </a:xfrm>
+          <a:prstGeom prst="roundRect">
+            <a:avLst>
+              <a:gd name="adj" fmla="val 12088"/>
+            </a:avLst>
+          </a:prstGeom>
+        </p:spPr>
+        <p:style>
+          <a:lnRef idx="1">
+            <a:schemeClr val="accent5"/>
+          </a:lnRef>
+          <a:fillRef idx="2">
+            <a:schemeClr val="accent5"/>
+          </a:fillRef>
+          <a:effectRef idx="1">
+            <a:schemeClr val="accent5"/>
+          </a:effectRef>
+          <a:fontRef idx="minor">
+            <a:schemeClr val="dk1"/>
+          </a:fontRef>
+        </p:style>
+        <p:txBody>
+          <a:bodyPr rtlCol="0" anchor="ctr"/>
+          <a:lstStyle/>
+          <a:p>
+            <a:pPr algn="ctr"/>
+            <a:endParaRPr lang="zh-CN" altLang="en-US" sz="1600">
+              <a:solidFill>
+                <a:schemeClr val="tx1"/>
+              </a:solidFill>
+            </a:endParaRPr>
+          </a:p>
+        </p:txBody>
+      </p:sp>
+      <p:sp>
+        <p:nvSpPr>
+          <p:cNvPr id="11" name="文本框 12"/>
+          <p:cNvSpPr txBox="1"/>
+          <p:nvPr/>
+        </p:nvSpPr>
+        <p:spPr>
+          <a:xfrm>
+            <a:off x="999679" y="4605384"/>
+            <a:ext cx="887679" cy="338554"/>
+          </a:xfrm>
+          <a:prstGeom prst="rect">
+            <a:avLst/>
+          </a:prstGeom>
+          <a:noFill/>
+        </p:spPr>
+        <p:txBody>
+          <a:bodyPr wrap="none" rtlCol="0">
+            <a:spAutoFit/>
+          </a:bodyPr>
+          <a:lstStyle/>
+          <a:p>
+            <a:r>
+              <a:rPr lang="en-US" altLang="zh-CN" sz="1600" dirty="0" smtClean="0"/>
+              <a:t>Evaluate</a:t>
+            </a:r>
+            <a:endParaRPr lang="zh-CN" altLang="en-US" sz="1600" dirty="0"/>
+          </a:p>
+        </p:txBody>
+      </p:sp>
+      <p:sp>
+        <p:nvSpPr>
+          <p:cNvPr id="12" name="下箭头 11"/>
+          <p:cNvSpPr/>
+          <p:nvPr/>
+        </p:nvSpPr>
+        <p:spPr>
+          <a:xfrm>
+            <a:off x="1299502" y="1652820"/>
+            <a:ext cx="288032" cy="216024"/>
+          </a:xfrm>
+          <a:prstGeom prst="downArrow">
+            <a:avLst/>
+          </a:prstGeom>
+          <a:solidFill>
+            <a:schemeClr val="bg1">
+              <a:lumMod val="95000"/>
+            </a:schemeClr>
+          </a:solidFill>
+          <a:ln w="6350">
+            <a:solidFill>
+              <a:schemeClr val="bg1">
+                <a:lumMod val="65000"/>
+              </a:schemeClr>
+            </a:solidFill>
+          </a:ln>
+        </p:spPr>
+        <p:style>
+          <a:lnRef idx="2">
+            <a:schemeClr val="accent1">
+              <a:shade val="50000"/>
+            </a:schemeClr>
+          </a:lnRef>
+          <a:fillRef idx="1">
+            <a:schemeClr val="accent1"/>
+          </a:fillRef>
+          <a:effectRef idx="0">
+            <a:schemeClr val="accent1"/>
+          </a:effectRef>
+          <a:fontRef idx="minor">
+            <a:schemeClr val="lt1"/>
+          </a:fontRef>
+        </p:style>
+        <p:txBody>
+          <a:bodyPr rtlCol="0" anchor="ctr"/>
+          <a:lstStyle/>
+          <a:p>
+            <a:pPr algn="ctr"/>
+            <a:endParaRPr lang="zh-CN" altLang="en-US"/>
+          </a:p>
+        </p:txBody>
+      </p:sp>
+      <p:sp>
+        <p:nvSpPr>
+          <p:cNvPr id="13" name="下箭头 12"/>
+          <p:cNvSpPr/>
+          <p:nvPr/>
+        </p:nvSpPr>
+        <p:spPr>
+          <a:xfrm>
+            <a:off x="1299502" y="2494625"/>
+            <a:ext cx="288032" cy="216024"/>
+          </a:xfrm>
+          <a:prstGeom prst="downArrow">
+            <a:avLst/>
+          </a:prstGeom>
+          <a:solidFill>
+            <a:schemeClr val="bg1">
+              <a:lumMod val="95000"/>
+            </a:schemeClr>
+          </a:solidFill>
+          <a:ln w="6350">
+            <a:solidFill>
+              <a:schemeClr val="bg1">
+                <a:lumMod val="65000"/>
+              </a:schemeClr>
+            </a:solidFill>
+          </a:ln>
+        </p:spPr>
+        <p:style>
+          <a:lnRef idx="2">
+            <a:schemeClr val="accent1">
+              <a:shade val="50000"/>
+            </a:schemeClr>
+          </a:lnRef>
+          <a:fillRef idx="1">
+            <a:schemeClr val="accent1"/>
+          </a:fillRef>
+          <a:effectRef idx="0">
+            <a:schemeClr val="accent1"/>
+          </a:effectRef>
+          <a:fontRef idx="minor">
+            <a:schemeClr val="lt1"/>
+          </a:fontRef>
+        </p:style>
+        <p:txBody>
+          <a:bodyPr rtlCol="0" anchor="ctr"/>
+          <a:lstStyle/>
+          <a:p>
+            <a:pPr algn="ctr"/>
+            <a:endParaRPr lang="zh-CN" altLang="en-US"/>
+          </a:p>
+        </p:txBody>
+      </p:sp>
+      <p:sp>
+        <p:nvSpPr>
+          <p:cNvPr id="14" name="下箭头 13"/>
+          <p:cNvSpPr/>
+          <p:nvPr/>
+        </p:nvSpPr>
+        <p:spPr>
+          <a:xfrm>
+            <a:off x="1299502" y="3374814"/>
+            <a:ext cx="288032" cy="216024"/>
+          </a:xfrm>
+          <a:prstGeom prst="downArrow">
+            <a:avLst/>
+          </a:prstGeom>
+          <a:solidFill>
+            <a:schemeClr val="bg1">
+              <a:lumMod val="95000"/>
+            </a:schemeClr>
+          </a:solidFill>
+          <a:ln w="6350">
+            <a:solidFill>
+              <a:schemeClr val="bg1">
+                <a:lumMod val="65000"/>
+              </a:schemeClr>
+            </a:solidFill>
+          </a:ln>
+        </p:spPr>
+        <p:style>
+          <a:lnRef idx="2">
+            <a:schemeClr val="accent1">
+              <a:shade val="50000"/>
+            </a:schemeClr>
+          </a:lnRef>
+          <a:fillRef idx="1">
+            <a:schemeClr val="accent1"/>
+          </a:fillRef>
+          <a:effectRef idx="0">
+            <a:schemeClr val="accent1"/>
+          </a:effectRef>
+          <a:fontRef idx="minor">
+            <a:schemeClr val="lt1"/>
+          </a:fontRef>
+        </p:style>
+        <p:txBody>
+          <a:bodyPr rtlCol="0" anchor="ctr"/>
+          <a:lstStyle/>
+          <a:p>
+            <a:pPr algn="ctr"/>
+            <a:endParaRPr lang="zh-CN" altLang="en-US"/>
+          </a:p>
+        </p:txBody>
+      </p:sp>
+      <p:sp>
+        <p:nvSpPr>
+          <p:cNvPr id="15" name="下箭头 14"/>
+          <p:cNvSpPr/>
+          <p:nvPr/>
+        </p:nvSpPr>
+        <p:spPr>
+          <a:xfrm>
+            <a:off x="1299502" y="4261079"/>
+            <a:ext cx="288032" cy="216024"/>
+          </a:xfrm>
+          <a:prstGeom prst="downArrow">
+            <a:avLst/>
+          </a:prstGeom>
+          <a:solidFill>
+            <a:schemeClr val="bg1">
+              <a:lumMod val="95000"/>
+            </a:schemeClr>
+          </a:solidFill>
+          <a:ln w="6350">
+            <a:solidFill>
+              <a:schemeClr val="bg1">
+                <a:lumMod val="65000"/>
+              </a:schemeClr>
+            </a:solidFill>
+          </a:ln>
+        </p:spPr>
+        <p:style>
+          <a:lnRef idx="2">
+            <a:schemeClr val="accent1">
+              <a:shade val="50000"/>
+            </a:schemeClr>
+          </a:lnRef>
+          <a:fillRef idx="1">
+            <a:schemeClr val="accent1"/>
+          </a:fillRef>
+          <a:effectRef idx="0">
+            <a:schemeClr val="accent1"/>
+          </a:effectRef>
+          <a:fontRef idx="minor">
+            <a:schemeClr val="lt1"/>
+          </a:fontRef>
+        </p:style>
+        <p:txBody>
+          <a:bodyPr rtlCol="0" anchor="ctr"/>
+          <a:lstStyle/>
+          <a:p>
+            <a:pPr algn="ctr"/>
+            <a:endParaRPr lang="zh-CN" altLang="en-US"/>
+          </a:p>
+        </p:txBody>
+      </p:sp>
+      <p:pic>
+        <p:nvPicPr>
+          <p:cNvPr id="1026" name="Picture 2"/>
+          <p:cNvPicPr>
+            <a:picLocks noChangeAspect="1" noChangeArrowheads="1"/>
+          </p:cNvPicPr>
+          <p:nvPr/>
+        </p:nvPicPr>
+        <p:blipFill>
+          <a:blip r:embed="rId2" cstate="print">
+            <a:extLst>
+              <a:ext uri="{28A0092B-C50C-407E-A947-70E740481C1C}">
+                <a14:useLocalDpi xmlns:a14="http://schemas.microsoft.com/office/drawing/2010/main" val="0"/>
+              </a:ext>
+            </a:extLst>
+          </a:blip>
+          <a:srcRect/>
+          <a:stretch>
+            <a:fillRect/>
+          </a:stretch>
+        </p:blipFill>
+        <p:spPr bwMode="auto">
+          <a:xfrm>
+            <a:off x="2405556" y="1045600"/>
+            <a:ext cx="1374356" cy="564658"/>
+          </a:xfrm>
+          <a:prstGeom prst="rect">
+            <a:avLst/>
+          </a:prstGeom>
+          <a:noFill/>
+          <a:ln>
+            <a:noFill/>
+          </a:ln>
+          <a:effectLst/>
+          <a:extLst>
+            <a:ext uri="{909E8E84-426E-40DD-AFC4-6F175D3DCCD1}">
+              <a14:hiddenFill xmlns:a14="http://schemas.microsoft.com/office/drawing/2010/main">
+                <a:solidFill>
+                  <a:schemeClr val="accent1"/>
+                </a:solidFill>
+              </a14:hiddenFill>
+            </a:ext>
+            <a:ext uri="{91240B29-F687-4F45-9708-019B960494DF}">
+              <a14:hiddenLine xmlns:a14="http://schemas.microsoft.com/office/drawing/2010/main" w="9525">
+                <a:solidFill>
+                  <a:schemeClr val="tx1"/>
+                </a:solidFill>
+                <a:miter lim="800000"/>
+                <a:headEnd/>
+                <a:tailEnd/>
+              </a14:hiddenLine>
+            </a:ext>
+            <a:ext uri="{AF507438-7753-43E0-B8FC-AC1667EBCBE1}">
+              <a14:hiddenEffects xmlns:a14="http://schemas.microsoft.com/office/drawing/2010/main">
+                <a:effectLst>
+                  <a:outerShdw dist="35921" dir="2700000" algn="ctr" rotWithShape="0">
+                    <a:schemeClr val="bg2"/>
+                  </a:outerShdw>
+                </a:effectLst>
+              </a14:hiddenEffects>
+            </a:ext>
+          </a:extLst>
+        </p:spPr>
+      </p:pic>
+      <p:pic>
+        <p:nvPicPr>
+          <p:cNvPr id="1027" name="Picture 3"/>
+          <p:cNvPicPr>
+            <a:picLocks noChangeAspect="1" noChangeArrowheads="1"/>
+          </p:cNvPicPr>
+          <p:nvPr/>
+        </p:nvPicPr>
+        <p:blipFill>
+          <a:blip r:embed="rId3" cstate="print">
+            <a:extLst>
+              <a:ext uri="{28A0092B-C50C-407E-A947-70E740481C1C}">
+                <a14:useLocalDpi xmlns:a14="http://schemas.microsoft.com/office/drawing/2010/main" val="0"/>
+              </a:ext>
+            </a:extLst>
+          </a:blip>
+          <a:srcRect/>
+          <a:stretch>
+            <a:fillRect/>
+          </a:stretch>
+        </p:blipFill>
+        <p:spPr bwMode="auto">
+          <a:xfrm>
+            <a:off x="3851920" y="1149677"/>
+            <a:ext cx="1512168" cy="373328"/>
+          </a:xfrm>
+          <a:prstGeom prst="rect">
+            <a:avLst/>
+          </a:prstGeom>
+          <a:noFill/>
+          <a:ln>
+            <a:noFill/>
+          </a:ln>
+          <a:effectLst/>
+          <a:extLst>
+            <a:ext uri="{909E8E84-426E-40DD-AFC4-6F175D3DCCD1}">
+              <a14:hiddenFill xmlns:a14="http://schemas.microsoft.com/office/drawing/2010/main">
+                <a:solidFill>
+                  <a:schemeClr val="accent1"/>
+                </a:solidFill>
+              </a14:hiddenFill>
+            </a:ext>
+            <a:ext uri="{91240B29-F687-4F45-9708-019B960494DF}">
+              <a14:hiddenLine xmlns:a14="http://schemas.microsoft.com/office/drawing/2010/main" w="9525">
+                <a:solidFill>
+                  <a:schemeClr val="tx1"/>
+                </a:solidFill>
+                <a:miter lim="800000"/>
+                <a:headEnd/>
+                <a:tailEnd/>
+              </a14:hiddenLine>
+            </a:ext>
+            <a:ext uri="{AF507438-7753-43E0-B8FC-AC1667EBCBE1}">
+              <a14:hiddenEffects xmlns:a14="http://schemas.microsoft.com/office/drawing/2010/main">
+                <a:effectLst>
+                  <a:outerShdw dist="35921" dir="2700000" algn="ctr" rotWithShape="0">
+                    <a:schemeClr val="bg2"/>
+                  </a:outerShdw>
+                </a:effectLst>
+              </a14:hiddenEffects>
+            </a:ext>
+          </a:extLst>
+        </p:spPr>
+      </p:pic>
+      <p:sp>
+        <p:nvSpPr>
+          <p:cNvPr id="18" name="矩形 17"/>
+          <p:cNvSpPr/>
+          <p:nvPr/>
+        </p:nvSpPr>
+        <p:spPr>
+          <a:xfrm>
+            <a:off x="5436096" y="1131046"/>
+            <a:ext cx="2016224" cy="391959"/>
+          </a:xfrm>
+          <a:prstGeom prst="rect">
+            <a:avLst/>
+          </a:prstGeom>
+          <a:solidFill>
+            <a:srgbClr val="D22800"/>
+          </a:solidFill>
+          <a:ln>
+            <a:noFill/>
+          </a:ln>
+        </p:spPr>
+        <p:style>
+          <a:lnRef idx="2">
+            <a:schemeClr val="accent1">
+              <a:shade val="50000"/>
+            </a:schemeClr>
+          </a:lnRef>
+          <a:fillRef idx="1">
+            <a:schemeClr val="accent1"/>
+          </a:fillRef>
+          <a:effectRef idx="0">
+            <a:schemeClr val="accent1"/>
+          </a:effectRef>
+          <a:fontRef idx="minor">
+            <a:schemeClr val="lt1"/>
+          </a:fontRef>
+        </p:style>
+        <p:txBody>
+          <a:bodyPr rtlCol="0" anchor="ctr"/>
+          <a:lstStyle/>
+          <a:p>
+            <a:pPr algn="ctr"/>
+            <a:r>
+              <a:rPr lang="en-US" altLang="zh-CN" sz="1600" b="1" dirty="0" err="1">
+                <a:solidFill>
+                  <a:schemeClr val="bg1"/>
+                </a:solidFill>
+                <a:latin typeface="Arial Unicode MS" pitchFamily="34" charset="-122"/>
+                <a:ea typeface="Arial Unicode MS" pitchFamily="34" charset="-122"/>
+                <a:cs typeface="Arial Unicode MS" pitchFamily="34" charset="-122"/>
+              </a:rPr>
+              <a:t>keras.preprocessing</a:t>
+            </a:r>
+            <a:endParaRPr lang="zh-CN" altLang="en-US" sz="1600" b="1" dirty="0">
+              <a:solidFill>
+                <a:schemeClr val="bg1"/>
+              </a:solidFill>
+              <a:latin typeface="Arial Unicode MS" pitchFamily="34" charset="-122"/>
+              <a:ea typeface="Arial Unicode MS" pitchFamily="34" charset="-122"/>
+              <a:cs typeface="Arial Unicode MS" pitchFamily="34" charset="-122"/>
+            </a:endParaRPr>
+          </a:p>
+        </p:txBody>
+      </p:sp>
+      <p:sp>
+        <p:nvSpPr>
+          <p:cNvPr id="19" name="TextBox 18"/>
+          <p:cNvSpPr txBox="1"/>
+          <p:nvPr/>
+        </p:nvSpPr>
+        <p:spPr>
+          <a:xfrm>
+            <a:off x="2549197" y="1594074"/>
+            <a:ext cx="2223686" cy="1569660"/>
+          </a:xfrm>
+          <a:prstGeom prst="rect">
+            <a:avLst/>
+          </a:prstGeom>
+          <a:noFill/>
+        </p:spPr>
+        <p:txBody>
+          <a:bodyPr wrap="none" rtlCol="0">
+            <a:spAutoFit/>
+          </a:bodyPr>
+          <a:lstStyle/>
+          <a:p>
+            <a:pPr>
+              <a:lnSpc>
+                <a:spcPct val="200000"/>
+              </a:lnSpc>
+            </a:pPr>
+            <a:r>
+              <a:rPr lang="zh-CN" altLang="en-US" sz="1600" dirty="0" smtClean="0">
+                <a:latin typeface="Arial Unicode MS" pitchFamily="34" charset="-122"/>
+                <a:ea typeface="Arial Unicode MS" pitchFamily="34" charset="-122"/>
+                <a:cs typeface="Arial Unicode MS" pitchFamily="34" charset="-122"/>
+              </a:rPr>
+              <a:t>① </a:t>
+            </a:r>
+            <a:r>
+              <a:rPr lang="en-US" altLang="zh-CN" sz="1600" dirty="0" smtClean="0">
+                <a:latin typeface="Arial Unicode MS" pitchFamily="34" charset="-122"/>
+                <a:ea typeface="Arial Unicode MS" pitchFamily="34" charset="-122"/>
+                <a:cs typeface="Arial Unicode MS" pitchFamily="34" charset="-122"/>
+              </a:rPr>
+              <a:t>Sequential </a:t>
+            </a:r>
+            <a:r>
+              <a:rPr lang="en-US" altLang="zh-CN" sz="1600" dirty="0">
+                <a:latin typeface="Arial Unicode MS" pitchFamily="34" charset="-122"/>
+                <a:ea typeface="Arial Unicode MS" pitchFamily="34" charset="-122"/>
+                <a:cs typeface="Arial Unicode MS" pitchFamily="34" charset="-122"/>
+              </a:rPr>
+              <a:t>API</a:t>
+            </a:r>
+          </a:p>
+          <a:p>
+            <a:pPr>
+              <a:lnSpc>
+                <a:spcPct val="200000"/>
+              </a:lnSpc>
+            </a:pPr>
+            <a:r>
+              <a:rPr lang="zh-CN" altLang="en-US" sz="1600" dirty="0" smtClean="0">
+                <a:latin typeface="Arial Unicode MS" pitchFamily="34" charset="-122"/>
+                <a:ea typeface="Arial Unicode MS" pitchFamily="34" charset="-122"/>
+                <a:cs typeface="Arial Unicode MS" pitchFamily="34" charset="-122"/>
+              </a:rPr>
+              <a:t>② </a:t>
+            </a:r>
+            <a:r>
+              <a:rPr lang="en-US" altLang="zh-CN" sz="1600" dirty="0" smtClean="0">
+                <a:latin typeface="Arial Unicode MS" pitchFamily="34" charset="-122"/>
+                <a:ea typeface="Arial Unicode MS" pitchFamily="34" charset="-122"/>
+                <a:cs typeface="Arial Unicode MS" pitchFamily="34" charset="-122"/>
+              </a:rPr>
+              <a:t>Functional </a:t>
+            </a:r>
+            <a:r>
+              <a:rPr lang="en-US" altLang="zh-CN" sz="1600" dirty="0">
+                <a:latin typeface="Arial Unicode MS" pitchFamily="34" charset="-122"/>
+                <a:ea typeface="Arial Unicode MS" pitchFamily="34" charset="-122"/>
+                <a:cs typeface="Arial Unicode MS" pitchFamily="34" charset="-122"/>
+              </a:rPr>
+              <a:t>API</a:t>
+            </a:r>
+          </a:p>
+          <a:p>
+            <a:pPr>
+              <a:lnSpc>
+                <a:spcPct val="200000"/>
+              </a:lnSpc>
+            </a:pPr>
+            <a:r>
+              <a:rPr lang="zh-CN" altLang="en-US" sz="1600" dirty="0" smtClean="0">
+                <a:latin typeface="Arial Unicode MS" pitchFamily="34" charset="-122"/>
+                <a:ea typeface="Arial Unicode MS" pitchFamily="34" charset="-122"/>
+                <a:cs typeface="Arial Unicode MS" pitchFamily="34" charset="-122"/>
+              </a:rPr>
+              <a:t>③ </a:t>
+            </a:r>
+            <a:r>
+              <a:rPr lang="en-US" altLang="zh-CN" sz="1600" dirty="0" smtClean="0">
+                <a:latin typeface="Arial Unicode MS" pitchFamily="34" charset="-122"/>
+                <a:ea typeface="Arial Unicode MS" pitchFamily="34" charset="-122"/>
+                <a:cs typeface="Arial Unicode MS" pitchFamily="34" charset="-122"/>
+              </a:rPr>
+              <a:t>Model </a:t>
+            </a:r>
+            <a:r>
+              <a:rPr lang="en-US" altLang="zh-CN" sz="1600" dirty="0" err="1">
+                <a:latin typeface="Arial Unicode MS" pitchFamily="34" charset="-122"/>
+                <a:ea typeface="Arial Unicode MS" pitchFamily="34" charset="-122"/>
+                <a:cs typeface="Arial Unicode MS" pitchFamily="34" charset="-122"/>
+              </a:rPr>
+              <a:t>Subclassing</a:t>
+            </a:r>
+            <a:r>
+              <a:rPr lang="en-US" altLang="zh-CN" sz="1600" dirty="0">
+                <a:latin typeface="Arial Unicode MS" pitchFamily="34" charset="-122"/>
+                <a:ea typeface="Arial Unicode MS" pitchFamily="34" charset="-122"/>
+                <a:cs typeface="Arial Unicode MS" pitchFamily="34" charset="-122"/>
+              </a:rPr>
+              <a:t> </a:t>
+            </a:r>
+            <a:endParaRPr lang="zh-CN" altLang="en-US" sz="1600" dirty="0">
+              <a:latin typeface="Arial Unicode MS" pitchFamily="34" charset="-122"/>
+              <a:ea typeface="Arial Unicode MS" pitchFamily="34" charset="-122"/>
+              <a:cs typeface="Arial Unicode MS" pitchFamily="34" charset="-122"/>
+            </a:endParaRPr>
+          </a:p>
+        </p:txBody>
+      </p:sp>
+      <p:sp>
+        <p:nvSpPr>
+          <p:cNvPr id="28" name="左大括号 27"/>
+          <p:cNvSpPr/>
+          <p:nvPr/>
+        </p:nvSpPr>
+        <p:spPr>
+          <a:xfrm>
+            <a:off x="2379973" y="1834658"/>
+            <a:ext cx="144016" cy="1204098"/>
+          </a:xfrm>
+          <a:prstGeom prst="leftBrace">
+            <a:avLst>
+              <a:gd name="adj1" fmla="val 50475"/>
+              <a:gd name="adj2" fmla="val 30751"/>
+            </a:avLst>
+          </a:prstGeom>
+          <a:ln>
+            <a:solidFill>
+              <a:schemeClr val="bg1">
+                <a:lumMod val="50000"/>
+              </a:schemeClr>
+            </a:solidFill>
+          </a:ln>
+        </p:spPr>
+        <p:style>
+          <a:lnRef idx="1">
+            <a:schemeClr val="accent1"/>
+          </a:lnRef>
+          <a:fillRef idx="0">
+            <a:schemeClr val="accent1"/>
+          </a:fillRef>
+          <a:effectRef idx="0">
+            <a:schemeClr val="accent1"/>
+          </a:effectRef>
+          <a:fontRef idx="minor">
+            <a:schemeClr val="tx1"/>
+          </a:fontRef>
+        </p:style>
+        <p:txBody>
+          <a:bodyPr rtlCol="0" anchor="ctr"/>
+          <a:lstStyle/>
+          <a:p>
+            <a:pPr algn="ctr"/>
+            <a:endParaRPr lang="zh-CN" altLang="en-US"/>
+          </a:p>
+        </p:txBody>
+      </p:sp>
+      <p:pic>
+        <p:nvPicPr>
+          <p:cNvPr id="1028" name="Picture 4"/>
+          <p:cNvPicPr>
+            <a:picLocks noChangeAspect="1" noChangeArrowheads="1"/>
+          </p:cNvPicPr>
+          <p:nvPr/>
+        </p:nvPicPr>
+        <p:blipFill>
+          <a:blip r:embed="rId4" cstate="print">
+            <a:extLst>
+              <a:ext uri="{28A0092B-C50C-407E-A947-70E740481C1C}">
+                <a14:useLocalDpi xmlns:a14="http://schemas.microsoft.com/office/drawing/2010/main" val="0"/>
+              </a:ext>
+            </a:extLst>
+          </a:blip>
+          <a:srcRect/>
+          <a:stretch>
+            <a:fillRect/>
+          </a:stretch>
+        </p:blipFill>
+        <p:spPr bwMode="auto">
+          <a:xfrm>
+            <a:off x="4778292" y="1785474"/>
+            <a:ext cx="2332616" cy="1227573"/>
+          </a:xfrm>
+          <a:prstGeom prst="rect">
+            <a:avLst/>
+          </a:prstGeom>
+          <a:noFill/>
+          <a:ln>
+            <a:noFill/>
+          </a:ln>
+          <a:effectLst/>
+          <a:extLst>
+            <a:ext uri="{909E8E84-426E-40DD-AFC4-6F175D3DCCD1}">
+              <a14:hiddenFill xmlns:a14="http://schemas.microsoft.com/office/drawing/2010/main">
+                <a:solidFill>
+                  <a:schemeClr val="accent1"/>
+                </a:solidFill>
+              </a14:hiddenFill>
+            </a:ext>
+            <a:ext uri="{91240B29-F687-4F45-9708-019B960494DF}">
+              <a14:hiddenLine xmlns:a14="http://schemas.microsoft.com/office/drawing/2010/main" w="9525">
+                <a:solidFill>
+                  <a:schemeClr val="tx1"/>
+                </a:solidFill>
+                <a:miter lim="800000"/>
+                <a:headEnd/>
+                <a:tailEnd/>
+              </a14:hiddenLine>
+            </a:ext>
+            <a:ext uri="{AF507438-7753-43E0-B8FC-AC1667EBCBE1}">
+              <a14:hiddenEffects xmlns:a14="http://schemas.microsoft.com/office/drawing/2010/main">
+                <a:effectLst>
+                  <a:outerShdw dist="35921" dir="2700000" algn="ctr" rotWithShape="0">
+                    <a:schemeClr val="bg2"/>
+                  </a:outerShdw>
+                </a:effectLst>
+              </a14:hiddenEffects>
+            </a:ext>
+          </a:extLst>
+        </p:spPr>
+      </p:pic>
+      <p:sp>
+        <p:nvSpPr>
+          <p:cNvPr id="32" name="左大括号 31"/>
+          <p:cNvSpPr/>
+          <p:nvPr/>
+        </p:nvSpPr>
+        <p:spPr>
+          <a:xfrm>
+            <a:off x="2379973" y="3598930"/>
+            <a:ext cx="144016" cy="1204098"/>
+          </a:xfrm>
+          <a:prstGeom prst="leftBrace">
+            <a:avLst>
+              <a:gd name="adj1" fmla="val 50475"/>
+              <a:gd name="adj2" fmla="val 30751"/>
+            </a:avLst>
+          </a:prstGeom>
+          <a:ln>
+            <a:solidFill>
+              <a:schemeClr val="bg1">
+                <a:lumMod val="50000"/>
+              </a:schemeClr>
+            </a:solidFill>
+          </a:ln>
+        </p:spPr>
+        <p:style>
+          <a:lnRef idx="1">
+            <a:schemeClr val="accent1"/>
+          </a:lnRef>
+          <a:fillRef idx="0">
+            <a:schemeClr val="accent1"/>
+          </a:fillRef>
+          <a:effectRef idx="0">
+            <a:schemeClr val="accent1"/>
+          </a:effectRef>
+          <a:fontRef idx="minor">
+            <a:schemeClr val="tx1"/>
+          </a:fontRef>
+        </p:style>
+        <p:txBody>
+          <a:bodyPr rtlCol="0" anchor="ctr"/>
+          <a:lstStyle/>
+          <a:p>
+            <a:pPr algn="ctr"/>
+            <a:endParaRPr lang="zh-CN" altLang="en-US"/>
+          </a:p>
+        </p:txBody>
+      </p:sp>
+      <p:sp>
+        <p:nvSpPr>
+          <p:cNvPr id="33" name="TextBox 32"/>
+          <p:cNvSpPr txBox="1"/>
+          <p:nvPr/>
+        </p:nvSpPr>
+        <p:spPr>
+          <a:xfrm>
+            <a:off x="2549197" y="3375689"/>
+            <a:ext cx="3639138" cy="1569660"/>
+          </a:xfrm>
+          <a:prstGeom prst="rect">
+            <a:avLst/>
+          </a:prstGeom>
+          <a:noFill/>
+        </p:spPr>
+        <p:txBody>
+          <a:bodyPr wrap="none" rtlCol="0">
+            <a:spAutoFit/>
+          </a:bodyPr>
+          <a:lstStyle/>
+          <a:p>
+            <a:pPr>
+              <a:lnSpc>
+                <a:spcPct val="200000"/>
+              </a:lnSpc>
+            </a:pPr>
+            <a:r>
+              <a:rPr lang="zh-CN" altLang="en-US" sz="1600" dirty="0" smtClean="0">
+                <a:latin typeface="Arial Unicode MS" pitchFamily="34" charset="-122"/>
+                <a:ea typeface="Arial Unicode MS" pitchFamily="34" charset="-122"/>
+                <a:cs typeface="Arial Unicode MS" pitchFamily="34" charset="-122"/>
+              </a:rPr>
+              <a:t>① </a:t>
+            </a:r>
+            <a:r>
+              <a:rPr lang="en-US" altLang="zh-CN" sz="1600" dirty="0" err="1" smtClean="0">
+                <a:latin typeface="Arial Unicode MS" pitchFamily="34" charset="-122"/>
+                <a:ea typeface="Arial Unicode MS" pitchFamily="34" charset="-122"/>
+                <a:cs typeface="Arial Unicode MS" pitchFamily="34" charset="-122"/>
+              </a:rPr>
+              <a:t>model.fit</a:t>
+            </a:r>
+            <a:endParaRPr lang="en-US" altLang="zh-CN" sz="1600" dirty="0" smtClean="0">
+              <a:latin typeface="Arial Unicode MS" pitchFamily="34" charset="-122"/>
+              <a:ea typeface="Arial Unicode MS" pitchFamily="34" charset="-122"/>
+              <a:cs typeface="Arial Unicode MS" pitchFamily="34" charset="-122"/>
+            </a:endParaRPr>
+          </a:p>
+          <a:p>
+            <a:pPr>
+              <a:lnSpc>
+                <a:spcPct val="200000"/>
+              </a:lnSpc>
+            </a:pPr>
+            <a:r>
+              <a:rPr lang="zh-CN" altLang="en-US" sz="1600" dirty="0" smtClean="0">
+                <a:latin typeface="Arial Unicode MS" pitchFamily="34" charset="-122"/>
+                <a:ea typeface="Arial Unicode MS" pitchFamily="34" charset="-122"/>
+                <a:cs typeface="Arial Unicode MS" pitchFamily="34" charset="-122"/>
+              </a:rPr>
+              <a:t>② </a:t>
+            </a:r>
+            <a:r>
+              <a:rPr lang="en-US" altLang="zh-CN" sz="1600" dirty="0">
+                <a:latin typeface="Arial Unicode MS" pitchFamily="34" charset="-122"/>
+                <a:ea typeface="Arial Unicode MS" pitchFamily="34" charset="-122"/>
+                <a:cs typeface="Arial Unicode MS" pitchFamily="34" charset="-122"/>
+              </a:rPr>
+              <a:t>model. </a:t>
+            </a:r>
+            <a:r>
+              <a:rPr lang="en-US" altLang="zh-CN" sz="1600" dirty="0" err="1">
+                <a:latin typeface="Arial Unicode MS" pitchFamily="34" charset="-122"/>
+                <a:ea typeface="Arial Unicode MS" pitchFamily="34" charset="-122"/>
+                <a:cs typeface="Arial Unicode MS" pitchFamily="34" charset="-122"/>
+              </a:rPr>
+              <a:t>train_on_batch</a:t>
+            </a:r>
+            <a:endParaRPr lang="en-US" altLang="zh-CN" sz="1600" dirty="0">
+              <a:latin typeface="Arial Unicode MS" pitchFamily="34" charset="-122"/>
+              <a:ea typeface="Arial Unicode MS" pitchFamily="34" charset="-122"/>
+              <a:cs typeface="Arial Unicode MS" pitchFamily="34" charset="-122"/>
+            </a:endParaRPr>
+          </a:p>
+          <a:p>
+            <a:pPr>
+              <a:lnSpc>
+                <a:spcPct val="200000"/>
+              </a:lnSpc>
+            </a:pPr>
+            <a:r>
+              <a:rPr lang="zh-CN" altLang="en-US" sz="1600" dirty="0" smtClean="0">
+                <a:latin typeface="Arial Unicode MS" pitchFamily="34" charset="-122"/>
+                <a:ea typeface="Arial Unicode MS" pitchFamily="34" charset="-122"/>
+                <a:cs typeface="Arial Unicode MS" pitchFamily="34" charset="-122"/>
+              </a:rPr>
+              <a:t>③ </a:t>
+            </a:r>
+            <a:r>
+              <a:rPr lang="en-US" altLang="zh-CN" sz="1600" dirty="0" smtClean="0">
+                <a:latin typeface="Arial Unicode MS" pitchFamily="34" charset="-122"/>
+                <a:ea typeface="Arial Unicode MS" pitchFamily="34" charset="-122"/>
+                <a:cs typeface="Arial Unicode MS" pitchFamily="34" charset="-122"/>
+              </a:rPr>
+              <a:t>custom</a:t>
+            </a:r>
+            <a:r>
+              <a:rPr lang="zh-CN" altLang="en-US" sz="1600" dirty="0" smtClean="0">
+                <a:latin typeface="Arial Unicode MS" pitchFamily="34" charset="-122"/>
+                <a:ea typeface="Arial Unicode MS" pitchFamily="34" charset="-122"/>
+                <a:cs typeface="Arial Unicode MS" pitchFamily="34" charset="-122"/>
+              </a:rPr>
+              <a:t>：</a:t>
+            </a:r>
+            <a:r>
+              <a:rPr lang="en-US" altLang="zh-CN" sz="1600" dirty="0" err="1" smtClean="0">
+                <a:latin typeface="Arial Unicode MS" pitchFamily="34" charset="-122"/>
+                <a:ea typeface="Arial Unicode MS" pitchFamily="34" charset="-122"/>
+                <a:cs typeface="Arial Unicode MS" pitchFamily="34" charset="-122"/>
+              </a:rPr>
+              <a:t>optimizer.apply_gradients</a:t>
+            </a:r>
+            <a:endParaRPr lang="zh-CN" altLang="en-US" sz="1600" dirty="0">
+              <a:latin typeface="Arial Unicode MS" pitchFamily="34" charset="-122"/>
+              <a:ea typeface="Arial Unicode MS" pitchFamily="34" charset="-122"/>
+              <a:cs typeface="Arial Unicode MS" pitchFamily="34" charset="-122"/>
+            </a:endParaRPr>
+          </a:p>
+        </p:txBody>
+      </p:sp>
+      <p:pic>
+        <p:nvPicPr>
+          <p:cNvPr id="1029" name="Picture 5"/>
+          <p:cNvPicPr>
+            <a:picLocks noChangeAspect="1" noChangeArrowheads="1"/>
+          </p:cNvPicPr>
+          <p:nvPr/>
+        </p:nvPicPr>
+        <p:blipFill>
+          <a:blip r:embed="rId5">
+            <a:extLst>
+              <a:ext uri="{28A0092B-C50C-407E-A947-70E740481C1C}">
+                <a14:useLocalDpi xmlns:a14="http://schemas.microsoft.com/office/drawing/2010/main" val="0"/>
+              </a:ext>
+            </a:extLst>
+          </a:blip>
+          <a:srcRect/>
+          <a:stretch>
+            <a:fillRect/>
+          </a:stretch>
+        </p:blipFill>
+        <p:spPr bwMode="auto">
+          <a:xfrm>
+            <a:off x="5004048" y="3457397"/>
+            <a:ext cx="1747503" cy="1112425"/>
+          </a:xfrm>
+          <a:prstGeom prst="rect">
+            <a:avLst/>
+          </a:prstGeom>
+          <a:noFill/>
+          <a:ln>
+            <a:noFill/>
+          </a:ln>
+          <a:effectLst/>
+          <a:extLst>
+            <a:ext uri="{909E8E84-426E-40DD-AFC4-6F175D3DCCD1}">
+              <a14:hiddenFill xmlns:a14="http://schemas.microsoft.com/office/drawing/2010/main">
+                <a:solidFill>
+                  <a:schemeClr val="accent1"/>
+                </a:solidFill>
+              </a14:hiddenFill>
+            </a:ext>
+            <a:ext uri="{91240B29-F687-4F45-9708-019B960494DF}">
+              <a14:hiddenLine xmlns:a14="http://schemas.microsoft.com/office/drawing/2010/main" w="9525">
+                <a:solidFill>
+                  <a:schemeClr val="tx1"/>
+                </a:solidFill>
+                <a:miter lim="800000"/>
+                <a:headEnd/>
+                <a:tailEnd/>
+              </a14:hiddenLine>
+            </a:ext>
+            <a:ext uri="{AF507438-7753-43E0-B8FC-AC1667EBCBE1}">
+              <a14:hiddenEffects xmlns:a14="http://schemas.microsoft.com/office/drawing/2010/main">
+                <a:effectLst>
+                  <a:outerShdw dist="35921" dir="2700000" algn="ctr" rotWithShape="0">
+                    <a:schemeClr val="bg2"/>
+                  </a:outerShdw>
+                </a:effectLst>
+              </a14:hiddenEffects>
+            </a:ext>
+          </a:extLst>
+        </p:spPr>
+      </p:pic>
     </p:spTree>
     <p:extLst>
       <p:ext uri="{BB962C8B-B14F-4D97-AF65-F5344CB8AC3E}">

</xml_diff>